<commit_message>
Week 4 Draft Finished.
</commit_message>
<xml_diff>
--- a/week4/week4.pptx
+++ b/week4/week4.pptx
@@ -18,6 +18,16 @@
     <p:sldId id="327" r:id="rId12"/>
     <p:sldId id="328" r:id="rId13"/>
     <p:sldId id="329" r:id="rId14"/>
+    <p:sldId id="330" r:id="rId15"/>
+    <p:sldId id="331" r:id="rId16"/>
+    <p:sldId id="332" r:id="rId17"/>
+    <p:sldId id="333" r:id="rId18"/>
+    <p:sldId id="334" r:id="rId19"/>
+    <p:sldId id="336" r:id="rId20"/>
+    <p:sldId id="337" r:id="rId21"/>
+    <p:sldId id="338" r:id="rId22"/>
+    <p:sldId id="339" r:id="rId23"/>
+    <p:sldId id="340" r:id="rId24"/>
   </p:sldIdLst>
   <p:sldSz cx="12192000" cy="6858000"/>
   <p:notesSz cx="6858000" cy="9144000"/>
@@ -138,6 +148,24 @@
             <p14:sldId id="327"/>
             <p14:sldId id="328"/>
             <p14:sldId id="329"/>
+            <p14:sldId id="330"/>
+            <p14:sldId id="331"/>
+            <p14:sldId id="332"/>
+            <p14:sldId id="333"/>
+            <p14:sldId id="334"/>
+          </p14:sldIdLst>
+        </p14:section>
+        <p14:section name="Homework" id="{725C054A-A747-4480-B224-C761049E2A50}">
+          <p14:sldIdLst>
+            <p14:sldId id="336"/>
+            <p14:sldId id="337"/>
+            <p14:sldId id="338"/>
+            <p14:sldId id="339"/>
+          </p14:sldIdLst>
+        </p14:section>
+        <p14:section name="Next Week" id="{78F99416-6265-4D78-B4A2-14FB48A416B8}">
+          <p14:sldIdLst>
+            <p14:sldId id="340"/>
           </p14:sldIdLst>
         </p14:section>
       </p14:sectionLst>
@@ -335,7 +363,7 @@
           <a:p>
             <a:fld id="{4AAD347D-5ACD-4C99-B74B-A9C85AD731AF}" type="datetimeFigureOut">
               <a:rPr lang="en-US" dirty="0"/>
-              <a:t>3/4/2018</a:t>
+              <a:t>3/5/2018</a:t>
             </a:fld>
             <a:endParaRPr lang="en-US" dirty="0"/>
           </a:p>
@@ -605,7 +633,7 @@
           <a:p>
             <a:fld id="{4509A250-FF31-4206-8172-F9D3106AACB1}" type="datetimeFigureOut">
               <a:rPr lang="en-US" dirty="0"/>
-              <a:t>3/4/2018</a:t>
+              <a:t>3/5/2018</a:t>
             </a:fld>
             <a:endParaRPr lang="en-US" dirty="0"/>
           </a:p>
@@ -794,7 +822,7 @@
           <a:p>
             <a:fld id="{4509A250-FF31-4206-8172-F9D3106AACB1}" type="datetimeFigureOut">
               <a:rPr lang="en-US" dirty="0"/>
-              <a:t>3/4/2018</a:t>
+              <a:t>3/5/2018</a:t>
             </a:fld>
             <a:endParaRPr lang="en-US" dirty="0"/>
           </a:p>
@@ -1062,7 +1090,7 @@
           <a:p>
             <a:fld id="{4509A250-FF31-4206-8172-F9D3106AACB1}" type="datetimeFigureOut">
               <a:rPr lang="en-US" dirty="0"/>
-              <a:t>3/4/2018</a:t>
+              <a:t>3/5/2018</a:t>
             </a:fld>
             <a:endParaRPr lang="en-US" dirty="0"/>
           </a:p>
@@ -1398,7 +1426,7 @@
           <a:p>
             <a:fld id="{4509A250-FF31-4206-8172-F9D3106AACB1}" type="datetimeFigureOut">
               <a:rPr lang="en-US" dirty="0"/>
-              <a:t>3/4/2018</a:t>
+              <a:t>3/5/2018</a:t>
             </a:fld>
             <a:endParaRPr lang="en-US" dirty="0"/>
           </a:p>
@@ -2016,7 +2044,7 @@
           <a:p>
             <a:fld id="{4509A250-FF31-4206-8172-F9D3106AACB1}" type="datetimeFigureOut">
               <a:rPr lang="en-US" dirty="0"/>
-              <a:t>3/4/2018</a:t>
+              <a:t>3/5/2018</a:t>
             </a:fld>
             <a:endParaRPr lang="en-US" dirty="0"/>
           </a:p>
@@ -2871,7 +2899,7 @@
           <a:p>
             <a:fld id="{4509A250-FF31-4206-8172-F9D3106AACB1}" type="datetimeFigureOut">
               <a:rPr lang="en-US" dirty="0"/>
-              <a:t>3/4/2018</a:t>
+              <a:t>3/5/2018</a:t>
             </a:fld>
             <a:endParaRPr lang="en-US" dirty="0"/>
           </a:p>
@@ -3036,7 +3064,7 @@
           <a:p>
             <a:fld id="{4509A250-FF31-4206-8172-F9D3106AACB1}" type="datetimeFigureOut">
               <a:rPr lang="en-US" dirty="0"/>
-              <a:t>3/4/2018</a:t>
+              <a:t>3/5/2018</a:t>
             </a:fld>
             <a:endParaRPr lang="en-US" dirty="0"/>
           </a:p>
@@ -3211,7 +3239,7 @@
           <a:p>
             <a:fld id="{4509A250-FF31-4206-8172-F9D3106AACB1}" type="datetimeFigureOut">
               <a:rPr lang="en-US" dirty="0"/>
-              <a:t>3/4/2018</a:t>
+              <a:t>3/5/2018</a:t>
             </a:fld>
             <a:endParaRPr lang="en-US" dirty="0"/>
           </a:p>
@@ -3376,7 +3404,7 @@
           <a:p>
             <a:fld id="{4509A250-FF31-4206-8172-F9D3106AACB1}" type="datetimeFigureOut">
               <a:rPr lang="en-US" dirty="0"/>
-              <a:t>3/4/2018</a:t>
+              <a:t>3/5/2018</a:t>
             </a:fld>
             <a:endParaRPr lang="en-US" dirty="0"/>
           </a:p>
@@ -3618,7 +3646,7 @@
           <a:p>
             <a:fld id="{9796027F-7875-4030-9381-8BD8C4F21935}" type="datetimeFigureOut">
               <a:rPr lang="en-US" dirty="0"/>
-              <a:t>3/4/2018</a:t>
+              <a:t>3/5/2018</a:t>
             </a:fld>
             <a:endParaRPr lang="en-US" dirty="0"/>
           </a:p>
@@ -3905,7 +3933,7 @@
           <a:p>
             <a:fld id="{9796027F-7875-4030-9381-8BD8C4F21935}" type="datetimeFigureOut">
               <a:rPr lang="en-US" dirty="0"/>
-              <a:t>3/4/2018</a:t>
+              <a:t>3/5/2018</a:t>
             </a:fld>
             <a:endParaRPr lang="en-US" dirty="0"/>
           </a:p>
@@ -4344,7 +4372,7 @@
           <a:p>
             <a:fld id="{9796027F-7875-4030-9381-8BD8C4F21935}" type="datetimeFigureOut">
               <a:rPr lang="en-US" dirty="0"/>
-              <a:t>3/4/2018</a:t>
+              <a:t>3/5/2018</a:t>
             </a:fld>
             <a:endParaRPr lang="en-US" dirty="0"/>
           </a:p>
@@ -4457,7 +4485,7 @@
           <a:p>
             <a:fld id="{4509A250-FF31-4206-8172-F9D3106AACB1}" type="datetimeFigureOut">
               <a:rPr lang="en-US" dirty="0"/>
-              <a:t>3/4/2018</a:t>
+              <a:t>3/5/2018</a:t>
             </a:fld>
             <a:endParaRPr lang="en-US" dirty="0"/>
           </a:p>
@@ -4547,7 +4575,7 @@
           <a:p>
             <a:fld id="{4509A250-FF31-4206-8172-F9D3106AACB1}" type="datetimeFigureOut">
               <a:rPr lang="en-US" dirty="0"/>
-              <a:t>3/4/2018</a:t>
+              <a:t>3/5/2018</a:t>
             </a:fld>
             <a:endParaRPr lang="en-US" dirty="0"/>
           </a:p>
@@ -4821,7 +4849,7 @@
           <a:p>
             <a:fld id="{4509A250-FF31-4206-8172-F9D3106AACB1}" type="datetimeFigureOut">
               <a:rPr lang="en-US" dirty="0"/>
-              <a:t>3/4/2018</a:t>
+              <a:t>3/5/2018</a:t>
             </a:fld>
             <a:endParaRPr lang="en-US" dirty="0"/>
           </a:p>
@@ -5091,7 +5119,7 @@
           <a:p>
             <a:fld id="{4509A250-FF31-4206-8172-F9D3106AACB1}" type="datetimeFigureOut">
               <a:rPr lang="en-US" dirty="0"/>
-              <a:t>3/4/2018</a:t>
+              <a:t>3/5/2018</a:t>
             </a:fld>
             <a:endParaRPr lang="en-US" dirty="0"/>
           </a:p>
@@ -5515,7 +5543,7 @@
           <a:p>
             <a:fld id="{4AAD347D-5ACD-4C99-B74B-A9C85AD731AF}" type="datetimeFigureOut">
               <a:rPr lang="en-US" dirty="0"/>
-              <a:t>3/4/2018</a:t>
+              <a:t>3/5/2018</a:t>
             </a:fld>
             <a:endParaRPr lang="en-US" dirty="0"/>
           </a:p>
@@ -6082,11 +6110,7 @@
           <a:p>
             <a:r>
               <a:rPr lang="en-GB" dirty="0" smtClean="0"/>
-              <a:t>Week </a:t>
-            </a:r>
-            <a:r>
-              <a:rPr lang="en-GB" dirty="0" smtClean="0"/>
-              <a:t>4: More LISTS, MORE STRINGS and MORE TESTING.</a:t>
+              <a:t>Week 4: More LISTS, MORE STRINGS and MORE TESTING.</a:t>
             </a:r>
             <a:endParaRPr lang="en-GB" dirty="0"/>
           </a:p>
@@ -6850,7 +6874,7 @@
           <a:p>
             <a:r>
               <a:rPr lang="en-GB" dirty="0" smtClean="0"/>
-              <a:t>How strings can be like lists.</a:t>
+              <a:t>Truth</a:t>
             </a:r>
             <a:endParaRPr lang="en-GB" dirty="0"/>
           </a:p>
@@ -6880,32 +6904,59 @@
           <a:p>
             <a:r>
               <a:rPr lang="en-GB" sz="1800" dirty="0" smtClean="0"/>
-              <a:t>You can use the same square brackets we have been using with lists to work with strings.</a:t>
+              <a:t>Python has the concept of things being </a:t>
+            </a:r>
+            <a:r>
+              <a:rPr lang="en-GB" sz="1800" u="sng" dirty="0" smtClean="0"/>
+              <a:t>True</a:t>
+            </a:r>
+            <a:r>
+              <a:rPr lang="en-GB" sz="1800" dirty="0" smtClean="0"/>
+              <a:t> or being </a:t>
+            </a:r>
+            <a:r>
+              <a:rPr lang="en-GB" sz="1800" u="sng" dirty="0" smtClean="0"/>
+              <a:t>False</a:t>
+            </a:r>
+            <a:r>
+              <a:rPr lang="en-GB" sz="1800" dirty="0" smtClean="0"/>
+              <a:t>.</a:t>
+            </a:r>
+          </a:p>
+          <a:p>
+            <a:r>
+              <a:rPr lang="en-GB" sz="1800" dirty="0" smtClean="0"/>
+              <a:t>You have already used this when using the </a:t>
+            </a:r>
+            <a:r>
+              <a:rPr lang="en-GB" sz="1800" u="sng" dirty="0" smtClean="0"/>
+              <a:t>if</a:t>
+            </a:r>
+            <a:r>
+              <a:rPr lang="en-GB" sz="1800" dirty="0" smtClean="0"/>
+              <a:t> statement, but without knowing it.</a:t>
+            </a:r>
+          </a:p>
+          <a:p>
+            <a:r>
+              <a:rPr lang="en-GB" sz="1600" dirty="0" smtClean="0"/>
+              <a:t>You can print tests with the == operator, or the &gt;= operator, or other tests of truth.</a:t>
             </a:r>
           </a:p>
           <a:p>
             <a:pPr lvl="1"/>
             <a:r>
-              <a:rPr lang="en-GB" sz="1600" dirty="0" smtClean="0"/>
-              <a:t>You can get individual characters.</a:t>
+              <a:rPr lang="en-GB" sz="1400" dirty="0" smtClean="0"/>
+              <a:t>If they are true, you will get True</a:t>
             </a:r>
           </a:p>
           <a:p>
             <a:pPr lvl="1"/>
             <a:r>
-              <a:rPr lang="en-GB" sz="1600" dirty="0" smtClean="0"/>
-              <a:t>Or you can use slices !</a:t>
-            </a:r>
-          </a:p>
-          <a:p>
-            <a:endParaRPr lang="en-GB" sz="1800" dirty="0"/>
-          </a:p>
-          <a:p>
-            <a:r>
-              <a:rPr lang="en-GB" sz="1800" dirty="0" smtClean="0"/>
-              <a:t>Although you haven't done this before, see if you can work out what this program will do ?</a:t>
-            </a:r>
-            <a:endParaRPr lang="en-GB" sz="1600" dirty="0"/>
+              <a:rPr lang="en-GB" sz="1400" dirty="0" smtClean="0"/>
+              <a:t>If they are false, you will get False</a:t>
+            </a:r>
+            <a:endParaRPr lang="en-GB" sz="1400" dirty="0"/>
           </a:p>
           <a:p>
             <a:endParaRPr lang="en-GB" dirty="0" smtClean="0"/>
@@ -6999,7 +7050,7 @@
                 <a:latin typeface="Courier New" panose="02070309020205020404" pitchFamily="49" charset="0"/>
                 <a:cs typeface="Courier New" panose="02070309020205020404" pitchFamily="49" charset="0"/>
               </a:rPr>
-              <a:t>Week4, Program8</a:t>
+              <a:t>Week4, Program9</a:t>
             </a:r>
           </a:p>
           <a:p>
@@ -7014,7 +7065,34 @@
                 <a:latin typeface="Courier New" panose="02070309020205020404" pitchFamily="49" charset="0"/>
                 <a:cs typeface="Courier New" panose="02070309020205020404" pitchFamily="49" charset="0"/>
               </a:rPr>
-              <a:t>s = "The quick brown fox jumps over the lazy dog"</a:t>
+              <a:t>a = "Hello"</a:t>
+            </a:r>
+          </a:p>
+          <a:p>
+            <a:r>
+              <a:rPr lang="en-GB" sz="1200" dirty="0">
+                <a:latin typeface="Courier New" panose="02070309020205020404" pitchFamily="49" charset="0"/>
+                <a:cs typeface="Courier New" panose="02070309020205020404" pitchFamily="49" charset="0"/>
+              </a:rPr>
+              <a:t>b = "Hello"</a:t>
+            </a:r>
+          </a:p>
+          <a:p>
+            <a:r>
+              <a:rPr lang="en-GB" sz="1200" dirty="0">
+                <a:latin typeface="Courier New" panose="02070309020205020404" pitchFamily="49" charset="0"/>
+                <a:cs typeface="Courier New" panose="02070309020205020404" pitchFamily="49" charset="0"/>
+              </a:rPr>
+              <a:t>c = "World"</a:t>
+            </a:r>
+          </a:p>
+          <a:p>
+            <a:r>
+              <a:rPr lang="en-GB" sz="1200" dirty="0">
+                <a:latin typeface="Courier New" panose="02070309020205020404" pitchFamily="49" charset="0"/>
+                <a:cs typeface="Courier New" panose="02070309020205020404" pitchFamily="49" charset="0"/>
+              </a:rPr>
+              <a:t>d = "World"</a:t>
             </a:r>
           </a:p>
           <a:p>
@@ -7029,7 +7107,7 @@
                 <a:latin typeface="Courier New" panose="02070309020205020404" pitchFamily="49" charset="0"/>
                 <a:cs typeface="Courier New" panose="02070309020205020404" pitchFamily="49" charset="0"/>
               </a:rPr>
-              <a:t>print(s[2])</a:t>
+              <a:t>print(a == b)</a:t>
             </a:r>
           </a:p>
           <a:p>
@@ -7038,7 +7116,7 @@
                 <a:latin typeface="Courier New" panose="02070309020205020404" pitchFamily="49" charset="0"/>
                 <a:cs typeface="Courier New" panose="02070309020205020404" pitchFamily="49" charset="0"/>
               </a:rPr>
-              <a:t>print(s[4:9])</a:t>
+              <a:t>print(a == c)</a:t>
             </a:r>
           </a:p>
           <a:p>
@@ -7047,7 +7125,7 @@
                 <a:latin typeface="Courier New" panose="02070309020205020404" pitchFamily="49" charset="0"/>
                 <a:cs typeface="Courier New" panose="02070309020205020404" pitchFamily="49" charset="0"/>
               </a:rPr>
-              <a:t>print(s[10:15])</a:t>
+              <a:t>print(b == d)</a:t>
             </a:r>
           </a:p>
           <a:p>
@@ -7056,7 +7134,7 @@
                 <a:latin typeface="Courier New" panose="02070309020205020404" pitchFamily="49" charset="0"/>
                 <a:cs typeface="Courier New" panose="02070309020205020404" pitchFamily="49" charset="0"/>
               </a:rPr>
-              <a:t>print(s[:-3])</a:t>
+              <a:t>print(b == a)</a:t>
             </a:r>
           </a:p>
           <a:p>
@@ -7065,16 +7143,7 @@
                 <a:latin typeface="Courier New" panose="02070309020205020404" pitchFamily="49" charset="0"/>
                 <a:cs typeface="Courier New" panose="02070309020205020404" pitchFamily="49" charset="0"/>
               </a:rPr>
-              <a:t>print(s[-3:])</a:t>
-            </a:r>
-          </a:p>
-          <a:p>
-            <a:r>
-              <a:rPr lang="en-GB" sz="1200" dirty="0">
-                <a:latin typeface="Courier New" panose="02070309020205020404" pitchFamily="49" charset="0"/>
-                <a:cs typeface="Courier New" panose="02070309020205020404" pitchFamily="49" charset="0"/>
-              </a:rPr>
-              <a:t>print(s[16:25])</a:t>
+              <a:t>print(d == c)</a:t>
             </a:r>
           </a:p>
           <a:p>
@@ -7089,7 +7158,7 @@
                 <a:latin typeface="Courier New" panose="02070309020205020404" pitchFamily="49" charset="0"/>
                 <a:cs typeface="Courier New" panose="02070309020205020404" pitchFamily="49" charset="0"/>
               </a:rPr>
-              <a:t>print("")</a:t>
+              <a:t>e = a + b</a:t>
             </a:r>
           </a:p>
           <a:p>
@@ -7098,7 +7167,7 @@
                 <a:latin typeface="Courier New" panose="02070309020205020404" pitchFamily="49" charset="0"/>
                 <a:cs typeface="Courier New" panose="02070309020205020404" pitchFamily="49" charset="0"/>
               </a:rPr>
-              <a:t>print("These are a bit more strange !")</a:t>
+              <a:t>print(a + b == e)</a:t>
             </a:r>
           </a:p>
           <a:p>
@@ -7107,7 +7176,7 @@
                 <a:latin typeface="Courier New" panose="02070309020205020404" pitchFamily="49" charset="0"/>
                 <a:cs typeface="Courier New" panose="02070309020205020404" pitchFamily="49" charset="0"/>
               </a:rPr>
-              <a:t>print("==============================")</a:t>
+              <a:t>print(b + a == a + b)</a:t>
             </a:r>
           </a:p>
           <a:p>
@@ -7116,7 +7185,7 @@
                 <a:latin typeface="Courier New" panose="02070309020205020404" pitchFamily="49" charset="0"/>
                 <a:cs typeface="Courier New" panose="02070309020205020404" pitchFamily="49" charset="0"/>
               </a:rPr>
-              <a:t>print("")</a:t>
+              <a:t>print(a == e)</a:t>
             </a:r>
           </a:p>
           <a:p>
@@ -7126,24 +7195,6 @@
             </a:endParaRPr>
           </a:p>
           <a:p>
-            <a:r>
-              <a:rPr lang="en-GB" sz="1200" dirty="0">
-                <a:latin typeface="Courier New" panose="02070309020205020404" pitchFamily="49" charset="0"/>
-                <a:cs typeface="Courier New" panose="02070309020205020404" pitchFamily="49" charset="0"/>
-              </a:rPr>
-              <a:t>print(s[::-1])</a:t>
-            </a:r>
-          </a:p>
-          <a:p>
-            <a:r>
-              <a:rPr lang="en-GB" sz="1200" dirty="0">
-                <a:latin typeface="Courier New" panose="02070309020205020404" pitchFamily="49" charset="0"/>
-                <a:cs typeface="Courier New" panose="02070309020205020404" pitchFamily="49" charset="0"/>
-              </a:rPr>
-              <a:t>print(s[::2])</a:t>
-            </a:r>
-          </a:p>
-          <a:p>
             <a:endParaRPr lang="en-GB" sz="1200" dirty="0">
               <a:latin typeface="Courier New" panose="02070309020205020404" pitchFamily="49" charset="0"/>
               <a:cs typeface="Courier New" panose="02070309020205020404" pitchFamily="49" charset="0"/>
@@ -7161,6 +7212,2333 @@
     <p:extLst>
       <p:ext uri="{BB962C8B-B14F-4D97-AF65-F5344CB8AC3E}">
         <p14:creationId xmlns:p14="http://schemas.microsoft.com/office/powerpoint/2010/main" val="3133785672"/>
+      </p:ext>
+    </p:extLst>
+  </p:cSld>
+  <p:clrMapOvr>
+    <a:masterClrMapping/>
+  </p:clrMapOvr>
+  <p:timing>
+    <p:tnLst>
+      <p:par>
+        <p:cTn id="1" dur="indefinite" restart="never" nodeType="tmRoot"/>
+      </p:par>
+    </p:tnLst>
+  </p:timing>
+</p:sld>
+</file>
+
+<file path=ppt/slides/slide14.xml><?xml version="1.0" encoding="utf-8"?>
+<p:sld xmlns:a="http://schemas.openxmlformats.org/drawingml/2006/main" xmlns:r="http://schemas.openxmlformats.org/officeDocument/2006/relationships" xmlns:p="http://schemas.openxmlformats.org/presentationml/2006/main">
+  <p:cSld>
+    <p:spTree>
+      <p:nvGrpSpPr>
+        <p:cNvPr id="1" name=""/>
+        <p:cNvGrpSpPr/>
+        <p:nvPr/>
+      </p:nvGrpSpPr>
+      <p:grpSpPr>
+        <a:xfrm>
+          <a:off x="0" y="0"/>
+          <a:ext cx="0" cy="0"/>
+          <a:chOff x="0" y="0"/>
+          <a:chExt cx="0" cy="0"/>
+        </a:xfrm>
+      </p:grpSpPr>
+      <p:sp>
+        <p:nvSpPr>
+          <p:cNvPr id="2" name="Title 1"/>
+          <p:cNvSpPr>
+            <a:spLocks noGrp="1"/>
+          </p:cNvSpPr>
+          <p:nvPr>
+            <p:ph type="title"/>
+          </p:nvPr>
+        </p:nvSpPr>
+        <p:spPr/>
+        <p:txBody>
+          <a:bodyPr/>
+          <a:lstStyle/>
+          <a:p>
+            <a:r>
+              <a:rPr lang="en-GB" dirty="0" smtClean="0"/>
+              <a:t>Testing for inequality.</a:t>
+            </a:r>
+            <a:endParaRPr lang="en-GB" dirty="0"/>
+          </a:p>
+        </p:txBody>
+      </p:sp>
+      <p:sp>
+        <p:nvSpPr>
+          <p:cNvPr id="4" name="Content Placeholder 2"/>
+          <p:cNvSpPr>
+            <a:spLocks noGrp="1"/>
+          </p:cNvSpPr>
+          <p:nvPr>
+            <p:ph idx="1"/>
+          </p:nvPr>
+        </p:nvSpPr>
+        <p:spPr>
+          <a:xfrm>
+            <a:off x="646111" y="2052919"/>
+            <a:ext cx="5619222" cy="2646082"/>
+          </a:xfrm>
+        </p:spPr>
+        <p:txBody>
+          <a:bodyPr>
+            <a:normAutofit/>
+          </a:bodyPr>
+          <a:lstStyle/>
+          <a:p>
+            <a:r>
+              <a:rPr lang="en-GB" dirty="0" smtClean="0"/>
+              <a:t>You can use </a:t>
+            </a:r>
+            <a:r>
+              <a:rPr lang="en-GB" u="sng" dirty="0" smtClean="0"/>
+              <a:t>==</a:t>
+            </a:r>
+            <a:r>
+              <a:rPr lang="en-GB" dirty="0" smtClean="0"/>
+              <a:t> to test for equality.</a:t>
+            </a:r>
+          </a:p>
+          <a:p>
+            <a:endParaRPr lang="en-GB" dirty="0" smtClean="0"/>
+          </a:p>
+          <a:p>
+            <a:r>
+              <a:rPr lang="en-GB" dirty="0" smtClean="0"/>
+              <a:t>You can also use </a:t>
+            </a:r>
+            <a:r>
+              <a:rPr lang="en-GB" u="sng" dirty="0" smtClean="0"/>
+              <a:t>!=</a:t>
+            </a:r>
+            <a:r>
+              <a:rPr lang="en-GB" dirty="0" smtClean="0"/>
+              <a:t> to test for inequality.</a:t>
+            </a:r>
+          </a:p>
+          <a:p>
+            <a:endParaRPr lang="en-GB" dirty="0" smtClean="0"/>
+          </a:p>
+          <a:p>
+            <a:endParaRPr lang="en-GB" dirty="0"/>
+          </a:p>
+        </p:txBody>
+      </p:sp>
+      <p:sp>
+        <p:nvSpPr>
+          <p:cNvPr id="6" name="Rectangle 5"/>
+          <p:cNvSpPr/>
+          <p:nvPr/>
+        </p:nvSpPr>
+        <p:spPr>
+          <a:xfrm>
+            <a:off x="646111" y="5906550"/>
+            <a:ext cx="5619222" cy="646331"/>
+          </a:xfrm>
+          <a:prstGeom prst="rect">
+            <a:avLst/>
+          </a:prstGeom>
+        </p:spPr>
+        <p:txBody>
+          <a:bodyPr wrap="square">
+            <a:spAutoFit/>
+          </a:bodyPr>
+          <a:lstStyle/>
+          <a:p>
+            <a:pPr marL="285750" indent="-285750">
+              <a:buFont typeface="Arial" panose="020B0604020202020204" pitchFamily="34" charset="0"/>
+              <a:buChar char="•"/>
+            </a:pPr>
+            <a:r>
+              <a:rPr lang="en-GB" dirty="0">
+                <a:solidFill>
+                  <a:srgbClr val="FFFF00"/>
+                </a:solidFill>
+              </a:rPr>
+              <a:t>What do you think this program will do ?</a:t>
+            </a:r>
+          </a:p>
+          <a:p>
+            <a:pPr marL="285750" indent="-285750">
+              <a:buFont typeface="Arial" panose="020B0604020202020204" pitchFamily="34" charset="0"/>
+              <a:buChar char="•"/>
+            </a:pPr>
+            <a:r>
+              <a:rPr lang="en-GB" dirty="0">
+                <a:solidFill>
+                  <a:srgbClr val="FFFF00"/>
+                </a:solidFill>
+              </a:rPr>
+              <a:t>Type it in and see if you are correct.</a:t>
+            </a:r>
+            <a:endParaRPr lang="en-GB" dirty="0"/>
+          </a:p>
+        </p:txBody>
+      </p:sp>
+      <p:sp>
+        <p:nvSpPr>
+          <p:cNvPr id="3" name="Rectangle 2"/>
+          <p:cNvSpPr/>
+          <p:nvPr/>
+        </p:nvSpPr>
+        <p:spPr>
+          <a:xfrm>
+            <a:off x="6468533" y="2052919"/>
+            <a:ext cx="5359400" cy="4339650"/>
+          </a:xfrm>
+          <a:prstGeom prst="rect">
+            <a:avLst/>
+          </a:prstGeom>
+        </p:spPr>
+        <p:txBody>
+          <a:bodyPr wrap="square">
+            <a:spAutoFit/>
+          </a:bodyPr>
+          <a:lstStyle/>
+          <a:p>
+            <a:r>
+              <a:rPr lang="en-GB" sz="1200" dirty="0" smtClean="0">
+                <a:latin typeface="Courier New" panose="02070309020205020404" pitchFamily="49" charset="0"/>
+                <a:cs typeface="Courier New" panose="02070309020205020404" pitchFamily="49" charset="0"/>
+              </a:rPr>
+              <a:t># </a:t>
+            </a:r>
+            <a:r>
+              <a:rPr lang="en-GB" sz="1200" dirty="0">
+                <a:latin typeface="Courier New" panose="02070309020205020404" pitchFamily="49" charset="0"/>
+                <a:cs typeface="Courier New" panose="02070309020205020404" pitchFamily="49" charset="0"/>
+              </a:rPr>
+              <a:t>Week4, Program10</a:t>
+            </a:r>
+          </a:p>
+          <a:p>
+            <a:endParaRPr lang="en-GB" sz="1200" dirty="0">
+              <a:latin typeface="Courier New" panose="02070309020205020404" pitchFamily="49" charset="0"/>
+              <a:cs typeface="Courier New" panose="02070309020205020404" pitchFamily="49" charset="0"/>
+            </a:endParaRPr>
+          </a:p>
+          <a:p>
+            <a:r>
+              <a:rPr lang="en-GB" sz="1200" dirty="0">
+                <a:latin typeface="Courier New" panose="02070309020205020404" pitchFamily="49" charset="0"/>
+                <a:cs typeface="Courier New" panose="02070309020205020404" pitchFamily="49" charset="0"/>
+              </a:rPr>
+              <a:t>a = "Hello"</a:t>
+            </a:r>
+          </a:p>
+          <a:p>
+            <a:r>
+              <a:rPr lang="en-GB" sz="1200" dirty="0">
+                <a:latin typeface="Courier New" panose="02070309020205020404" pitchFamily="49" charset="0"/>
+                <a:cs typeface="Courier New" panose="02070309020205020404" pitchFamily="49" charset="0"/>
+              </a:rPr>
+              <a:t>b = "Hello"</a:t>
+            </a:r>
+          </a:p>
+          <a:p>
+            <a:r>
+              <a:rPr lang="en-GB" sz="1200" dirty="0">
+                <a:latin typeface="Courier New" panose="02070309020205020404" pitchFamily="49" charset="0"/>
+                <a:cs typeface="Courier New" panose="02070309020205020404" pitchFamily="49" charset="0"/>
+              </a:rPr>
+              <a:t>c = "World"</a:t>
+            </a:r>
+          </a:p>
+          <a:p>
+            <a:r>
+              <a:rPr lang="en-GB" sz="1200" dirty="0">
+                <a:latin typeface="Courier New" panose="02070309020205020404" pitchFamily="49" charset="0"/>
+                <a:cs typeface="Courier New" panose="02070309020205020404" pitchFamily="49" charset="0"/>
+              </a:rPr>
+              <a:t>d = "World"</a:t>
+            </a:r>
+          </a:p>
+          <a:p>
+            <a:endParaRPr lang="en-GB" sz="1200" dirty="0">
+              <a:latin typeface="Courier New" panose="02070309020205020404" pitchFamily="49" charset="0"/>
+              <a:cs typeface="Courier New" panose="02070309020205020404" pitchFamily="49" charset="0"/>
+            </a:endParaRPr>
+          </a:p>
+          <a:p>
+            <a:r>
+              <a:rPr lang="en-GB" sz="1200" dirty="0">
+                <a:latin typeface="Courier New" panose="02070309020205020404" pitchFamily="49" charset="0"/>
+                <a:cs typeface="Courier New" panose="02070309020205020404" pitchFamily="49" charset="0"/>
+              </a:rPr>
+              <a:t>print (a != c)</a:t>
+            </a:r>
+          </a:p>
+          <a:p>
+            <a:r>
+              <a:rPr lang="en-GB" sz="1200" dirty="0">
+                <a:latin typeface="Courier New" panose="02070309020205020404" pitchFamily="49" charset="0"/>
+                <a:cs typeface="Courier New" panose="02070309020205020404" pitchFamily="49" charset="0"/>
+              </a:rPr>
+              <a:t>print (a != b)</a:t>
+            </a:r>
+          </a:p>
+          <a:p>
+            <a:r>
+              <a:rPr lang="en-GB" sz="1200" dirty="0">
+                <a:latin typeface="Courier New" panose="02070309020205020404" pitchFamily="49" charset="0"/>
+                <a:cs typeface="Courier New" panose="02070309020205020404" pitchFamily="49" charset="0"/>
+              </a:rPr>
+              <a:t>print (a != d)</a:t>
+            </a:r>
+          </a:p>
+          <a:p>
+            <a:r>
+              <a:rPr lang="en-GB" sz="1200" dirty="0">
+                <a:latin typeface="Courier New" panose="02070309020205020404" pitchFamily="49" charset="0"/>
+                <a:cs typeface="Courier New" panose="02070309020205020404" pitchFamily="49" charset="0"/>
+              </a:rPr>
+              <a:t>print (a + b != b + a)</a:t>
+            </a:r>
+          </a:p>
+          <a:p>
+            <a:r>
+              <a:rPr lang="en-GB" sz="1200" dirty="0">
+                <a:latin typeface="Courier New" panose="02070309020205020404" pitchFamily="49" charset="0"/>
+                <a:cs typeface="Courier New" panose="02070309020205020404" pitchFamily="49" charset="0"/>
+              </a:rPr>
+              <a:t>print (a != "Hello")</a:t>
+            </a:r>
+          </a:p>
+          <a:p>
+            <a:r>
+              <a:rPr lang="en-GB" sz="1200" dirty="0">
+                <a:latin typeface="Courier New" panose="02070309020205020404" pitchFamily="49" charset="0"/>
+                <a:cs typeface="Courier New" panose="02070309020205020404" pitchFamily="49" charset="0"/>
+              </a:rPr>
+              <a:t>print (a + a != "World")</a:t>
+            </a:r>
+          </a:p>
+          <a:p>
+            <a:r>
+              <a:rPr lang="en-GB" sz="1200" dirty="0">
+                <a:latin typeface="Courier New" panose="02070309020205020404" pitchFamily="49" charset="0"/>
+                <a:cs typeface="Courier New" panose="02070309020205020404" pitchFamily="49" charset="0"/>
+              </a:rPr>
+              <a:t>print (a + a != "</a:t>
+            </a:r>
+            <a:r>
+              <a:rPr lang="en-GB" sz="1200" dirty="0" err="1">
+                <a:latin typeface="Courier New" panose="02070309020205020404" pitchFamily="49" charset="0"/>
+                <a:cs typeface="Courier New" panose="02070309020205020404" pitchFamily="49" charset="0"/>
+              </a:rPr>
+              <a:t>HelloHello</a:t>
+            </a:r>
+            <a:r>
+              <a:rPr lang="en-GB" sz="1200" dirty="0">
+                <a:latin typeface="Courier New" panose="02070309020205020404" pitchFamily="49" charset="0"/>
+                <a:cs typeface="Courier New" panose="02070309020205020404" pitchFamily="49" charset="0"/>
+              </a:rPr>
+              <a:t>")</a:t>
+            </a:r>
+          </a:p>
+          <a:p>
+            <a:r>
+              <a:rPr lang="en-GB" sz="1200" dirty="0">
+                <a:latin typeface="Courier New" panose="02070309020205020404" pitchFamily="49" charset="0"/>
+                <a:cs typeface="Courier New" panose="02070309020205020404" pitchFamily="49" charset="0"/>
+              </a:rPr>
+              <a:t>print (a + a + a != "</a:t>
+            </a:r>
+            <a:r>
+              <a:rPr lang="en-GB" sz="1200" dirty="0" err="1">
+                <a:latin typeface="Courier New" panose="02070309020205020404" pitchFamily="49" charset="0"/>
+                <a:cs typeface="Courier New" panose="02070309020205020404" pitchFamily="49" charset="0"/>
+              </a:rPr>
+              <a:t>HelloHelloHello</a:t>
+            </a:r>
+            <a:r>
+              <a:rPr lang="en-GB" sz="1200" dirty="0">
+                <a:latin typeface="Courier New" panose="02070309020205020404" pitchFamily="49" charset="0"/>
+                <a:cs typeface="Courier New" panose="02070309020205020404" pitchFamily="49" charset="0"/>
+              </a:rPr>
+              <a:t>")</a:t>
+            </a:r>
+          </a:p>
+          <a:p>
+            <a:endParaRPr lang="en-GB" sz="1200" dirty="0">
+              <a:latin typeface="Courier New" panose="02070309020205020404" pitchFamily="49" charset="0"/>
+              <a:cs typeface="Courier New" panose="02070309020205020404" pitchFamily="49" charset="0"/>
+            </a:endParaRPr>
+          </a:p>
+          <a:p>
+            <a:r>
+              <a:rPr lang="en-GB" sz="1200" dirty="0">
+                <a:latin typeface="Courier New" panose="02070309020205020404" pitchFamily="49" charset="0"/>
+                <a:cs typeface="Courier New" panose="02070309020205020404" pitchFamily="49" charset="0"/>
+              </a:rPr>
+              <a:t># Extra Credit</a:t>
+            </a:r>
+          </a:p>
+          <a:p>
+            <a:r>
+              <a:rPr lang="en-GB" sz="1200" dirty="0">
+                <a:latin typeface="Courier New" panose="02070309020205020404" pitchFamily="49" charset="0"/>
+                <a:cs typeface="Courier New" panose="02070309020205020404" pitchFamily="49" charset="0"/>
+              </a:rPr>
+              <a:t># You haven't been taught this, but can you guess if it is True or False ?</a:t>
+            </a:r>
+          </a:p>
+          <a:p>
+            <a:r>
+              <a:rPr lang="en-GB" sz="1200" dirty="0">
+                <a:latin typeface="Courier New" panose="02070309020205020404" pitchFamily="49" charset="0"/>
+                <a:cs typeface="Courier New" panose="02070309020205020404" pitchFamily="49" charset="0"/>
+              </a:rPr>
+              <a:t>print (a * 2 != "</a:t>
+            </a:r>
+            <a:r>
+              <a:rPr lang="en-GB" sz="1200" dirty="0" err="1">
+                <a:latin typeface="Courier New" panose="02070309020205020404" pitchFamily="49" charset="0"/>
+                <a:cs typeface="Courier New" panose="02070309020205020404" pitchFamily="49" charset="0"/>
+              </a:rPr>
+              <a:t>HelloHello</a:t>
+            </a:r>
+            <a:r>
+              <a:rPr lang="en-GB" sz="1200" dirty="0">
+                <a:latin typeface="Courier New" panose="02070309020205020404" pitchFamily="49" charset="0"/>
+                <a:cs typeface="Courier New" panose="02070309020205020404" pitchFamily="49" charset="0"/>
+              </a:rPr>
+              <a:t>")</a:t>
+            </a:r>
+          </a:p>
+          <a:p>
+            <a:endParaRPr lang="en-GB" sz="1200" dirty="0">
+              <a:latin typeface="Courier New" panose="02070309020205020404" pitchFamily="49" charset="0"/>
+              <a:cs typeface="Courier New" panose="02070309020205020404" pitchFamily="49" charset="0"/>
+            </a:endParaRPr>
+          </a:p>
+          <a:p>
+            <a:endParaRPr lang="en-GB" sz="1200" dirty="0">
+              <a:latin typeface="Courier New" panose="02070309020205020404" pitchFamily="49" charset="0"/>
+              <a:cs typeface="Courier New" panose="02070309020205020404" pitchFamily="49" charset="0"/>
+            </a:endParaRPr>
+          </a:p>
+          <a:p>
+            <a:endParaRPr lang="en-GB" sz="1200" dirty="0">
+              <a:latin typeface="Courier New" panose="02070309020205020404" pitchFamily="49" charset="0"/>
+              <a:cs typeface="Courier New" panose="02070309020205020404" pitchFamily="49" charset="0"/>
+            </a:endParaRPr>
+          </a:p>
+        </p:txBody>
+      </p:sp>
+    </p:spTree>
+    <p:extLst>
+      <p:ext uri="{BB962C8B-B14F-4D97-AF65-F5344CB8AC3E}">
+        <p14:creationId xmlns:p14="http://schemas.microsoft.com/office/powerpoint/2010/main" val="554906119"/>
+      </p:ext>
+    </p:extLst>
+  </p:cSld>
+  <p:clrMapOvr>
+    <a:masterClrMapping/>
+  </p:clrMapOvr>
+  <p:timing>
+    <p:tnLst>
+      <p:par>
+        <p:cTn id="1" dur="indefinite" restart="never" nodeType="tmRoot"/>
+      </p:par>
+    </p:tnLst>
+  </p:timing>
+</p:sld>
+</file>
+
+<file path=ppt/slides/slide15.xml><?xml version="1.0" encoding="utf-8"?>
+<p:sld xmlns:a="http://schemas.openxmlformats.org/drawingml/2006/main" xmlns:r="http://schemas.openxmlformats.org/officeDocument/2006/relationships" xmlns:p="http://schemas.openxmlformats.org/presentationml/2006/main">
+  <p:cSld>
+    <p:spTree>
+      <p:nvGrpSpPr>
+        <p:cNvPr id="1" name=""/>
+        <p:cNvGrpSpPr/>
+        <p:nvPr/>
+      </p:nvGrpSpPr>
+      <p:grpSpPr>
+        <a:xfrm>
+          <a:off x="0" y="0"/>
+          <a:ext cx="0" cy="0"/>
+          <a:chOff x="0" y="0"/>
+          <a:chExt cx="0" cy="0"/>
+        </a:xfrm>
+      </p:grpSpPr>
+      <p:sp>
+        <p:nvSpPr>
+          <p:cNvPr id="2" name="Title 1"/>
+          <p:cNvSpPr>
+            <a:spLocks noGrp="1"/>
+          </p:cNvSpPr>
+          <p:nvPr>
+            <p:ph type="title"/>
+          </p:nvPr>
+        </p:nvSpPr>
+        <p:spPr/>
+        <p:txBody>
+          <a:bodyPr/>
+          <a:lstStyle/>
+          <a:p>
+            <a:r>
+              <a:rPr lang="en-GB" dirty="0" smtClean="0"/>
+              <a:t>Testing with "</a:t>
+            </a:r>
+            <a:r>
+              <a:rPr lang="en-GB" u="sng" dirty="0" smtClean="0"/>
+              <a:t>or</a:t>
+            </a:r>
+            <a:r>
+              <a:rPr lang="en-GB" dirty="0" smtClean="0"/>
+              <a:t>" on Multiple Things</a:t>
+            </a:r>
+            <a:endParaRPr lang="en-GB" dirty="0"/>
+          </a:p>
+        </p:txBody>
+      </p:sp>
+      <p:sp>
+        <p:nvSpPr>
+          <p:cNvPr id="4" name="Content Placeholder 2"/>
+          <p:cNvSpPr>
+            <a:spLocks noGrp="1"/>
+          </p:cNvSpPr>
+          <p:nvPr>
+            <p:ph idx="1"/>
+          </p:nvPr>
+        </p:nvSpPr>
+        <p:spPr>
+          <a:xfrm>
+            <a:off x="646111" y="2052918"/>
+            <a:ext cx="4840289" cy="3853631"/>
+          </a:xfrm>
+        </p:spPr>
+        <p:txBody>
+          <a:bodyPr>
+            <a:normAutofit/>
+          </a:bodyPr>
+          <a:lstStyle/>
+          <a:p>
+            <a:r>
+              <a:rPr lang="en-GB" dirty="0" smtClean="0"/>
+              <a:t>You can use the </a:t>
+            </a:r>
+            <a:r>
+              <a:rPr lang="en-GB" u="sng" dirty="0" smtClean="0"/>
+              <a:t>or</a:t>
+            </a:r>
+            <a:r>
+              <a:rPr lang="en-GB" dirty="0" smtClean="0"/>
+              <a:t> statement to check the truth on multiple conditions.</a:t>
+            </a:r>
+          </a:p>
+          <a:p>
+            <a:r>
+              <a:rPr lang="en-GB" dirty="0" smtClean="0"/>
+              <a:t>If you have a test for truth that is </a:t>
+            </a:r>
+          </a:p>
+          <a:p>
+            <a:pPr lvl="1"/>
+            <a:r>
+              <a:rPr lang="en-GB" u="sng" dirty="0" smtClean="0">
+                <a:latin typeface="Courier New" panose="02070309020205020404" pitchFamily="49" charset="0"/>
+                <a:cs typeface="Courier New" panose="02070309020205020404" pitchFamily="49" charset="0"/>
+              </a:rPr>
+              <a:t>a or b</a:t>
+            </a:r>
+          </a:p>
+          <a:p>
+            <a:pPr lvl="1"/>
+            <a:r>
+              <a:rPr lang="en-GB" dirty="0"/>
+              <a:t>This will return True if :-</a:t>
+            </a:r>
+          </a:p>
+          <a:p>
+            <a:pPr lvl="2"/>
+            <a:r>
+              <a:rPr lang="en-GB" dirty="0"/>
+              <a:t>a is </a:t>
+            </a:r>
+            <a:r>
+              <a:rPr lang="en-GB" dirty="0" smtClean="0"/>
+              <a:t>True</a:t>
+            </a:r>
+            <a:endParaRPr lang="en-GB" dirty="0"/>
+          </a:p>
+          <a:p>
+            <a:pPr lvl="2"/>
+            <a:r>
+              <a:rPr lang="en-GB" dirty="0"/>
+              <a:t>b is </a:t>
+            </a:r>
+            <a:r>
+              <a:rPr lang="en-GB" dirty="0" smtClean="0"/>
+              <a:t>True</a:t>
+            </a:r>
+            <a:endParaRPr lang="en-GB" dirty="0"/>
+          </a:p>
+          <a:p>
+            <a:pPr lvl="2"/>
+            <a:r>
+              <a:rPr lang="en-GB" dirty="0"/>
+              <a:t>Both are </a:t>
+            </a:r>
+            <a:r>
+              <a:rPr lang="en-GB" dirty="0" smtClean="0"/>
+              <a:t>True</a:t>
+            </a:r>
+            <a:endParaRPr lang="en-GB" dirty="0"/>
+          </a:p>
+          <a:p>
+            <a:endParaRPr lang="en-GB" dirty="0" smtClean="0"/>
+          </a:p>
+          <a:p>
+            <a:endParaRPr lang="en-GB" dirty="0"/>
+          </a:p>
+        </p:txBody>
+      </p:sp>
+      <p:sp>
+        <p:nvSpPr>
+          <p:cNvPr id="6" name="Rectangle 5"/>
+          <p:cNvSpPr/>
+          <p:nvPr/>
+        </p:nvSpPr>
+        <p:spPr>
+          <a:xfrm>
+            <a:off x="646111" y="5906550"/>
+            <a:ext cx="5619222" cy="646331"/>
+          </a:xfrm>
+          <a:prstGeom prst="rect">
+            <a:avLst/>
+          </a:prstGeom>
+        </p:spPr>
+        <p:txBody>
+          <a:bodyPr wrap="square">
+            <a:spAutoFit/>
+          </a:bodyPr>
+          <a:lstStyle/>
+          <a:p>
+            <a:pPr marL="285750" indent="-285750">
+              <a:buFont typeface="Arial" panose="020B0604020202020204" pitchFamily="34" charset="0"/>
+              <a:buChar char="•"/>
+            </a:pPr>
+            <a:r>
+              <a:rPr lang="en-GB" dirty="0">
+                <a:solidFill>
+                  <a:srgbClr val="FFFF00"/>
+                </a:solidFill>
+              </a:rPr>
+              <a:t>What do you think this program will do ?</a:t>
+            </a:r>
+          </a:p>
+          <a:p>
+            <a:pPr marL="285750" indent="-285750">
+              <a:buFont typeface="Arial" panose="020B0604020202020204" pitchFamily="34" charset="0"/>
+              <a:buChar char="•"/>
+            </a:pPr>
+            <a:r>
+              <a:rPr lang="en-GB" dirty="0">
+                <a:solidFill>
+                  <a:srgbClr val="FFFF00"/>
+                </a:solidFill>
+              </a:rPr>
+              <a:t>Type it in and see if you are correct.</a:t>
+            </a:r>
+            <a:endParaRPr lang="en-GB" dirty="0"/>
+          </a:p>
+        </p:txBody>
+      </p:sp>
+      <p:sp>
+        <p:nvSpPr>
+          <p:cNvPr id="3" name="Rectangle 2"/>
+          <p:cNvSpPr/>
+          <p:nvPr/>
+        </p:nvSpPr>
+        <p:spPr>
+          <a:xfrm>
+            <a:off x="5614587" y="2052919"/>
+            <a:ext cx="6213346" cy="646331"/>
+          </a:xfrm>
+          <a:prstGeom prst="rect">
+            <a:avLst/>
+          </a:prstGeom>
+        </p:spPr>
+        <p:txBody>
+          <a:bodyPr wrap="square">
+            <a:spAutoFit/>
+          </a:bodyPr>
+          <a:lstStyle/>
+          <a:p>
+            <a:endParaRPr lang="en-GB" sz="1200" dirty="0">
+              <a:latin typeface="Courier New" panose="02070309020205020404" pitchFamily="49" charset="0"/>
+              <a:cs typeface="Courier New" panose="02070309020205020404" pitchFamily="49" charset="0"/>
+            </a:endParaRPr>
+          </a:p>
+          <a:p>
+            <a:endParaRPr lang="en-GB" sz="1200" dirty="0">
+              <a:latin typeface="Courier New" panose="02070309020205020404" pitchFamily="49" charset="0"/>
+              <a:cs typeface="Courier New" panose="02070309020205020404" pitchFamily="49" charset="0"/>
+            </a:endParaRPr>
+          </a:p>
+          <a:p>
+            <a:endParaRPr lang="en-GB" sz="1200" dirty="0">
+              <a:latin typeface="Courier New" panose="02070309020205020404" pitchFamily="49" charset="0"/>
+              <a:cs typeface="Courier New" panose="02070309020205020404" pitchFamily="49" charset="0"/>
+            </a:endParaRPr>
+          </a:p>
+        </p:txBody>
+      </p:sp>
+      <p:sp>
+        <p:nvSpPr>
+          <p:cNvPr id="5" name="Rectangle 4"/>
+          <p:cNvSpPr/>
+          <p:nvPr/>
+        </p:nvSpPr>
+        <p:spPr>
+          <a:xfrm>
+            <a:off x="5860120" y="1613067"/>
+            <a:ext cx="6096000" cy="4616648"/>
+          </a:xfrm>
+          <a:prstGeom prst="rect">
+            <a:avLst/>
+          </a:prstGeom>
+        </p:spPr>
+        <p:txBody>
+          <a:bodyPr>
+            <a:spAutoFit/>
+          </a:bodyPr>
+          <a:lstStyle/>
+          <a:p>
+            <a:r>
+              <a:rPr lang="en-GB" sz="1400" dirty="0">
+                <a:latin typeface="Courier New" panose="02070309020205020404" pitchFamily="49" charset="0"/>
+                <a:cs typeface="Courier New" panose="02070309020205020404" pitchFamily="49" charset="0"/>
+              </a:rPr>
+              <a:t># Week4, Program11</a:t>
+            </a:r>
+          </a:p>
+          <a:p>
+            <a:endParaRPr lang="en-GB" sz="1400" dirty="0">
+              <a:latin typeface="Courier New" panose="02070309020205020404" pitchFamily="49" charset="0"/>
+              <a:cs typeface="Courier New" panose="02070309020205020404" pitchFamily="49" charset="0"/>
+            </a:endParaRPr>
+          </a:p>
+          <a:p>
+            <a:r>
+              <a:rPr lang="en-GB" sz="1400" dirty="0">
+                <a:latin typeface="Courier New" panose="02070309020205020404" pitchFamily="49" charset="0"/>
+                <a:cs typeface="Courier New" panose="02070309020205020404" pitchFamily="49" charset="0"/>
+              </a:rPr>
+              <a:t>a = "Hello"</a:t>
+            </a:r>
+          </a:p>
+          <a:p>
+            <a:r>
+              <a:rPr lang="en-GB" sz="1400" dirty="0">
+                <a:latin typeface="Courier New" panose="02070309020205020404" pitchFamily="49" charset="0"/>
+                <a:cs typeface="Courier New" panose="02070309020205020404" pitchFamily="49" charset="0"/>
+              </a:rPr>
+              <a:t>b = "Hello"</a:t>
+            </a:r>
+          </a:p>
+          <a:p>
+            <a:r>
+              <a:rPr lang="en-GB" sz="1400" dirty="0">
+                <a:latin typeface="Courier New" panose="02070309020205020404" pitchFamily="49" charset="0"/>
+                <a:cs typeface="Courier New" panose="02070309020205020404" pitchFamily="49" charset="0"/>
+              </a:rPr>
+              <a:t>c = "World"</a:t>
+            </a:r>
+          </a:p>
+          <a:p>
+            <a:r>
+              <a:rPr lang="en-GB" sz="1400" dirty="0">
+                <a:latin typeface="Courier New" panose="02070309020205020404" pitchFamily="49" charset="0"/>
+                <a:cs typeface="Courier New" panose="02070309020205020404" pitchFamily="49" charset="0"/>
+              </a:rPr>
+              <a:t>d = "World"</a:t>
+            </a:r>
+          </a:p>
+          <a:p>
+            <a:endParaRPr lang="en-GB" sz="1400" dirty="0">
+              <a:latin typeface="Courier New" panose="02070309020205020404" pitchFamily="49" charset="0"/>
+              <a:cs typeface="Courier New" panose="02070309020205020404" pitchFamily="49" charset="0"/>
+            </a:endParaRPr>
+          </a:p>
+          <a:p>
+            <a:r>
+              <a:rPr lang="en-GB" sz="1400" dirty="0">
+                <a:latin typeface="Courier New" panose="02070309020205020404" pitchFamily="49" charset="0"/>
+                <a:cs typeface="Courier New" panose="02070309020205020404" pitchFamily="49" charset="0"/>
+              </a:rPr>
+              <a:t>print(a == b or c == d)</a:t>
+            </a:r>
+          </a:p>
+          <a:p>
+            <a:r>
+              <a:rPr lang="en-GB" sz="1400" dirty="0">
+                <a:latin typeface="Courier New" panose="02070309020205020404" pitchFamily="49" charset="0"/>
+                <a:cs typeface="Courier New" panose="02070309020205020404" pitchFamily="49" charset="0"/>
+              </a:rPr>
+              <a:t>print(a != b or c != d)</a:t>
+            </a:r>
+          </a:p>
+          <a:p>
+            <a:r>
+              <a:rPr lang="en-GB" sz="1400" dirty="0">
+                <a:latin typeface="Courier New" panose="02070309020205020404" pitchFamily="49" charset="0"/>
+                <a:cs typeface="Courier New" panose="02070309020205020404" pitchFamily="49" charset="0"/>
+              </a:rPr>
+              <a:t>print(a == d or b == c)</a:t>
+            </a:r>
+          </a:p>
+          <a:p>
+            <a:endParaRPr lang="en-GB" sz="1400" dirty="0">
+              <a:latin typeface="Courier New" panose="02070309020205020404" pitchFamily="49" charset="0"/>
+              <a:cs typeface="Courier New" panose="02070309020205020404" pitchFamily="49" charset="0"/>
+            </a:endParaRPr>
+          </a:p>
+          <a:p>
+            <a:r>
+              <a:rPr lang="en-GB" sz="1400" dirty="0">
+                <a:latin typeface="Courier New" panose="02070309020205020404" pitchFamily="49" charset="0"/>
+                <a:cs typeface="Courier New" panose="02070309020205020404" pitchFamily="49" charset="0"/>
+              </a:rPr>
+              <a:t>print (5 &gt; 8 or 4 &lt; 6)</a:t>
+            </a:r>
+          </a:p>
+          <a:p>
+            <a:r>
+              <a:rPr lang="en-GB" sz="1400" dirty="0">
+                <a:latin typeface="Courier New" panose="02070309020205020404" pitchFamily="49" charset="0"/>
+                <a:cs typeface="Courier New" panose="02070309020205020404" pitchFamily="49" charset="0"/>
+              </a:rPr>
+              <a:t>print (3 &gt; 9 or 5 &gt; 7)</a:t>
+            </a:r>
+          </a:p>
+          <a:p>
+            <a:r>
+              <a:rPr lang="en-GB" sz="1400" dirty="0">
+                <a:latin typeface="Courier New" panose="02070309020205020404" pitchFamily="49" charset="0"/>
+                <a:cs typeface="Courier New" panose="02070309020205020404" pitchFamily="49" charset="0"/>
+              </a:rPr>
+              <a:t>print (0 &lt; 1 or 4 &gt; 6)</a:t>
+            </a:r>
+          </a:p>
+          <a:p>
+            <a:r>
+              <a:rPr lang="en-GB" sz="1400" dirty="0">
+                <a:latin typeface="Courier New" panose="02070309020205020404" pitchFamily="49" charset="0"/>
+                <a:cs typeface="Courier New" panose="02070309020205020404" pitchFamily="49" charset="0"/>
+              </a:rPr>
+              <a:t>print (a == c or 5 &lt; 9)</a:t>
+            </a:r>
+          </a:p>
+          <a:p>
+            <a:r>
+              <a:rPr lang="en-GB" sz="1400" dirty="0">
+                <a:latin typeface="Courier New" panose="02070309020205020404" pitchFamily="49" charset="0"/>
+                <a:cs typeface="Courier New" panose="02070309020205020404" pitchFamily="49" charset="0"/>
+              </a:rPr>
+              <a:t>print (a == d or d == "World")</a:t>
+            </a:r>
+          </a:p>
+          <a:p>
+            <a:endParaRPr lang="en-GB" sz="1400" dirty="0">
+              <a:latin typeface="Courier New" panose="02070309020205020404" pitchFamily="49" charset="0"/>
+              <a:cs typeface="Courier New" panose="02070309020205020404" pitchFamily="49" charset="0"/>
+            </a:endParaRPr>
+          </a:p>
+          <a:p>
+            <a:r>
+              <a:rPr lang="en-GB" sz="1400" dirty="0">
+                <a:latin typeface="Courier New" panose="02070309020205020404" pitchFamily="49" charset="0"/>
+                <a:cs typeface="Courier New" panose="02070309020205020404" pitchFamily="49" charset="0"/>
+              </a:rPr>
+              <a:t># Tricky !</a:t>
+            </a:r>
+          </a:p>
+          <a:p>
+            <a:r>
+              <a:rPr lang="en-GB" sz="1400" dirty="0">
+                <a:latin typeface="Courier New" panose="02070309020205020404" pitchFamily="49" charset="0"/>
+                <a:cs typeface="Courier New" panose="02070309020205020404" pitchFamily="49" charset="0"/>
+              </a:rPr>
+              <a:t>print (a == c or b == "hello")</a:t>
+            </a:r>
+          </a:p>
+          <a:p>
+            <a:r>
+              <a:rPr lang="en-GB" sz="1400" dirty="0">
+                <a:latin typeface="Courier New" panose="02070309020205020404" pitchFamily="49" charset="0"/>
+                <a:cs typeface="Courier New" panose="02070309020205020404" pitchFamily="49" charset="0"/>
+              </a:rPr>
+              <a:t>print (</a:t>
+            </a:r>
+            <a:r>
+              <a:rPr lang="en-GB" sz="1400" dirty="0" err="1">
+                <a:latin typeface="Courier New" panose="02070309020205020404" pitchFamily="49" charset="0"/>
+                <a:cs typeface="Courier New" panose="02070309020205020404" pitchFamily="49" charset="0"/>
+              </a:rPr>
+              <a:t>int</a:t>
+            </a:r>
+            <a:r>
+              <a:rPr lang="en-GB" sz="1400" dirty="0">
+                <a:latin typeface="Courier New" panose="02070309020205020404" pitchFamily="49" charset="0"/>
+                <a:cs typeface="Courier New" panose="02070309020205020404" pitchFamily="49" charset="0"/>
+              </a:rPr>
+              <a:t>(4.7) == 4 or </a:t>
+            </a:r>
+            <a:r>
+              <a:rPr lang="en-GB" sz="1400" dirty="0" err="1">
+                <a:latin typeface="Courier New" panose="02070309020205020404" pitchFamily="49" charset="0"/>
+                <a:cs typeface="Courier New" panose="02070309020205020404" pitchFamily="49" charset="0"/>
+              </a:rPr>
+              <a:t>int</a:t>
+            </a:r>
+            <a:r>
+              <a:rPr lang="en-GB" sz="1400" dirty="0">
+                <a:latin typeface="Courier New" panose="02070309020205020404" pitchFamily="49" charset="0"/>
+                <a:cs typeface="Courier New" panose="02070309020205020404" pitchFamily="49" charset="0"/>
+              </a:rPr>
+              <a:t>(5.6) == 6)</a:t>
+            </a:r>
+          </a:p>
+          <a:p>
+            <a:r>
+              <a:rPr lang="en-GB" sz="1400" dirty="0">
+                <a:latin typeface="Courier New" panose="02070309020205020404" pitchFamily="49" charset="0"/>
+                <a:cs typeface="Courier New" panose="02070309020205020404" pitchFamily="49" charset="0"/>
+              </a:rPr>
+              <a:t>print (True == False or False </a:t>
+            </a:r>
+            <a:r>
+              <a:rPr lang="en-GB" sz="1400" dirty="0" smtClean="0">
+                <a:latin typeface="Courier New" panose="02070309020205020404" pitchFamily="49" charset="0"/>
+                <a:cs typeface="Courier New" panose="02070309020205020404" pitchFamily="49" charset="0"/>
+              </a:rPr>
+              <a:t>!= </a:t>
+            </a:r>
+            <a:r>
+              <a:rPr lang="en-GB" sz="1400" dirty="0">
+                <a:latin typeface="Courier New" panose="02070309020205020404" pitchFamily="49" charset="0"/>
+                <a:cs typeface="Courier New" panose="02070309020205020404" pitchFamily="49" charset="0"/>
+              </a:rPr>
+              <a:t>True)</a:t>
+            </a:r>
+          </a:p>
+        </p:txBody>
+      </p:sp>
+    </p:spTree>
+    <p:extLst>
+      <p:ext uri="{BB962C8B-B14F-4D97-AF65-F5344CB8AC3E}">
+        <p14:creationId xmlns:p14="http://schemas.microsoft.com/office/powerpoint/2010/main" val="327922069"/>
+      </p:ext>
+    </p:extLst>
+  </p:cSld>
+  <p:clrMapOvr>
+    <a:masterClrMapping/>
+  </p:clrMapOvr>
+  <p:timing>
+    <p:tnLst>
+      <p:par>
+        <p:cTn id="1" dur="indefinite" restart="never" nodeType="tmRoot"/>
+      </p:par>
+    </p:tnLst>
+  </p:timing>
+</p:sld>
+</file>
+
+<file path=ppt/slides/slide16.xml><?xml version="1.0" encoding="utf-8"?>
+<p:sld xmlns:a="http://schemas.openxmlformats.org/drawingml/2006/main" xmlns:r="http://schemas.openxmlformats.org/officeDocument/2006/relationships" xmlns:p="http://schemas.openxmlformats.org/presentationml/2006/main">
+  <p:cSld>
+    <p:spTree>
+      <p:nvGrpSpPr>
+        <p:cNvPr id="1" name=""/>
+        <p:cNvGrpSpPr/>
+        <p:nvPr/>
+      </p:nvGrpSpPr>
+      <p:grpSpPr>
+        <a:xfrm>
+          <a:off x="0" y="0"/>
+          <a:ext cx="0" cy="0"/>
+          <a:chOff x="0" y="0"/>
+          <a:chExt cx="0" cy="0"/>
+        </a:xfrm>
+      </p:grpSpPr>
+      <p:sp>
+        <p:nvSpPr>
+          <p:cNvPr id="2" name="Title 1"/>
+          <p:cNvSpPr>
+            <a:spLocks noGrp="1"/>
+          </p:cNvSpPr>
+          <p:nvPr>
+            <p:ph type="title"/>
+          </p:nvPr>
+        </p:nvSpPr>
+        <p:spPr/>
+        <p:txBody>
+          <a:bodyPr/>
+          <a:lstStyle/>
+          <a:p>
+            <a:r>
+              <a:rPr lang="en-GB" dirty="0" smtClean="0"/>
+              <a:t>Testing with "</a:t>
+            </a:r>
+            <a:r>
+              <a:rPr lang="en-GB" u="sng" dirty="0" smtClean="0"/>
+              <a:t>and</a:t>
+            </a:r>
+            <a:r>
+              <a:rPr lang="en-GB" dirty="0" smtClean="0"/>
+              <a:t>" on Multiple Things</a:t>
+            </a:r>
+            <a:endParaRPr lang="en-GB" dirty="0"/>
+          </a:p>
+        </p:txBody>
+      </p:sp>
+      <p:sp>
+        <p:nvSpPr>
+          <p:cNvPr id="4" name="Content Placeholder 2"/>
+          <p:cNvSpPr>
+            <a:spLocks noGrp="1"/>
+          </p:cNvSpPr>
+          <p:nvPr>
+            <p:ph idx="1"/>
+          </p:nvPr>
+        </p:nvSpPr>
+        <p:spPr>
+          <a:xfrm>
+            <a:off x="646111" y="2052918"/>
+            <a:ext cx="4840289" cy="3853631"/>
+          </a:xfrm>
+        </p:spPr>
+        <p:txBody>
+          <a:bodyPr>
+            <a:normAutofit/>
+          </a:bodyPr>
+          <a:lstStyle/>
+          <a:p>
+            <a:r>
+              <a:rPr lang="en-GB" dirty="0" smtClean="0"/>
+              <a:t>You can use the </a:t>
+            </a:r>
+            <a:r>
+              <a:rPr lang="en-GB" u="sng" dirty="0" smtClean="0"/>
+              <a:t>and</a:t>
+            </a:r>
+            <a:r>
+              <a:rPr lang="en-GB" dirty="0" smtClean="0"/>
+              <a:t> statement to check the truth on multiple conditions.</a:t>
+            </a:r>
+          </a:p>
+          <a:p>
+            <a:r>
+              <a:rPr lang="en-GB" dirty="0" smtClean="0"/>
+              <a:t>If you have a test for truth that is </a:t>
+            </a:r>
+          </a:p>
+          <a:p>
+            <a:pPr lvl="1"/>
+            <a:r>
+              <a:rPr lang="en-GB" u="sng" dirty="0" smtClean="0">
+                <a:latin typeface="Courier New" panose="02070309020205020404" pitchFamily="49" charset="0"/>
+                <a:cs typeface="Courier New" panose="02070309020205020404" pitchFamily="49" charset="0"/>
+              </a:rPr>
+              <a:t>a and b</a:t>
+            </a:r>
+          </a:p>
+          <a:p>
+            <a:pPr lvl="1"/>
+            <a:r>
+              <a:rPr lang="en-GB" dirty="0"/>
+              <a:t>This will </a:t>
+            </a:r>
+            <a:r>
+              <a:rPr lang="en-GB" dirty="0" smtClean="0"/>
+              <a:t>return only if both a and b are true.</a:t>
+            </a:r>
+          </a:p>
+          <a:p>
+            <a:endParaRPr lang="en-GB" dirty="0"/>
+          </a:p>
+        </p:txBody>
+      </p:sp>
+      <p:sp>
+        <p:nvSpPr>
+          <p:cNvPr id="6" name="Rectangle 5"/>
+          <p:cNvSpPr/>
+          <p:nvPr/>
+        </p:nvSpPr>
+        <p:spPr>
+          <a:xfrm>
+            <a:off x="646111" y="5906550"/>
+            <a:ext cx="5619222" cy="646331"/>
+          </a:xfrm>
+          <a:prstGeom prst="rect">
+            <a:avLst/>
+          </a:prstGeom>
+        </p:spPr>
+        <p:txBody>
+          <a:bodyPr wrap="square">
+            <a:spAutoFit/>
+          </a:bodyPr>
+          <a:lstStyle/>
+          <a:p>
+            <a:pPr marL="285750" indent="-285750">
+              <a:buFont typeface="Arial" panose="020B0604020202020204" pitchFamily="34" charset="0"/>
+              <a:buChar char="•"/>
+            </a:pPr>
+            <a:r>
+              <a:rPr lang="en-GB" dirty="0">
+                <a:solidFill>
+                  <a:srgbClr val="FFFF00"/>
+                </a:solidFill>
+              </a:rPr>
+              <a:t>What do you think this program will do ?</a:t>
+            </a:r>
+          </a:p>
+          <a:p>
+            <a:pPr marL="285750" indent="-285750">
+              <a:buFont typeface="Arial" panose="020B0604020202020204" pitchFamily="34" charset="0"/>
+              <a:buChar char="•"/>
+            </a:pPr>
+            <a:r>
+              <a:rPr lang="en-GB" dirty="0">
+                <a:solidFill>
+                  <a:srgbClr val="FFFF00"/>
+                </a:solidFill>
+              </a:rPr>
+              <a:t>Type it in and see if you are correct.</a:t>
+            </a:r>
+            <a:endParaRPr lang="en-GB" dirty="0"/>
+          </a:p>
+        </p:txBody>
+      </p:sp>
+      <p:sp>
+        <p:nvSpPr>
+          <p:cNvPr id="3" name="Rectangle 2"/>
+          <p:cNvSpPr/>
+          <p:nvPr/>
+        </p:nvSpPr>
+        <p:spPr>
+          <a:xfrm>
+            <a:off x="5614587" y="2052919"/>
+            <a:ext cx="6213346" cy="646331"/>
+          </a:xfrm>
+          <a:prstGeom prst="rect">
+            <a:avLst/>
+          </a:prstGeom>
+        </p:spPr>
+        <p:txBody>
+          <a:bodyPr wrap="square">
+            <a:spAutoFit/>
+          </a:bodyPr>
+          <a:lstStyle/>
+          <a:p>
+            <a:endParaRPr lang="en-GB" sz="1200" dirty="0">
+              <a:latin typeface="Courier New" panose="02070309020205020404" pitchFamily="49" charset="0"/>
+              <a:cs typeface="Courier New" panose="02070309020205020404" pitchFamily="49" charset="0"/>
+            </a:endParaRPr>
+          </a:p>
+          <a:p>
+            <a:endParaRPr lang="en-GB" sz="1200" dirty="0">
+              <a:latin typeface="Courier New" panose="02070309020205020404" pitchFamily="49" charset="0"/>
+              <a:cs typeface="Courier New" panose="02070309020205020404" pitchFamily="49" charset="0"/>
+            </a:endParaRPr>
+          </a:p>
+          <a:p>
+            <a:endParaRPr lang="en-GB" sz="1200" dirty="0">
+              <a:latin typeface="Courier New" panose="02070309020205020404" pitchFamily="49" charset="0"/>
+              <a:cs typeface="Courier New" panose="02070309020205020404" pitchFamily="49" charset="0"/>
+            </a:endParaRPr>
+          </a:p>
+        </p:txBody>
+      </p:sp>
+      <p:sp>
+        <p:nvSpPr>
+          <p:cNvPr id="5" name="Rectangle 4"/>
+          <p:cNvSpPr/>
+          <p:nvPr/>
+        </p:nvSpPr>
+        <p:spPr>
+          <a:xfrm>
+            <a:off x="5860120" y="1613067"/>
+            <a:ext cx="6096000" cy="4401205"/>
+          </a:xfrm>
+          <a:prstGeom prst="rect">
+            <a:avLst/>
+          </a:prstGeom>
+        </p:spPr>
+        <p:txBody>
+          <a:bodyPr>
+            <a:spAutoFit/>
+          </a:bodyPr>
+          <a:lstStyle/>
+          <a:p>
+            <a:r>
+              <a:rPr lang="en-GB" sz="1400" dirty="0" smtClean="0">
+                <a:latin typeface="Courier New" panose="02070309020205020404" pitchFamily="49" charset="0"/>
+                <a:cs typeface="Courier New" panose="02070309020205020404" pitchFamily="49" charset="0"/>
+              </a:rPr>
+              <a:t># </a:t>
+            </a:r>
+            <a:r>
+              <a:rPr lang="en-GB" sz="1400" dirty="0">
+                <a:latin typeface="Courier New" panose="02070309020205020404" pitchFamily="49" charset="0"/>
+                <a:cs typeface="Courier New" panose="02070309020205020404" pitchFamily="49" charset="0"/>
+              </a:rPr>
+              <a:t>Week4, Program12</a:t>
+            </a:r>
+          </a:p>
+          <a:p>
+            <a:endParaRPr lang="en-GB" sz="1400" dirty="0">
+              <a:latin typeface="Courier New" panose="02070309020205020404" pitchFamily="49" charset="0"/>
+              <a:cs typeface="Courier New" panose="02070309020205020404" pitchFamily="49" charset="0"/>
+            </a:endParaRPr>
+          </a:p>
+          <a:p>
+            <a:r>
+              <a:rPr lang="en-GB" sz="1400" dirty="0">
+                <a:latin typeface="Courier New" panose="02070309020205020404" pitchFamily="49" charset="0"/>
+                <a:cs typeface="Courier New" panose="02070309020205020404" pitchFamily="49" charset="0"/>
+              </a:rPr>
+              <a:t>a = "Hello"</a:t>
+            </a:r>
+          </a:p>
+          <a:p>
+            <a:r>
+              <a:rPr lang="en-GB" sz="1400" dirty="0">
+                <a:latin typeface="Courier New" panose="02070309020205020404" pitchFamily="49" charset="0"/>
+                <a:cs typeface="Courier New" panose="02070309020205020404" pitchFamily="49" charset="0"/>
+              </a:rPr>
+              <a:t>b = "Hello"</a:t>
+            </a:r>
+          </a:p>
+          <a:p>
+            <a:r>
+              <a:rPr lang="en-GB" sz="1400" dirty="0">
+                <a:latin typeface="Courier New" panose="02070309020205020404" pitchFamily="49" charset="0"/>
+                <a:cs typeface="Courier New" panose="02070309020205020404" pitchFamily="49" charset="0"/>
+              </a:rPr>
+              <a:t>c = "World"</a:t>
+            </a:r>
+          </a:p>
+          <a:p>
+            <a:r>
+              <a:rPr lang="en-GB" sz="1400" dirty="0">
+                <a:latin typeface="Courier New" panose="02070309020205020404" pitchFamily="49" charset="0"/>
+                <a:cs typeface="Courier New" panose="02070309020205020404" pitchFamily="49" charset="0"/>
+              </a:rPr>
+              <a:t>d = "World"</a:t>
+            </a:r>
+          </a:p>
+          <a:p>
+            <a:endParaRPr lang="en-GB" sz="1400" dirty="0">
+              <a:latin typeface="Courier New" panose="02070309020205020404" pitchFamily="49" charset="0"/>
+              <a:cs typeface="Courier New" panose="02070309020205020404" pitchFamily="49" charset="0"/>
+            </a:endParaRPr>
+          </a:p>
+          <a:p>
+            <a:r>
+              <a:rPr lang="en-GB" sz="1400" dirty="0">
+                <a:latin typeface="Courier New" panose="02070309020205020404" pitchFamily="49" charset="0"/>
+                <a:cs typeface="Courier New" panose="02070309020205020404" pitchFamily="49" charset="0"/>
+              </a:rPr>
+              <a:t>print(a == b and c == d)</a:t>
+            </a:r>
+          </a:p>
+          <a:p>
+            <a:r>
+              <a:rPr lang="en-GB" sz="1400" dirty="0">
+                <a:latin typeface="Courier New" panose="02070309020205020404" pitchFamily="49" charset="0"/>
+                <a:cs typeface="Courier New" panose="02070309020205020404" pitchFamily="49" charset="0"/>
+              </a:rPr>
+              <a:t>print(a != b and c != d)</a:t>
+            </a:r>
+          </a:p>
+          <a:p>
+            <a:r>
+              <a:rPr lang="en-GB" sz="1400" dirty="0">
+                <a:latin typeface="Courier New" panose="02070309020205020404" pitchFamily="49" charset="0"/>
+                <a:cs typeface="Courier New" panose="02070309020205020404" pitchFamily="49" charset="0"/>
+              </a:rPr>
+              <a:t>print(a != d and b != c)</a:t>
+            </a:r>
+          </a:p>
+          <a:p>
+            <a:endParaRPr lang="en-GB" sz="1400" dirty="0">
+              <a:latin typeface="Courier New" panose="02070309020205020404" pitchFamily="49" charset="0"/>
+              <a:cs typeface="Courier New" panose="02070309020205020404" pitchFamily="49" charset="0"/>
+            </a:endParaRPr>
+          </a:p>
+          <a:p>
+            <a:r>
+              <a:rPr lang="en-GB" sz="1400" dirty="0">
+                <a:latin typeface="Courier New" panose="02070309020205020404" pitchFamily="49" charset="0"/>
+                <a:cs typeface="Courier New" panose="02070309020205020404" pitchFamily="49" charset="0"/>
+              </a:rPr>
+              <a:t>print (5 &gt; 8 and 4 &lt; 6)</a:t>
+            </a:r>
+          </a:p>
+          <a:p>
+            <a:r>
+              <a:rPr lang="en-GB" sz="1400" dirty="0">
+                <a:latin typeface="Courier New" panose="02070309020205020404" pitchFamily="49" charset="0"/>
+                <a:cs typeface="Courier New" panose="02070309020205020404" pitchFamily="49" charset="0"/>
+              </a:rPr>
+              <a:t>print (9 &gt; 4 and 7 &gt; 5)</a:t>
+            </a:r>
+          </a:p>
+          <a:p>
+            <a:r>
+              <a:rPr lang="en-GB" sz="1400" dirty="0">
+                <a:latin typeface="Courier New" panose="02070309020205020404" pitchFamily="49" charset="0"/>
+                <a:cs typeface="Courier New" panose="02070309020205020404" pitchFamily="49" charset="0"/>
+              </a:rPr>
+              <a:t>print (0 &lt; 1 and 4 &gt; 6)</a:t>
+            </a:r>
+          </a:p>
+          <a:p>
+            <a:r>
+              <a:rPr lang="en-GB" sz="1400" dirty="0">
+                <a:latin typeface="Courier New" panose="02070309020205020404" pitchFamily="49" charset="0"/>
+                <a:cs typeface="Courier New" panose="02070309020205020404" pitchFamily="49" charset="0"/>
+              </a:rPr>
+              <a:t>print (a == b and 5 &lt; 9)</a:t>
+            </a:r>
+          </a:p>
+          <a:p>
+            <a:r>
+              <a:rPr lang="en-GB" sz="1400" dirty="0">
+                <a:latin typeface="Courier New" panose="02070309020205020404" pitchFamily="49" charset="0"/>
+                <a:cs typeface="Courier New" panose="02070309020205020404" pitchFamily="49" charset="0"/>
+              </a:rPr>
+              <a:t>print (a == d and d == "World")</a:t>
+            </a:r>
+          </a:p>
+          <a:p>
+            <a:endParaRPr lang="en-GB" sz="1400" dirty="0">
+              <a:latin typeface="Courier New" panose="02070309020205020404" pitchFamily="49" charset="0"/>
+              <a:cs typeface="Courier New" panose="02070309020205020404" pitchFamily="49" charset="0"/>
+            </a:endParaRPr>
+          </a:p>
+          <a:p>
+            <a:r>
+              <a:rPr lang="en-GB" sz="1400" dirty="0">
+                <a:latin typeface="Courier New" panose="02070309020205020404" pitchFamily="49" charset="0"/>
+                <a:cs typeface="Courier New" panose="02070309020205020404" pitchFamily="49" charset="0"/>
+              </a:rPr>
+              <a:t>print (a == c and b == "hello")</a:t>
+            </a:r>
+          </a:p>
+          <a:p>
+            <a:r>
+              <a:rPr lang="en-GB" sz="1400" dirty="0">
+                <a:latin typeface="Courier New" panose="02070309020205020404" pitchFamily="49" charset="0"/>
+                <a:cs typeface="Courier New" panose="02070309020205020404" pitchFamily="49" charset="0"/>
+              </a:rPr>
+              <a:t>print (</a:t>
+            </a:r>
+            <a:r>
+              <a:rPr lang="en-GB" sz="1400" dirty="0" err="1">
+                <a:latin typeface="Courier New" panose="02070309020205020404" pitchFamily="49" charset="0"/>
+                <a:cs typeface="Courier New" panose="02070309020205020404" pitchFamily="49" charset="0"/>
+              </a:rPr>
+              <a:t>int</a:t>
+            </a:r>
+            <a:r>
+              <a:rPr lang="en-GB" sz="1400" dirty="0">
+                <a:latin typeface="Courier New" panose="02070309020205020404" pitchFamily="49" charset="0"/>
+                <a:cs typeface="Courier New" panose="02070309020205020404" pitchFamily="49" charset="0"/>
+              </a:rPr>
+              <a:t>(4.7) == 4 and </a:t>
+            </a:r>
+            <a:r>
+              <a:rPr lang="en-GB" sz="1400" dirty="0" err="1">
+                <a:latin typeface="Courier New" panose="02070309020205020404" pitchFamily="49" charset="0"/>
+                <a:cs typeface="Courier New" panose="02070309020205020404" pitchFamily="49" charset="0"/>
+              </a:rPr>
+              <a:t>int</a:t>
+            </a:r>
+            <a:r>
+              <a:rPr lang="en-GB" sz="1400" dirty="0">
+                <a:latin typeface="Courier New" panose="02070309020205020404" pitchFamily="49" charset="0"/>
+                <a:cs typeface="Courier New" panose="02070309020205020404" pitchFamily="49" charset="0"/>
+              </a:rPr>
+              <a:t>(5.6) != 6)</a:t>
+            </a:r>
+          </a:p>
+          <a:p>
+            <a:endParaRPr lang="en-GB" sz="1400" dirty="0">
+              <a:latin typeface="Courier New" panose="02070309020205020404" pitchFamily="49" charset="0"/>
+              <a:cs typeface="Courier New" panose="02070309020205020404" pitchFamily="49" charset="0"/>
+            </a:endParaRPr>
+          </a:p>
+        </p:txBody>
+      </p:sp>
+    </p:spTree>
+    <p:extLst>
+      <p:ext uri="{BB962C8B-B14F-4D97-AF65-F5344CB8AC3E}">
+        <p14:creationId xmlns:p14="http://schemas.microsoft.com/office/powerpoint/2010/main" val="4214241767"/>
+      </p:ext>
+    </p:extLst>
+  </p:cSld>
+  <p:clrMapOvr>
+    <a:masterClrMapping/>
+  </p:clrMapOvr>
+  <p:timing>
+    <p:tnLst>
+      <p:par>
+        <p:cTn id="1" dur="indefinite" restart="never" nodeType="tmRoot"/>
+      </p:par>
+    </p:tnLst>
+  </p:timing>
+</p:sld>
+</file>
+
+<file path=ppt/slides/slide17.xml><?xml version="1.0" encoding="utf-8"?>
+<p:sld xmlns:a="http://schemas.openxmlformats.org/drawingml/2006/main" xmlns:r="http://schemas.openxmlformats.org/officeDocument/2006/relationships" xmlns:p="http://schemas.openxmlformats.org/presentationml/2006/main">
+  <p:cSld>
+    <p:spTree>
+      <p:nvGrpSpPr>
+        <p:cNvPr id="1" name=""/>
+        <p:cNvGrpSpPr/>
+        <p:nvPr/>
+      </p:nvGrpSpPr>
+      <p:grpSpPr>
+        <a:xfrm>
+          <a:off x="0" y="0"/>
+          <a:ext cx="0" cy="0"/>
+          <a:chOff x="0" y="0"/>
+          <a:chExt cx="0" cy="0"/>
+        </a:xfrm>
+      </p:grpSpPr>
+      <p:sp>
+        <p:nvSpPr>
+          <p:cNvPr id="2" name="Title 1"/>
+          <p:cNvSpPr>
+            <a:spLocks noGrp="1"/>
+          </p:cNvSpPr>
+          <p:nvPr>
+            <p:ph type="title"/>
+          </p:nvPr>
+        </p:nvSpPr>
+        <p:spPr/>
+        <p:txBody>
+          <a:bodyPr/>
+          <a:lstStyle/>
+          <a:p>
+            <a:r>
+              <a:rPr lang="en-GB" dirty="0" smtClean="0"/>
+              <a:t>Nesting Tests.</a:t>
+            </a:r>
+            <a:endParaRPr lang="en-GB" dirty="0"/>
+          </a:p>
+        </p:txBody>
+      </p:sp>
+      <p:sp>
+        <p:nvSpPr>
+          <p:cNvPr id="4" name="Content Placeholder 2"/>
+          <p:cNvSpPr>
+            <a:spLocks noGrp="1"/>
+          </p:cNvSpPr>
+          <p:nvPr>
+            <p:ph idx="1"/>
+          </p:nvPr>
+        </p:nvSpPr>
+        <p:spPr>
+          <a:xfrm>
+            <a:off x="646111" y="2052918"/>
+            <a:ext cx="10706935" cy="4420310"/>
+          </a:xfrm>
+        </p:spPr>
+        <p:txBody>
+          <a:bodyPr>
+            <a:normAutofit/>
+          </a:bodyPr>
+          <a:lstStyle/>
+          <a:p>
+            <a:r>
+              <a:rPr lang="en-GB" dirty="0" smtClean="0"/>
+              <a:t>You can have more than 1 </a:t>
+            </a:r>
+            <a:r>
+              <a:rPr lang="en-GB" u="sng" dirty="0" smtClean="0"/>
+              <a:t>and</a:t>
+            </a:r>
+            <a:r>
+              <a:rPr lang="en-GB" dirty="0" smtClean="0"/>
+              <a:t> / </a:t>
+            </a:r>
+            <a:r>
+              <a:rPr lang="en-GB" u="sng" dirty="0" smtClean="0"/>
+              <a:t>or</a:t>
+            </a:r>
+            <a:r>
+              <a:rPr lang="en-GB" dirty="0" smtClean="0"/>
+              <a:t> statement.</a:t>
+            </a:r>
+          </a:p>
+          <a:p>
+            <a:r>
+              <a:rPr lang="en-GB" dirty="0"/>
+              <a:t>You can use brackets to nest these tests, much like you can use brackets in maths to order calculations.</a:t>
+            </a:r>
+          </a:p>
+          <a:p>
+            <a:pPr lvl="1"/>
+            <a:r>
+              <a:rPr lang="en-GB" dirty="0"/>
+              <a:t>Just like maths, you do the things inside the innermost brackets first</a:t>
+            </a:r>
+            <a:r>
+              <a:rPr lang="en-GB" dirty="0" smtClean="0"/>
+              <a:t>.</a:t>
+            </a:r>
+          </a:p>
+          <a:p>
+            <a:pPr lvl="1"/>
+            <a:endParaRPr lang="en-GB" dirty="0" smtClean="0"/>
+          </a:p>
+          <a:p>
+            <a:r>
+              <a:rPr lang="en-GB" dirty="0" smtClean="0"/>
+              <a:t>You can even combine </a:t>
+            </a:r>
+            <a:r>
+              <a:rPr lang="en-GB" u="sng" dirty="0" smtClean="0"/>
+              <a:t>and</a:t>
+            </a:r>
+            <a:r>
+              <a:rPr lang="en-GB" dirty="0" smtClean="0"/>
+              <a:t> / </a:t>
+            </a:r>
+            <a:r>
+              <a:rPr lang="en-GB" u="sng" dirty="0" smtClean="0"/>
+              <a:t>or</a:t>
+            </a:r>
+            <a:r>
+              <a:rPr lang="en-GB" dirty="0" smtClean="0"/>
+              <a:t> in a single statement.</a:t>
+            </a:r>
+          </a:p>
+          <a:p>
+            <a:pPr lvl="1"/>
+            <a:r>
+              <a:rPr lang="en-GB" dirty="0" smtClean="0"/>
+              <a:t>I always recommend using brackets to avoid confusion. If you don't however :-</a:t>
+            </a:r>
+          </a:p>
+          <a:p>
+            <a:pPr lvl="1"/>
+            <a:r>
+              <a:rPr lang="en-GB" dirty="0" smtClean="0"/>
+              <a:t>If you do no use brackets though, "or" is evaluated before "and".</a:t>
+            </a:r>
+          </a:p>
+          <a:p>
+            <a:pPr lvl="1"/>
+            <a:r>
+              <a:rPr lang="en-GB" dirty="0" smtClean="0"/>
+              <a:t>For example</a:t>
+            </a:r>
+          </a:p>
+          <a:p>
+            <a:pPr lvl="2"/>
+            <a:r>
+              <a:rPr lang="en-GB" dirty="0" smtClean="0">
+                <a:latin typeface="Courier New" panose="02070309020205020404" pitchFamily="49" charset="0"/>
+                <a:cs typeface="Courier New" panose="02070309020205020404" pitchFamily="49" charset="0"/>
+              </a:rPr>
+              <a:t>1 == 1 and 2 == 3 or 4 == 4</a:t>
+            </a:r>
+            <a:r>
+              <a:rPr lang="en-GB" dirty="0" smtClean="0"/>
+              <a:t> is the same as.</a:t>
+            </a:r>
+          </a:p>
+          <a:p>
+            <a:pPr lvl="2"/>
+            <a:r>
+              <a:rPr lang="en-GB" dirty="0">
+                <a:latin typeface="Courier New" panose="02070309020205020404" pitchFamily="49" charset="0"/>
+                <a:cs typeface="Courier New" panose="02070309020205020404" pitchFamily="49" charset="0"/>
+              </a:rPr>
+              <a:t>1 == 1 and </a:t>
+            </a:r>
+            <a:r>
+              <a:rPr lang="en-GB" dirty="0" smtClean="0">
+                <a:latin typeface="Courier New" panose="02070309020205020404" pitchFamily="49" charset="0"/>
+                <a:cs typeface="Courier New" panose="02070309020205020404" pitchFamily="49" charset="0"/>
+              </a:rPr>
+              <a:t>(2 </a:t>
+            </a:r>
+            <a:r>
+              <a:rPr lang="en-GB" dirty="0">
+                <a:latin typeface="Courier New" panose="02070309020205020404" pitchFamily="49" charset="0"/>
+                <a:cs typeface="Courier New" panose="02070309020205020404" pitchFamily="49" charset="0"/>
+              </a:rPr>
+              <a:t>== 3 or 4 == </a:t>
+            </a:r>
+            <a:r>
+              <a:rPr lang="en-GB" dirty="0" smtClean="0">
+                <a:latin typeface="Courier New" panose="02070309020205020404" pitchFamily="49" charset="0"/>
+                <a:cs typeface="Courier New" panose="02070309020205020404" pitchFamily="49" charset="0"/>
+              </a:rPr>
+              <a:t>4)</a:t>
+            </a:r>
+            <a:endParaRPr lang="en-GB" dirty="0" smtClean="0"/>
+          </a:p>
+          <a:p>
+            <a:pPr lvl="2"/>
+            <a:endParaRPr lang="en-GB" dirty="0" smtClean="0"/>
+          </a:p>
+          <a:p>
+            <a:pPr lvl="2"/>
+            <a:endParaRPr lang="en-GB" dirty="0" smtClean="0"/>
+          </a:p>
+          <a:p>
+            <a:endParaRPr lang="en-GB" dirty="0"/>
+          </a:p>
+        </p:txBody>
+      </p:sp>
+      <p:sp>
+        <p:nvSpPr>
+          <p:cNvPr id="3" name="Rectangle 2"/>
+          <p:cNvSpPr/>
+          <p:nvPr/>
+        </p:nvSpPr>
+        <p:spPr>
+          <a:xfrm>
+            <a:off x="5614587" y="2052919"/>
+            <a:ext cx="6213346" cy="646331"/>
+          </a:xfrm>
+          <a:prstGeom prst="rect">
+            <a:avLst/>
+          </a:prstGeom>
+        </p:spPr>
+        <p:txBody>
+          <a:bodyPr wrap="square">
+            <a:spAutoFit/>
+          </a:bodyPr>
+          <a:lstStyle/>
+          <a:p>
+            <a:endParaRPr lang="en-GB" sz="1200" dirty="0">
+              <a:latin typeface="Courier New" panose="02070309020205020404" pitchFamily="49" charset="0"/>
+              <a:cs typeface="Courier New" panose="02070309020205020404" pitchFamily="49" charset="0"/>
+            </a:endParaRPr>
+          </a:p>
+          <a:p>
+            <a:endParaRPr lang="en-GB" sz="1200" dirty="0">
+              <a:latin typeface="Courier New" panose="02070309020205020404" pitchFamily="49" charset="0"/>
+              <a:cs typeface="Courier New" panose="02070309020205020404" pitchFamily="49" charset="0"/>
+            </a:endParaRPr>
+          </a:p>
+          <a:p>
+            <a:endParaRPr lang="en-GB" sz="1200" dirty="0">
+              <a:latin typeface="Courier New" panose="02070309020205020404" pitchFamily="49" charset="0"/>
+              <a:cs typeface="Courier New" panose="02070309020205020404" pitchFamily="49" charset="0"/>
+            </a:endParaRPr>
+          </a:p>
+        </p:txBody>
+      </p:sp>
+    </p:spTree>
+    <p:extLst>
+      <p:ext uri="{BB962C8B-B14F-4D97-AF65-F5344CB8AC3E}">
+        <p14:creationId xmlns:p14="http://schemas.microsoft.com/office/powerpoint/2010/main" val="1788960391"/>
+      </p:ext>
+    </p:extLst>
+  </p:cSld>
+  <p:clrMapOvr>
+    <a:masterClrMapping/>
+  </p:clrMapOvr>
+  <p:timing>
+    <p:tnLst>
+      <p:par>
+        <p:cTn id="1" dur="indefinite" restart="never" nodeType="tmRoot"/>
+      </p:par>
+    </p:tnLst>
+  </p:timing>
+</p:sld>
+</file>
+
+<file path=ppt/slides/slide18.xml><?xml version="1.0" encoding="utf-8"?>
+<p:sld xmlns:a="http://schemas.openxmlformats.org/drawingml/2006/main" xmlns:r="http://schemas.openxmlformats.org/officeDocument/2006/relationships" xmlns:p="http://schemas.openxmlformats.org/presentationml/2006/main">
+  <p:cSld>
+    <p:spTree>
+      <p:nvGrpSpPr>
+        <p:cNvPr id="1" name=""/>
+        <p:cNvGrpSpPr/>
+        <p:nvPr/>
+      </p:nvGrpSpPr>
+      <p:grpSpPr>
+        <a:xfrm>
+          <a:off x="0" y="0"/>
+          <a:ext cx="0" cy="0"/>
+          <a:chOff x="0" y="0"/>
+          <a:chExt cx="0" cy="0"/>
+        </a:xfrm>
+      </p:grpSpPr>
+      <p:sp>
+        <p:nvSpPr>
+          <p:cNvPr id="2" name="Title 1"/>
+          <p:cNvSpPr>
+            <a:spLocks noGrp="1"/>
+          </p:cNvSpPr>
+          <p:nvPr>
+            <p:ph type="title"/>
+          </p:nvPr>
+        </p:nvSpPr>
+        <p:spPr/>
+        <p:txBody>
+          <a:bodyPr/>
+          <a:lstStyle/>
+          <a:p>
+            <a:r>
+              <a:rPr lang="en-GB" dirty="0" smtClean="0"/>
+              <a:t>Nesting </a:t>
+            </a:r>
+            <a:r>
+              <a:rPr lang="en-GB" dirty="0" smtClean="0"/>
+              <a:t>Tests – Examples.</a:t>
+            </a:r>
+            <a:endParaRPr lang="en-GB" dirty="0"/>
+          </a:p>
+        </p:txBody>
+      </p:sp>
+      <p:sp>
+        <p:nvSpPr>
+          <p:cNvPr id="3" name="Rectangle 2"/>
+          <p:cNvSpPr/>
+          <p:nvPr/>
+        </p:nvSpPr>
+        <p:spPr>
+          <a:xfrm>
+            <a:off x="5614587" y="2052919"/>
+            <a:ext cx="6213346" cy="646331"/>
+          </a:xfrm>
+          <a:prstGeom prst="rect">
+            <a:avLst/>
+          </a:prstGeom>
+        </p:spPr>
+        <p:txBody>
+          <a:bodyPr wrap="square">
+            <a:spAutoFit/>
+          </a:bodyPr>
+          <a:lstStyle/>
+          <a:p>
+            <a:endParaRPr lang="en-GB" sz="1200" dirty="0">
+              <a:latin typeface="Courier New" panose="02070309020205020404" pitchFamily="49" charset="0"/>
+              <a:cs typeface="Courier New" panose="02070309020205020404" pitchFamily="49" charset="0"/>
+            </a:endParaRPr>
+          </a:p>
+          <a:p>
+            <a:endParaRPr lang="en-GB" sz="1200" dirty="0">
+              <a:latin typeface="Courier New" panose="02070309020205020404" pitchFamily="49" charset="0"/>
+              <a:cs typeface="Courier New" panose="02070309020205020404" pitchFamily="49" charset="0"/>
+            </a:endParaRPr>
+          </a:p>
+          <a:p>
+            <a:endParaRPr lang="en-GB" sz="1200" dirty="0">
+              <a:latin typeface="Courier New" panose="02070309020205020404" pitchFamily="49" charset="0"/>
+              <a:cs typeface="Courier New" panose="02070309020205020404" pitchFamily="49" charset="0"/>
+            </a:endParaRPr>
+          </a:p>
+        </p:txBody>
+      </p:sp>
+      <p:sp>
+        <p:nvSpPr>
+          <p:cNvPr id="6" name="Rectangle 5"/>
+          <p:cNvSpPr/>
+          <p:nvPr/>
+        </p:nvSpPr>
+        <p:spPr>
+          <a:xfrm>
+            <a:off x="646111" y="1152983"/>
+            <a:ext cx="6096000" cy="5632311"/>
+          </a:xfrm>
+          <a:prstGeom prst="rect">
+            <a:avLst/>
+          </a:prstGeom>
+        </p:spPr>
+        <p:txBody>
+          <a:bodyPr>
+            <a:spAutoFit/>
+          </a:bodyPr>
+          <a:lstStyle/>
+          <a:p>
+            <a:r>
+              <a:rPr lang="en-GB" sz="1200" dirty="0">
+                <a:latin typeface="Courier New" panose="02070309020205020404" pitchFamily="49" charset="0"/>
+                <a:cs typeface="Courier New" panose="02070309020205020404" pitchFamily="49" charset="0"/>
+              </a:rPr>
+              <a:t># Week4, Program13</a:t>
+            </a:r>
+          </a:p>
+          <a:p>
+            <a:endParaRPr lang="en-GB" sz="1200" dirty="0">
+              <a:latin typeface="Courier New" panose="02070309020205020404" pitchFamily="49" charset="0"/>
+              <a:cs typeface="Courier New" panose="02070309020205020404" pitchFamily="49" charset="0"/>
+            </a:endParaRPr>
+          </a:p>
+          <a:p>
+            <a:r>
+              <a:rPr lang="en-GB" sz="1200" dirty="0">
+                <a:latin typeface="Courier New" panose="02070309020205020404" pitchFamily="49" charset="0"/>
+                <a:cs typeface="Courier New" panose="02070309020205020404" pitchFamily="49" charset="0"/>
+              </a:rPr>
+              <a:t>a = "Hello"</a:t>
+            </a:r>
+          </a:p>
+          <a:p>
+            <a:r>
+              <a:rPr lang="en-GB" sz="1200" dirty="0">
+                <a:latin typeface="Courier New" panose="02070309020205020404" pitchFamily="49" charset="0"/>
+                <a:cs typeface="Courier New" panose="02070309020205020404" pitchFamily="49" charset="0"/>
+              </a:rPr>
+              <a:t>b = "Hello"</a:t>
+            </a:r>
+          </a:p>
+          <a:p>
+            <a:r>
+              <a:rPr lang="en-GB" sz="1200" dirty="0">
+                <a:latin typeface="Courier New" panose="02070309020205020404" pitchFamily="49" charset="0"/>
+                <a:cs typeface="Courier New" panose="02070309020205020404" pitchFamily="49" charset="0"/>
+              </a:rPr>
+              <a:t>c = "World"</a:t>
+            </a:r>
+          </a:p>
+          <a:p>
+            <a:r>
+              <a:rPr lang="en-GB" sz="1200" dirty="0">
+                <a:latin typeface="Courier New" panose="02070309020205020404" pitchFamily="49" charset="0"/>
+                <a:cs typeface="Courier New" panose="02070309020205020404" pitchFamily="49" charset="0"/>
+              </a:rPr>
+              <a:t>d = "World"</a:t>
+            </a:r>
+          </a:p>
+          <a:p>
+            <a:endParaRPr lang="en-GB" sz="1200" dirty="0">
+              <a:latin typeface="Courier New" panose="02070309020205020404" pitchFamily="49" charset="0"/>
+              <a:cs typeface="Courier New" panose="02070309020205020404" pitchFamily="49" charset="0"/>
+            </a:endParaRPr>
+          </a:p>
+          <a:p>
+            <a:r>
+              <a:rPr lang="en-GB" sz="1200" dirty="0">
+                <a:latin typeface="Courier New" panose="02070309020205020404" pitchFamily="49" charset="0"/>
+                <a:cs typeface="Courier New" panose="02070309020205020404" pitchFamily="49" charset="0"/>
+              </a:rPr>
+              <a:t># Using 3 and statements</a:t>
+            </a:r>
+          </a:p>
+          <a:p>
+            <a:r>
+              <a:rPr lang="en-GB" sz="1200" dirty="0">
+                <a:latin typeface="Courier New" panose="02070309020205020404" pitchFamily="49" charset="0"/>
+                <a:cs typeface="Courier New" panose="02070309020205020404" pitchFamily="49" charset="0"/>
+              </a:rPr>
+              <a:t>print(a == b and b == a and c == d)</a:t>
+            </a:r>
+          </a:p>
+          <a:p>
+            <a:r>
+              <a:rPr lang="en-GB" sz="1200" dirty="0">
+                <a:latin typeface="Courier New" panose="02070309020205020404" pitchFamily="49" charset="0"/>
+                <a:cs typeface="Courier New" panose="02070309020205020404" pitchFamily="49" charset="0"/>
+              </a:rPr>
+              <a:t>print(1 == 1 and 3 &gt; 4 and c == d)</a:t>
+            </a:r>
+          </a:p>
+          <a:p>
+            <a:r>
+              <a:rPr lang="en-GB" sz="1200" dirty="0">
+                <a:latin typeface="Courier New" panose="02070309020205020404" pitchFamily="49" charset="0"/>
+                <a:cs typeface="Courier New" panose="02070309020205020404" pitchFamily="49" charset="0"/>
+              </a:rPr>
+              <a:t>print(4 * 4 == 16 and 5 * 5 == 25 and 6 * 6 == 36)</a:t>
+            </a:r>
+          </a:p>
+          <a:p>
+            <a:endParaRPr lang="en-GB" sz="1200" dirty="0">
+              <a:latin typeface="Courier New" panose="02070309020205020404" pitchFamily="49" charset="0"/>
+              <a:cs typeface="Courier New" panose="02070309020205020404" pitchFamily="49" charset="0"/>
+            </a:endParaRPr>
+          </a:p>
+          <a:p>
+            <a:r>
+              <a:rPr lang="en-GB" sz="1200" dirty="0">
+                <a:latin typeface="Courier New" panose="02070309020205020404" pitchFamily="49" charset="0"/>
+                <a:cs typeface="Courier New" panose="02070309020205020404" pitchFamily="49" charset="0"/>
+              </a:rPr>
+              <a:t># Using 3 or statements. Only one thing needs to be true.</a:t>
+            </a:r>
+          </a:p>
+          <a:p>
+            <a:r>
+              <a:rPr lang="en-GB" sz="1200" dirty="0">
+                <a:latin typeface="Courier New" panose="02070309020205020404" pitchFamily="49" charset="0"/>
+                <a:cs typeface="Courier New" panose="02070309020205020404" pitchFamily="49" charset="0"/>
+              </a:rPr>
+              <a:t>print(a == c or d == a or b == c)</a:t>
+            </a:r>
+          </a:p>
+          <a:p>
+            <a:r>
+              <a:rPr lang="en-GB" sz="1200" dirty="0">
+                <a:latin typeface="Courier New" panose="02070309020205020404" pitchFamily="49" charset="0"/>
+                <a:cs typeface="Courier New" panose="02070309020205020404" pitchFamily="49" charset="0"/>
+              </a:rPr>
+              <a:t>print(a == "Hello" or b == "World" or c == "Hello")</a:t>
+            </a:r>
+          </a:p>
+          <a:p>
+            <a:r>
+              <a:rPr lang="en-GB" sz="1200" dirty="0">
+                <a:latin typeface="Courier New" panose="02070309020205020404" pitchFamily="49" charset="0"/>
+                <a:cs typeface="Courier New" panose="02070309020205020404" pitchFamily="49" charset="0"/>
+              </a:rPr>
+              <a:t>print(a != "Hello" or b == "World" or 4 &lt; 6)</a:t>
+            </a:r>
+          </a:p>
+          <a:p>
+            <a:endParaRPr lang="en-GB" sz="1200" dirty="0">
+              <a:latin typeface="Courier New" panose="02070309020205020404" pitchFamily="49" charset="0"/>
+              <a:cs typeface="Courier New" panose="02070309020205020404" pitchFamily="49" charset="0"/>
+            </a:endParaRPr>
+          </a:p>
+          <a:p>
+            <a:r>
+              <a:rPr lang="en-GB" sz="1200" dirty="0">
+                <a:latin typeface="Courier New" panose="02070309020205020404" pitchFamily="49" charset="0"/>
+                <a:cs typeface="Courier New" panose="02070309020205020404" pitchFamily="49" charset="0"/>
+              </a:rPr>
+              <a:t># Mixing and/or without brackets (not recommended !)</a:t>
+            </a:r>
+          </a:p>
+          <a:p>
+            <a:r>
+              <a:rPr lang="en-GB" sz="1200" dirty="0">
+                <a:latin typeface="Courier New" panose="02070309020205020404" pitchFamily="49" charset="0"/>
+                <a:cs typeface="Courier New" panose="02070309020205020404" pitchFamily="49" charset="0"/>
+              </a:rPr>
+              <a:t>print (1 == 2 and 2 == 2 or 3 == 4)</a:t>
+            </a:r>
+          </a:p>
+          <a:p>
+            <a:r>
+              <a:rPr lang="en-GB" sz="1200" dirty="0">
+                <a:latin typeface="Courier New" panose="02070309020205020404" pitchFamily="49" charset="0"/>
+                <a:cs typeface="Courier New" panose="02070309020205020404" pitchFamily="49" charset="0"/>
+              </a:rPr>
+              <a:t>print (a == b or 5 == 4 and 3 == 3)</a:t>
+            </a:r>
+          </a:p>
+          <a:p>
+            <a:endParaRPr lang="en-GB" sz="1200" dirty="0">
+              <a:latin typeface="Courier New" panose="02070309020205020404" pitchFamily="49" charset="0"/>
+              <a:cs typeface="Courier New" panose="02070309020205020404" pitchFamily="49" charset="0"/>
+            </a:endParaRPr>
+          </a:p>
+          <a:p>
+            <a:r>
+              <a:rPr lang="en-GB" sz="1200" dirty="0">
+                <a:latin typeface="Courier New" panose="02070309020205020404" pitchFamily="49" charset="0"/>
+                <a:cs typeface="Courier New" panose="02070309020205020404" pitchFamily="49" charset="0"/>
+              </a:rPr>
+              <a:t># Mixing and/or with brackets (recommended)</a:t>
+            </a:r>
+          </a:p>
+          <a:p>
+            <a:r>
+              <a:rPr lang="en-GB" sz="1200" dirty="0">
+                <a:latin typeface="Courier New" panose="02070309020205020404" pitchFamily="49" charset="0"/>
+                <a:cs typeface="Courier New" panose="02070309020205020404" pitchFamily="49" charset="0"/>
+              </a:rPr>
+              <a:t>print ((1 == 2 and 2 == 2) or 3 == 4)</a:t>
+            </a:r>
+          </a:p>
+          <a:p>
+            <a:r>
+              <a:rPr lang="en-GB" sz="1200" dirty="0">
+                <a:latin typeface="Courier New" panose="02070309020205020404" pitchFamily="49" charset="0"/>
+                <a:cs typeface="Courier New" panose="02070309020205020404" pitchFamily="49" charset="0"/>
+              </a:rPr>
+              <a:t>print (1 == 2 and (2 == 2 or 3 == 4))</a:t>
+            </a:r>
+          </a:p>
+          <a:p>
+            <a:r>
+              <a:rPr lang="en-GB" sz="1200" dirty="0">
+                <a:latin typeface="Courier New" panose="02070309020205020404" pitchFamily="49" charset="0"/>
+                <a:cs typeface="Courier New" panose="02070309020205020404" pitchFamily="49" charset="0"/>
+              </a:rPr>
+              <a:t>print ((a == b or 5 == 4) and 3 == 3)</a:t>
+            </a:r>
+          </a:p>
+          <a:p>
+            <a:endParaRPr lang="en-GB" sz="1200" dirty="0">
+              <a:latin typeface="Courier New" panose="02070309020205020404" pitchFamily="49" charset="0"/>
+              <a:cs typeface="Courier New" panose="02070309020205020404" pitchFamily="49" charset="0"/>
+            </a:endParaRPr>
+          </a:p>
+          <a:p>
+            <a:r>
+              <a:rPr lang="en-GB" sz="1200" dirty="0">
+                <a:latin typeface="Courier New" panose="02070309020205020404" pitchFamily="49" charset="0"/>
+                <a:cs typeface="Courier New" panose="02070309020205020404" pitchFamily="49" charset="0"/>
+              </a:rPr>
+              <a:t># More complex examples</a:t>
+            </a:r>
+          </a:p>
+          <a:p>
+            <a:r>
+              <a:rPr lang="en-GB" sz="1200" dirty="0">
+                <a:latin typeface="Courier New" panose="02070309020205020404" pitchFamily="49" charset="0"/>
+                <a:cs typeface="Courier New" panose="02070309020205020404" pitchFamily="49" charset="0"/>
+              </a:rPr>
+              <a:t>print ((1 == 2 and 3 == 4) or (4 == 5 and 4 == 4))</a:t>
+            </a:r>
+          </a:p>
+          <a:p>
+            <a:r>
+              <a:rPr lang="en-GB" sz="1200" dirty="0">
+                <a:latin typeface="Courier New" panose="02070309020205020404" pitchFamily="49" charset="0"/>
+                <a:cs typeface="Courier New" panose="02070309020205020404" pitchFamily="49" charset="0"/>
+              </a:rPr>
+              <a:t>print ((1 == 2 and 3 == 4) or (5 == 5 and 4 == 4))</a:t>
+            </a:r>
+          </a:p>
+          <a:p>
+            <a:r>
+              <a:rPr lang="en-GB" sz="1200" dirty="0">
+                <a:latin typeface="Courier New" panose="02070309020205020404" pitchFamily="49" charset="0"/>
+                <a:cs typeface="Courier New" panose="02070309020205020404" pitchFamily="49" charset="0"/>
+              </a:rPr>
+              <a:t>print ((1 == 1 or 3 == 4) and (2 == 3 or 4 == 4))</a:t>
+            </a:r>
+          </a:p>
+        </p:txBody>
+      </p:sp>
+      <p:sp>
+        <p:nvSpPr>
+          <p:cNvPr id="7" name="Rectangle 6"/>
+          <p:cNvSpPr/>
+          <p:nvPr/>
+        </p:nvSpPr>
+        <p:spPr>
+          <a:xfrm>
+            <a:off x="6742111" y="5943150"/>
+            <a:ext cx="5619222" cy="646331"/>
+          </a:xfrm>
+          <a:prstGeom prst="rect">
+            <a:avLst/>
+          </a:prstGeom>
+        </p:spPr>
+        <p:txBody>
+          <a:bodyPr wrap="square">
+            <a:spAutoFit/>
+          </a:bodyPr>
+          <a:lstStyle/>
+          <a:p>
+            <a:pPr marL="285750" indent="-285750">
+              <a:buFont typeface="Arial" panose="020B0604020202020204" pitchFamily="34" charset="0"/>
+              <a:buChar char="•"/>
+            </a:pPr>
+            <a:r>
+              <a:rPr lang="en-GB" dirty="0">
+                <a:solidFill>
+                  <a:srgbClr val="FFFF00"/>
+                </a:solidFill>
+              </a:rPr>
+              <a:t>What do you think this program will do ?</a:t>
+            </a:r>
+          </a:p>
+          <a:p>
+            <a:pPr marL="285750" indent="-285750">
+              <a:buFont typeface="Arial" panose="020B0604020202020204" pitchFamily="34" charset="0"/>
+              <a:buChar char="•"/>
+            </a:pPr>
+            <a:r>
+              <a:rPr lang="en-GB" dirty="0">
+                <a:solidFill>
+                  <a:srgbClr val="FFFF00"/>
+                </a:solidFill>
+              </a:rPr>
+              <a:t>Type it in and see if you are correct.</a:t>
+            </a:r>
+            <a:endParaRPr lang="en-GB" dirty="0"/>
+          </a:p>
+        </p:txBody>
+      </p:sp>
+    </p:spTree>
+    <p:extLst>
+      <p:ext uri="{BB962C8B-B14F-4D97-AF65-F5344CB8AC3E}">
+        <p14:creationId xmlns:p14="http://schemas.microsoft.com/office/powerpoint/2010/main" val="2011305127"/>
+      </p:ext>
+    </p:extLst>
+  </p:cSld>
+  <p:clrMapOvr>
+    <a:masterClrMapping/>
+  </p:clrMapOvr>
+  <p:timing>
+    <p:tnLst>
+      <p:par>
+        <p:cTn id="1" dur="indefinite" restart="never" nodeType="tmRoot"/>
+      </p:par>
+    </p:tnLst>
+  </p:timing>
+</p:sld>
+</file>
+
+<file path=ppt/slides/slide19.xml><?xml version="1.0" encoding="utf-8"?>
+<p:sld xmlns:a="http://schemas.openxmlformats.org/drawingml/2006/main" xmlns:r="http://schemas.openxmlformats.org/officeDocument/2006/relationships" xmlns:p="http://schemas.openxmlformats.org/presentationml/2006/main">
+  <p:cSld>
+    <p:spTree>
+      <p:nvGrpSpPr>
+        <p:cNvPr id="1" name=""/>
+        <p:cNvGrpSpPr/>
+        <p:nvPr/>
+      </p:nvGrpSpPr>
+      <p:grpSpPr>
+        <a:xfrm>
+          <a:off x="0" y="0"/>
+          <a:ext cx="0" cy="0"/>
+          <a:chOff x="0" y="0"/>
+          <a:chExt cx="0" cy="0"/>
+        </a:xfrm>
+      </p:grpSpPr>
+      <p:sp>
+        <p:nvSpPr>
+          <p:cNvPr id="2" name="Title 1"/>
+          <p:cNvSpPr>
+            <a:spLocks noGrp="1"/>
+          </p:cNvSpPr>
+          <p:nvPr>
+            <p:ph type="title"/>
+          </p:nvPr>
+        </p:nvSpPr>
+        <p:spPr/>
+        <p:txBody>
+          <a:bodyPr/>
+          <a:lstStyle/>
+          <a:p>
+            <a:r>
+              <a:rPr lang="en-GB" dirty="0" smtClean="0"/>
+              <a:t>Homework 1.</a:t>
+            </a:r>
+            <a:endParaRPr lang="en-GB" dirty="0"/>
+          </a:p>
+        </p:txBody>
+      </p:sp>
+      <p:sp>
+        <p:nvSpPr>
+          <p:cNvPr id="3" name="Rectangle 2"/>
+          <p:cNvSpPr/>
+          <p:nvPr/>
+        </p:nvSpPr>
+        <p:spPr>
+          <a:xfrm>
+            <a:off x="5614587" y="2052919"/>
+            <a:ext cx="6213346" cy="646331"/>
+          </a:xfrm>
+          <a:prstGeom prst="rect">
+            <a:avLst/>
+          </a:prstGeom>
+        </p:spPr>
+        <p:txBody>
+          <a:bodyPr wrap="square">
+            <a:spAutoFit/>
+          </a:bodyPr>
+          <a:lstStyle/>
+          <a:p>
+            <a:endParaRPr lang="en-GB" sz="1200" dirty="0">
+              <a:latin typeface="Courier New" panose="02070309020205020404" pitchFamily="49" charset="0"/>
+              <a:cs typeface="Courier New" panose="02070309020205020404" pitchFamily="49" charset="0"/>
+            </a:endParaRPr>
+          </a:p>
+          <a:p>
+            <a:endParaRPr lang="en-GB" sz="1200" dirty="0">
+              <a:latin typeface="Courier New" panose="02070309020205020404" pitchFamily="49" charset="0"/>
+              <a:cs typeface="Courier New" panose="02070309020205020404" pitchFamily="49" charset="0"/>
+            </a:endParaRPr>
+          </a:p>
+          <a:p>
+            <a:endParaRPr lang="en-GB" sz="1200" dirty="0">
+              <a:latin typeface="Courier New" panose="02070309020205020404" pitchFamily="49" charset="0"/>
+              <a:cs typeface="Courier New" panose="02070309020205020404" pitchFamily="49" charset="0"/>
+            </a:endParaRPr>
+          </a:p>
+        </p:txBody>
+      </p:sp>
+      <p:sp>
+        <p:nvSpPr>
+          <p:cNvPr id="8" name="Content Placeholder 2"/>
+          <p:cNvSpPr>
+            <a:spLocks noGrp="1"/>
+          </p:cNvSpPr>
+          <p:nvPr>
+            <p:ph idx="1"/>
+          </p:nvPr>
+        </p:nvSpPr>
+        <p:spPr>
+          <a:xfrm>
+            <a:off x="651531" y="1623002"/>
+            <a:ext cx="4840289" cy="3853631"/>
+          </a:xfrm>
+        </p:spPr>
+        <p:txBody>
+          <a:bodyPr>
+            <a:normAutofit/>
+          </a:bodyPr>
+          <a:lstStyle/>
+          <a:p>
+            <a:r>
+              <a:rPr lang="en-GB" dirty="0" smtClean="0"/>
+              <a:t>Starting with the program on the right, add to it so :-</a:t>
+            </a:r>
+          </a:p>
+          <a:p>
+            <a:pPr lvl="1"/>
+            <a:r>
+              <a:rPr lang="en-GB" dirty="0" smtClean="0"/>
+              <a:t>Print the planets backwards.</a:t>
+            </a:r>
+          </a:p>
+          <a:p>
+            <a:pPr lvl="1"/>
+            <a:r>
+              <a:rPr lang="en-GB" dirty="0" smtClean="0"/>
+              <a:t>Print only the rocky planets.</a:t>
+            </a:r>
+          </a:p>
+          <a:p>
+            <a:pPr lvl="1"/>
+            <a:r>
+              <a:rPr lang="en-GB" dirty="0" smtClean="0"/>
+              <a:t>Print only the gas giants.</a:t>
+            </a:r>
+          </a:p>
+          <a:p>
+            <a:pPr lvl="1"/>
+            <a:r>
+              <a:rPr lang="en-GB" dirty="0" smtClean="0"/>
+              <a:t>Print the gas giants backwards.</a:t>
+            </a:r>
+          </a:p>
+          <a:p>
+            <a:pPr lvl="1"/>
+            <a:r>
+              <a:rPr lang="en-GB" dirty="0" smtClean="0"/>
+              <a:t>Print everyone other planet, starting with Mercury.</a:t>
+            </a:r>
+          </a:p>
+          <a:p>
+            <a:pPr lvl="1"/>
+            <a:r>
+              <a:rPr lang="en-GB" dirty="0" smtClean="0"/>
+              <a:t>Print every other planet backwards, starting at Saturn.</a:t>
+            </a:r>
+            <a:endParaRPr lang="en-GB" dirty="0" smtClean="0"/>
+          </a:p>
+          <a:p>
+            <a:pPr lvl="1"/>
+            <a:endParaRPr lang="en-GB" dirty="0" smtClean="0"/>
+          </a:p>
+          <a:p>
+            <a:endParaRPr lang="en-GB" dirty="0"/>
+          </a:p>
+        </p:txBody>
+      </p:sp>
+      <p:sp>
+        <p:nvSpPr>
+          <p:cNvPr id="9" name="Rectangle 8"/>
+          <p:cNvSpPr/>
+          <p:nvPr/>
+        </p:nvSpPr>
+        <p:spPr>
+          <a:xfrm>
+            <a:off x="5860120" y="1613067"/>
+            <a:ext cx="6096000" cy="1200329"/>
+          </a:xfrm>
+          <a:prstGeom prst="rect">
+            <a:avLst/>
+          </a:prstGeom>
+        </p:spPr>
+        <p:txBody>
+          <a:bodyPr>
+            <a:spAutoFit/>
+          </a:bodyPr>
+          <a:lstStyle/>
+          <a:p>
+            <a:r>
+              <a:rPr lang="en-GB" sz="1100" dirty="0" smtClean="0">
+                <a:latin typeface="Courier New" panose="02070309020205020404" pitchFamily="49" charset="0"/>
+                <a:cs typeface="Courier New" panose="02070309020205020404" pitchFamily="49" charset="0"/>
+              </a:rPr>
+              <a:t># </a:t>
+            </a:r>
+            <a:r>
+              <a:rPr lang="en-GB" sz="1100" dirty="0">
+                <a:latin typeface="Courier New" panose="02070309020205020404" pitchFamily="49" charset="0"/>
+                <a:cs typeface="Courier New" panose="02070309020205020404" pitchFamily="49" charset="0"/>
+              </a:rPr>
+              <a:t>Week4, Homework1</a:t>
+            </a:r>
+          </a:p>
+          <a:p>
+            <a:endParaRPr lang="en-GB" sz="1100" dirty="0">
+              <a:latin typeface="Courier New" panose="02070309020205020404" pitchFamily="49" charset="0"/>
+              <a:cs typeface="Courier New" panose="02070309020205020404" pitchFamily="49" charset="0"/>
+            </a:endParaRPr>
+          </a:p>
+          <a:p>
+            <a:r>
+              <a:rPr lang="en-GB" sz="1100" dirty="0">
+                <a:latin typeface="Courier New" panose="02070309020205020404" pitchFamily="49" charset="0"/>
+                <a:cs typeface="Courier New" panose="02070309020205020404" pitchFamily="49" charset="0"/>
+              </a:rPr>
+              <a:t>planets = ['Mercury', 'Venus', 'Earth', 'Mars']</a:t>
+            </a:r>
+          </a:p>
+          <a:p>
+            <a:r>
+              <a:rPr lang="en-GB" sz="1100" dirty="0" err="1">
+                <a:latin typeface="Courier New" panose="02070309020205020404" pitchFamily="49" charset="0"/>
+                <a:cs typeface="Courier New" panose="02070309020205020404" pitchFamily="49" charset="0"/>
+              </a:rPr>
+              <a:t>planets.extend</a:t>
+            </a:r>
+            <a:r>
+              <a:rPr lang="en-GB" sz="1100" dirty="0">
+                <a:latin typeface="Courier New" panose="02070309020205020404" pitchFamily="49" charset="0"/>
+                <a:cs typeface="Courier New" panose="02070309020205020404" pitchFamily="49" charset="0"/>
+              </a:rPr>
+              <a:t>(['Jupiter', 'Saturn', 'Uranus', 'Neptune'])</a:t>
+            </a:r>
+          </a:p>
+          <a:p>
+            <a:endParaRPr lang="en-GB" sz="1400" dirty="0">
+              <a:latin typeface="Courier New" panose="02070309020205020404" pitchFamily="49" charset="0"/>
+              <a:cs typeface="Courier New" panose="02070309020205020404" pitchFamily="49" charset="0"/>
+            </a:endParaRPr>
+          </a:p>
+          <a:p>
+            <a:endParaRPr lang="en-GB" sz="1400" dirty="0">
+              <a:latin typeface="Courier New" panose="02070309020205020404" pitchFamily="49" charset="0"/>
+              <a:cs typeface="Courier New" panose="02070309020205020404" pitchFamily="49" charset="0"/>
+            </a:endParaRPr>
+          </a:p>
+        </p:txBody>
+      </p:sp>
+    </p:spTree>
+    <p:extLst>
+      <p:ext uri="{BB962C8B-B14F-4D97-AF65-F5344CB8AC3E}">
+        <p14:creationId xmlns:p14="http://schemas.microsoft.com/office/powerpoint/2010/main" val="2425411410"/>
       </p:ext>
     </p:extLst>
   </p:cSld>
@@ -7288,6 +9666,648 @@
       </p:par>
     </p:tnLst>
   </p:timing>
+</p:sld>
+</file>
+
+<file path=ppt/slides/slide20.xml><?xml version="1.0" encoding="utf-8"?>
+<p:sld xmlns:a="http://schemas.openxmlformats.org/drawingml/2006/main" xmlns:r="http://schemas.openxmlformats.org/officeDocument/2006/relationships" xmlns:p="http://schemas.openxmlformats.org/presentationml/2006/main">
+  <p:cSld>
+    <p:spTree>
+      <p:nvGrpSpPr>
+        <p:cNvPr id="1" name=""/>
+        <p:cNvGrpSpPr/>
+        <p:nvPr/>
+      </p:nvGrpSpPr>
+      <p:grpSpPr>
+        <a:xfrm>
+          <a:off x="0" y="0"/>
+          <a:ext cx="0" cy="0"/>
+          <a:chOff x="0" y="0"/>
+          <a:chExt cx="0" cy="0"/>
+        </a:xfrm>
+      </p:grpSpPr>
+      <p:sp>
+        <p:nvSpPr>
+          <p:cNvPr id="2" name="Title 1"/>
+          <p:cNvSpPr>
+            <a:spLocks noGrp="1"/>
+          </p:cNvSpPr>
+          <p:nvPr>
+            <p:ph type="title"/>
+          </p:nvPr>
+        </p:nvSpPr>
+        <p:spPr/>
+        <p:txBody>
+          <a:bodyPr/>
+          <a:lstStyle/>
+          <a:p>
+            <a:r>
+              <a:rPr lang="en-GB" dirty="0" smtClean="0"/>
+              <a:t>Homework 2.</a:t>
+            </a:r>
+            <a:endParaRPr lang="en-GB" dirty="0"/>
+          </a:p>
+        </p:txBody>
+      </p:sp>
+      <p:sp>
+        <p:nvSpPr>
+          <p:cNvPr id="3" name="Rectangle 2"/>
+          <p:cNvSpPr/>
+          <p:nvPr/>
+        </p:nvSpPr>
+        <p:spPr>
+          <a:xfrm>
+            <a:off x="5614587" y="2052919"/>
+            <a:ext cx="6213346" cy="646331"/>
+          </a:xfrm>
+          <a:prstGeom prst="rect">
+            <a:avLst/>
+          </a:prstGeom>
+        </p:spPr>
+        <p:txBody>
+          <a:bodyPr wrap="square">
+            <a:spAutoFit/>
+          </a:bodyPr>
+          <a:lstStyle/>
+          <a:p>
+            <a:endParaRPr lang="en-GB" sz="1200" dirty="0">
+              <a:latin typeface="Courier New" panose="02070309020205020404" pitchFamily="49" charset="0"/>
+              <a:cs typeface="Courier New" panose="02070309020205020404" pitchFamily="49" charset="0"/>
+            </a:endParaRPr>
+          </a:p>
+          <a:p>
+            <a:endParaRPr lang="en-GB" sz="1200" dirty="0">
+              <a:latin typeface="Courier New" panose="02070309020205020404" pitchFamily="49" charset="0"/>
+              <a:cs typeface="Courier New" panose="02070309020205020404" pitchFamily="49" charset="0"/>
+            </a:endParaRPr>
+          </a:p>
+          <a:p>
+            <a:endParaRPr lang="en-GB" sz="1200" dirty="0">
+              <a:latin typeface="Courier New" panose="02070309020205020404" pitchFamily="49" charset="0"/>
+              <a:cs typeface="Courier New" panose="02070309020205020404" pitchFamily="49" charset="0"/>
+            </a:endParaRPr>
+          </a:p>
+        </p:txBody>
+      </p:sp>
+      <p:sp>
+        <p:nvSpPr>
+          <p:cNvPr id="8" name="Content Placeholder 2"/>
+          <p:cNvSpPr>
+            <a:spLocks noGrp="1"/>
+          </p:cNvSpPr>
+          <p:nvPr>
+            <p:ph idx="1"/>
+          </p:nvPr>
+        </p:nvSpPr>
+        <p:spPr>
+          <a:xfrm>
+            <a:off x="651531" y="1623002"/>
+            <a:ext cx="8863172" cy="3853631"/>
+          </a:xfrm>
+        </p:spPr>
+        <p:txBody>
+          <a:bodyPr>
+            <a:normAutofit/>
+          </a:bodyPr>
+          <a:lstStyle/>
+          <a:p>
+            <a:r>
+              <a:rPr lang="en-GB" dirty="0" smtClean="0"/>
+              <a:t>Write a program which :-</a:t>
+            </a:r>
+          </a:p>
+          <a:p>
+            <a:pPr lvl="1"/>
+            <a:r>
+              <a:rPr lang="en-GB" dirty="0" smtClean="0"/>
+              <a:t>Uses a while loop to put the numbers 1 to 10 into a list.</a:t>
+            </a:r>
+          </a:p>
+          <a:p>
+            <a:pPr lvl="1"/>
+            <a:r>
+              <a:rPr lang="en-GB" dirty="0" smtClean="0"/>
+              <a:t>Print that list.</a:t>
+            </a:r>
+          </a:p>
+          <a:p>
+            <a:pPr lvl="1"/>
+            <a:r>
+              <a:rPr lang="en-GB" dirty="0" smtClean="0"/>
+              <a:t>Print that list backwords.</a:t>
+            </a:r>
+          </a:p>
+          <a:p>
+            <a:pPr lvl="1"/>
+            <a:r>
+              <a:rPr lang="en-GB" dirty="0" smtClean="0"/>
+              <a:t>Print just the odd numbers.</a:t>
+            </a:r>
+          </a:p>
+          <a:p>
+            <a:pPr lvl="1"/>
+            <a:r>
+              <a:rPr lang="en-GB" dirty="0" smtClean="0"/>
+              <a:t>Print just the even numbers.</a:t>
+            </a:r>
+          </a:p>
+          <a:p>
+            <a:pPr lvl="1"/>
+            <a:r>
+              <a:rPr lang="en-GB" dirty="0" smtClean="0"/>
+              <a:t>Print just the odd numbers backwards.</a:t>
+            </a:r>
+          </a:p>
+          <a:p>
+            <a:pPr lvl="1"/>
+            <a:r>
+              <a:rPr lang="en-GB" dirty="0" smtClean="0"/>
+              <a:t>Print just the even numbers backwards.</a:t>
+            </a:r>
+          </a:p>
+          <a:p>
+            <a:endParaRPr lang="en-GB" dirty="0"/>
+          </a:p>
+          <a:p>
+            <a:endParaRPr lang="en-GB" dirty="0" smtClean="0"/>
+          </a:p>
+          <a:p>
+            <a:pPr lvl="1"/>
+            <a:endParaRPr lang="en-GB" dirty="0" smtClean="0"/>
+          </a:p>
+          <a:p>
+            <a:endParaRPr lang="en-GB" dirty="0"/>
+          </a:p>
+        </p:txBody>
+      </p:sp>
+    </p:spTree>
+    <p:extLst>
+      <p:ext uri="{BB962C8B-B14F-4D97-AF65-F5344CB8AC3E}">
+        <p14:creationId xmlns:p14="http://schemas.microsoft.com/office/powerpoint/2010/main" val="1330421146"/>
+      </p:ext>
+    </p:extLst>
+  </p:cSld>
+  <p:clrMapOvr>
+    <a:masterClrMapping/>
+  </p:clrMapOvr>
+  <p:timing>
+    <p:tnLst>
+      <p:par>
+        <p:cTn id="1" dur="indefinite" restart="never" nodeType="tmRoot"/>
+      </p:par>
+    </p:tnLst>
+  </p:timing>
+</p:sld>
+</file>
+
+<file path=ppt/slides/slide21.xml><?xml version="1.0" encoding="utf-8"?>
+<p:sld xmlns:a="http://schemas.openxmlformats.org/drawingml/2006/main" xmlns:r="http://schemas.openxmlformats.org/officeDocument/2006/relationships" xmlns:p="http://schemas.openxmlformats.org/presentationml/2006/main">
+  <p:cSld>
+    <p:spTree>
+      <p:nvGrpSpPr>
+        <p:cNvPr id="1" name=""/>
+        <p:cNvGrpSpPr/>
+        <p:nvPr/>
+      </p:nvGrpSpPr>
+      <p:grpSpPr>
+        <a:xfrm>
+          <a:off x="0" y="0"/>
+          <a:ext cx="0" cy="0"/>
+          <a:chOff x="0" y="0"/>
+          <a:chExt cx="0" cy="0"/>
+        </a:xfrm>
+      </p:grpSpPr>
+      <p:sp>
+        <p:nvSpPr>
+          <p:cNvPr id="2" name="Title 1"/>
+          <p:cNvSpPr>
+            <a:spLocks noGrp="1"/>
+          </p:cNvSpPr>
+          <p:nvPr>
+            <p:ph type="title"/>
+          </p:nvPr>
+        </p:nvSpPr>
+        <p:spPr/>
+        <p:txBody>
+          <a:bodyPr/>
+          <a:lstStyle/>
+          <a:p>
+            <a:r>
+              <a:rPr lang="en-GB" dirty="0" smtClean="0"/>
+              <a:t>Homework 3.</a:t>
+            </a:r>
+            <a:endParaRPr lang="en-GB" dirty="0"/>
+          </a:p>
+        </p:txBody>
+      </p:sp>
+      <p:sp>
+        <p:nvSpPr>
+          <p:cNvPr id="3" name="Rectangle 2"/>
+          <p:cNvSpPr/>
+          <p:nvPr/>
+        </p:nvSpPr>
+        <p:spPr>
+          <a:xfrm>
+            <a:off x="5614587" y="2052919"/>
+            <a:ext cx="6213346" cy="646331"/>
+          </a:xfrm>
+          <a:prstGeom prst="rect">
+            <a:avLst/>
+          </a:prstGeom>
+        </p:spPr>
+        <p:txBody>
+          <a:bodyPr wrap="square">
+            <a:spAutoFit/>
+          </a:bodyPr>
+          <a:lstStyle/>
+          <a:p>
+            <a:endParaRPr lang="en-GB" sz="1200" dirty="0">
+              <a:latin typeface="Courier New" panose="02070309020205020404" pitchFamily="49" charset="0"/>
+              <a:cs typeface="Courier New" panose="02070309020205020404" pitchFamily="49" charset="0"/>
+            </a:endParaRPr>
+          </a:p>
+          <a:p>
+            <a:endParaRPr lang="en-GB" sz="1200" dirty="0">
+              <a:latin typeface="Courier New" panose="02070309020205020404" pitchFamily="49" charset="0"/>
+              <a:cs typeface="Courier New" panose="02070309020205020404" pitchFamily="49" charset="0"/>
+            </a:endParaRPr>
+          </a:p>
+          <a:p>
+            <a:endParaRPr lang="en-GB" sz="1200" dirty="0">
+              <a:latin typeface="Courier New" panose="02070309020205020404" pitchFamily="49" charset="0"/>
+              <a:cs typeface="Courier New" panose="02070309020205020404" pitchFamily="49" charset="0"/>
+            </a:endParaRPr>
+          </a:p>
+        </p:txBody>
+      </p:sp>
+      <p:sp>
+        <p:nvSpPr>
+          <p:cNvPr id="8" name="Content Placeholder 2"/>
+          <p:cNvSpPr>
+            <a:spLocks noGrp="1"/>
+          </p:cNvSpPr>
+          <p:nvPr>
+            <p:ph idx="1"/>
+          </p:nvPr>
+        </p:nvSpPr>
+        <p:spPr>
+          <a:xfrm>
+            <a:off x="651531" y="1623002"/>
+            <a:ext cx="10189464" cy="3853631"/>
+          </a:xfrm>
+        </p:spPr>
+        <p:txBody>
+          <a:bodyPr>
+            <a:normAutofit/>
+          </a:bodyPr>
+          <a:lstStyle/>
+          <a:p>
+            <a:r>
+              <a:rPr lang="en-GB" dirty="0" smtClean="0"/>
+              <a:t>Write a program which takes the string.</a:t>
+            </a:r>
+          </a:p>
+          <a:p>
+            <a:pPr lvl="1"/>
+            <a:r>
+              <a:rPr lang="en-GB" dirty="0" smtClean="0"/>
+              <a:t>"</a:t>
+            </a:r>
+            <a:r>
+              <a:rPr lang="en-GB" dirty="0" err="1" smtClean="0"/>
+              <a:t>racecar</a:t>
+            </a:r>
+            <a:r>
+              <a:rPr lang="en-GB" dirty="0" smtClean="0"/>
+              <a:t>"</a:t>
+            </a:r>
+          </a:p>
+          <a:p>
+            <a:pPr lvl="1"/>
+            <a:endParaRPr lang="en-GB" dirty="0"/>
+          </a:p>
+          <a:p>
+            <a:r>
+              <a:rPr lang="en-GB" dirty="0" smtClean="0"/>
+              <a:t>Using slices, print just "car" from the string.</a:t>
+            </a:r>
+          </a:p>
+          <a:p>
+            <a:r>
+              <a:rPr lang="en-GB" dirty="0" smtClean="0"/>
+              <a:t>Using slices, print just "race" from the string.</a:t>
+            </a:r>
+          </a:p>
+          <a:p>
+            <a:r>
+              <a:rPr lang="en-GB" dirty="0" smtClean="0"/>
+              <a:t>Using slices, print the string backwards. What do you notice about it ?</a:t>
+            </a:r>
+          </a:p>
+          <a:p>
+            <a:pPr lvl="1"/>
+            <a:r>
+              <a:rPr lang="en-GB" i="1" dirty="0" smtClean="0"/>
+              <a:t>Extra Credit: Look </a:t>
+            </a:r>
+            <a:r>
+              <a:rPr lang="en-GB" i="1" dirty="0"/>
+              <a:t>up </a:t>
+            </a:r>
+            <a:r>
+              <a:rPr lang="en-GB" i="1" dirty="0" smtClean="0"/>
+              <a:t>"palindrome" in a dictionary. We will be using palindromes in the program we write for next week.</a:t>
+            </a:r>
+            <a:endParaRPr lang="en-GB" dirty="0"/>
+          </a:p>
+        </p:txBody>
+      </p:sp>
+    </p:spTree>
+    <p:extLst>
+      <p:ext uri="{BB962C8B-B14F-4D97-AF65-F5344CB8AC3E}">
+        <p14:creationId xmlns:p14="http://schemas.microsoft.com/office/powerpoint/2010/main" val="2907997936"/>
+      </p:ext>
+    </p:extLst>
+  </p:cSld>
+  <p:clrMapOvr>
+    <a:masterClrMapping/>
+  </p:clrMapOvr>
+  <p:timing>
+    <p:tnLst>
+      <p:par>
+        <p:cTn id="1" dur="indefinite" restart="never" nodeType="tmRoot"/>
+      </p:par>
+    </p:tnLst>
+  </p:timing>
+</p:sld>
+</file>
+
+<file path=ppt/slides/slide22.xml><?xml version="1.0" encoding="utf-8"?>
+<p:sld xmlns:a="http://schemas.openxmlformats.org/drawingml/2006/main" xmlns:r="http://schemas.openxmlformats.org/officeDocument/2006/relationships" xmlns:p="http://schemas.openxmlformats.org/presentationml/2006/main">
+  <p:cSld>
+    <p:spTree>
+      <p:nvGrpSpPr>
+        <p:cNvPr id="1" name=""/>
+        <p:cNvGrpSpPr/>
+        <p:nvPr/>
+      </p:nvGrpSpPr>
+      <p:grpSpPr>
+        <a:xfrm>
+          <a:off x="0" y="0"/>
+          <a:ext cx="0" cy="0"/>
+          <a:chOff x="0" y="0"/>
+          <a:chExt cx="0" cy="0"/>
+        </a:xfrm>
+      </p:grpSpPr>
+      <p:sp>
+        <p:nvSpPr>
+          <p:cNvPr id="2" name="Title 1"/>
+          <p:cNvSpPr>
+            <a:spLocks noGrp="1"/>
+          </p:cNvSpPr>
+          <p:nvPr>
+            <p:ph type="title"/>
+          </p:nvPr>
+        </p:nvSpPr>
+        <p:spPr/>
+        <p:txBody>
+          <a:bodyPr/>
+          <a:lstStyle/>
+          <a:p>
+            <a:r>
+              <a:rPr lang="en-GB" dirty="0" smtClean="0"/>
+              <a:t>Homework 4.</a:t>
+            </a:r>
+            <a:endParaRPr lang="en-GB" dirty="0"/>
+          </a:p>
+        </p:txBody>
+      </p:sp>
+      <p:sp>
+        <p:nvSpPr>
+          <p:cNvPr id="3" name="Rectangle 2"/>
+          <p:cNvSpPr/>
+          <p:nvPr/>
+        </p:nvSpPr>
+        <p:spPr>
+          <a:xfrm>
+            <a:off x="5614587" y="2052919"/>
+            <a:ext cx="6213346" cy="646331"/>
+          </a:xfrm>
+          <a:prstGeom prst="rect">
+            <a:avLst/>
+          </a:prstGeom>
+        </p:spPr>
+        <p:txBody>
+          <a:bodyPr wrap="square">
+            <a:spAutoFit/>
+          </a:bodyPr>
+          <a:lstStyle/>
+          <a:p>
+            <a:endParaRPr lang="en-GB" sz="1200" dirty="0">
+              <a:latin typeface="Courier New" panose="02070309020205020404" pitchFamily="49" charset="0"/>
+              <a:cs typeface="Courier New" panose="02070309020205020404" pitchFamily="49" charset="0"/>
+            </a:endParaRPr>
+          </a:p>
+          <a:p>
+            <a:endParaRPr lang="en-GB" sz="1200" dirty="0">
+              <a:latin typeface="Courier New" panose="02070309020205020404" pitchFamily="49" charset="0"/>
+              <a:cs typeface="Courier New" panose="02070309020205020404" pitchFamily="49" charset="0"/>
+            </a:endParaRPr>
+          </a:p>
+          <a:p>
+            <a:endParaRPr lang="en-GB" sz="1200" dirty="0">
+              <a:latin typeface="Courier New" panose="02070309020205020404" pitchFamily="49" charset="0"/>
+              <a:cs typeface="Courier New" panose="02070309020205020404" pitchFamily="49" charset="0"/>
+            </a:endParaRPr>
+          </a:p>
+        </p:txBody>
+      </p:sp>
+      <p:sp>
+        <p:nvSpPr>
+          <p:cNvPr id="8" name="Content Placeholder 2"/>
+          <p:cNvSpPr>
+            <a:spLocks noGrp="1"/>
+          </p:cNvSpPr>
+          <p:nvPr>
+            <p:ph idx="1"/>
+          </p:nvPr>
+        </p:nvSpPr>
+        <p:spPr>
+          <a:xfrm>
+            <a:off x="646111" y="2273791"/>
+            <a:ext cx="10189464" cy="3853631"/>
+          </a:xfrm>
+        </p:spPr>
+        <p:txBody>
+          <a:bodyPr>
+            <a:normAutofit/>
+          </a:bodyPr>
+          <a:lstStyle/>
+          <a:p>
+            <a:r>
+              <a:rPr lang="en-GB" dirty="0" smtClean="0"/>
+              <a:t>Using a while loop, ask the user to input 3 peoples names. Store these names in a list.</a:t>
+            </a:r>
+          </a:p>
+          <a:p>
+            <a:endParaRPr lang="en-GB" dirty="0"/>
+          </a:p>
+          <a:p>
+            <a:r>
+              <a:rPr lang="en-GB" dirty="0" smtClean="0"/>
+              <a:t>When the program runs, indicate if :-</a:t>
+            </a:r>
+          </a:p>
+          <a:p>
+            <a:pPr lvl="1"/>
+            <a:r>
+              <a:rPr lang="en-GB" dirty="0" smtClean="0"/>
+              <a:t>All the names are the same.</a:t>
+            </a:r>
+          </a:p>
+          <a:p>
+            <a:pPr lvl="1"/>
+            <a:r>
+              <a:rPr lang="en-GB" dirty="0" smtClean="0"/>
+              <a:t>Any of the names are the same.</a:t>
+            </a:r>
+          </a:p>
+          <a:p>
+            <a:pPr lvl="1"/>
+            <a:r>
+              <a:rPr lang="en-GB" dirty="0" smtClean="0"/>
+              <a:t>All the names are different.</a:t>
+            </a:r>
+          </a:p>
+          <a:p>
+            <a:endParaRPr lang="en-GB" dirty="0" smtClean="0"/>
+          </a:p>
+          <a:p>
+            <a:endParaRPr lang="en-GB" dirty="0"/>
+          </a:p>
+        </p:txBody>
+      </p:sp>
+    </p:spTree>
+    <p:extLst>
+      <p:ext uri="{BB962C8B-B14F-4D97-AF65-F5344CB8AC3E}">
+        <p14:creationId xmlns:p14="http://schemas.microsoft.com/office/powerpoint/2010/main" val="825028369"/>
+      </p:ext>
+    </p:extLst>
+  </p:cSld>
+  <p:clrMapOvr>
+    <a:masterClrMapping/>
+  </p:clrMapOvr>
+  <p:timing>
+    <p:tnLst>
+      <p:par>
+        <p:cTn id="1" dur="indefinite" restart="never" nodeType="tmRoot"/>
+      </p:par>
+    </p:tnLst>
+  </p:timing>
+</p:sld>
+</file>
+
+<file path=ppt/slides/slide23.xml><?xml version="1.0" encoding="utf-8"?>
+<p:sld xmlns:a="http://schemas.openxmlformats.org/drawingml/2006/main" xmlns:r="http://schemas.openxmlformats.org/officeDocument/2006/relationships" xmlns:p="http://schemas.openxmlformats.org/presentationml/2006/main">
+  <p:cSld>
+    <p:spTree>
+      <p:nvGrpSpPr>
+        <p:cNvPr id="1" name=""/>
+        <p:cNvGrpSpPr/>
+        <p:nvPr/>
+      </p:nvGrpSpPr>
+      <p:grpSpPr>
+        <a:xfrm>
+          <a:off x="0" y="0"/>
+          <a:ext cx="0" cy="0"/>
+          <a:chOff x="0" y="0"/>
+          <a:chExt cx="0" cy="0"/>
+        </a:xfrm>
+      </p:grpSpPr>
+      <p:sp>
+        <p:nvSpPr>
+          <p:cNvPr id="2" name="Title 1"/>
+          <p:cNvSpPr>
+            <a:spLocks noGrp="1"/>
+          </p:cNvSpPr>
+          <p:nvPr>
+            <p:ph type="title"/>
+          </p:nvPr>
+        </p:nvSpPr>
+        <p:spPr/>
+        <p:txBody>
+          <a:bodyPr/>
+          <a:lstStyle/>
+          <a:p>
+            <a:r>
+              <a:rPr lang="en-GB" dirty="0" smtClean="0"/>
+              <a:t>Next Week</a:t>
+            </a:r>
+            <a:endParaRPr lang="en-GB" dirty="0"/>
+          </a:p>
+        </p:txBody>
+      </p:sp>
+      <p:sp>
+        <p:nvSpPr>
+          <p:cNvPr id="3" name="Content Placeholder 2"/>
+          <p:cNvSpPr>
+            <a:spLocks noGrp="1"/>
+          </p:cNvSpPr>
+          <p:nvPr>
+            <p:ph idx="1"/>
+          </p:nvPr>
+        </p:nvSpPr>
+        <p:spPr/>
+        <p:txBody>
+          <a:bodyPr>
+            <a:normAutofit/>
+          </a:bodyPr>
+          <a:lstStyle/>
+          <a:p>
+            <a:r>
+              <a:rPr lang="en-GB" dirty="0" smtClean="0"/>
+              <a:t>We will learn about how to read things from files, and how to write things to files.</a:t>
+            </a:r>
+          </a:p>
+          <a:p>
+            <a:endParaRPr lang="en-GB" dirty="0" smtClean="0"/>
+          </a:p>
+          <a:p>
+            <a:r>
+              <a:rPr lang="en-GB" dirty="0" smtClean="0"/>
+              <a:t>We will use what we learned this week about Palindromes to find ALL the palindromes in the English Language !</a:t>
+            </a:r>
+          </a:p>
+          <a:p>
+            <a:endParaRPr lang="en-GB" dirty="0"/>
+          </a:p>
+          <a:p>
+            <a:r>
+              <a:rPr lang="en-GB" dirty="0" smtClean="0"/>
+              <a:t>We will learn about random numbers.</a:t>
+            </a:r>
+          </a:p>
+          <a:p>
+            <a:endParaRPr lang="en-GB" dirty="0"/>
+          </a:p>
+          <a:p>
+            <a:r>
+              <a:rPr lang="en-GB" dirty="0" smtClean="0"/>
+              <a:t>We will learn about a new data structure, the dictionary.</a:t>
+            </a:r>
+          </a:p>
+        </p:txBody>
+      </p:sp>
+    </p:spTree>
+    <p:extLst>
+      <p:ext uri="{BB962C8B-B14F-4D97-AF65-F5344CB8AC3E}">
+        <p14:creationId xmlns:p14="http://schemas.microsoft.com/office/powerpoint/2010/main" val="565273063"/>
+      </p:ext>
+    </p:extLst>
+  </p:cSld>
+  <p:clrMapOvr>
+    <a:masterClrMapping/>
+  </p:clrMapOvr>
 </p:sld>
 </file>
 

</xml_diff>

<commit_message>
Edited program numbers in powerpoint and examples on github for consistency. Minor grammatical corrections on powerpoint.
</commit_message>
<xml_diff>
--- a/week4/week4.pptx
+++ b/week4/week4.pptx
@@ -219,7 +219,7 @@
           </a:lstStyle>
           <a:p>
             <a:r>
-              <a:rPr lang="en-US" smtClean="0"/>
+              <a:rPr lang="en-US"/>
               <a:t>Click to edit Master title style</a:t>
             </a:r>
             <a:endParaRPr lang="en-US" dirty="0"/>
@@ -339,7 +339,7 @@
           </a:lstStyle>
           <a:p>
             <a:r>
-              <a:rPr lang="en-US" smtClean="0"/>
+              <a:rPr lang="en-US"/>
               <a:t>Click to edit Master subtitle style</a:t>
             </a:r>
             <a:endParaRPr lang="en-US" dirty="0"/>
@@ -363,7 +363,7 @@
           <a:p>
             <a:fld id="{4AAD347D-5ACD-4C99-B74B-A9C85AD731AF}" type="datetimeFigureOut">
               <a:rPr lang="en-US" dirty="0"/>
-              <a:t>3/5/2018</a:t>
+              <a:t>6/28/2018</a:t>
             </a:fld>
             <a:endParaRPr lang="en-US" dirty="0"/>
           </a:p>
@@ -463,7 +463,7 @@
           </a:lstStyle>
           <a:p>
             <a:r>
-              <a:rPr lang="en-US" smtClean="0"/>
+              <a:rPr lang="en-US"/>
               <a:t>Click to edit Master title style</a:t>
             </a:r>
             <a:endParaRPr lang="en-US" dirty="0"/>
@@ -542,7 +542,7 @@
           </a:lstStyle>
           <a:p>
             <a:r>
-              <a:rPr lang="en-US" smtClean="0"/>
+              <a:rPr lang="en-US"/>
               <a:t>Click icon to add picture</a:t>
             </a:r>
             <a:endParaRPr lang="en-US" dirty="0"/>
@@ -610,7 +610,7 @@
           <a:p>
             <a:pPr lvl="0"/>
             <a:r>
-              <a:rPr lang="en-US" smtClean="0"/>
+              <a:rPr lang="en-US"/>
               <a:t>Click to edit Master text styles</a:t>
             </a:r>
           </a:p>
@@ -633,7 +633,7 @@
           <a:p>
             <a:fld id="{4509A250-FF31-4206-8172-F9D3106AACB1}" type="datetimeFigureOut">
               <a:rPr lang="en-US" dirty="0"/>
-              <a:t>3/5/2018</a:t>
+              <a:t>6/28/2018</a:t>
             </a:fld>
             <a:endParaRPr lang="en-US" dirty="0"/>
           </a:p>
@@ -731,7 +731,7 @@
           </a:lstStyle>
           <a:p>
             <a:r>
-              <a:rPr lang="en-US" smtClean="0"/>
+              <a:rPr lang="en-US"/>
               <a:t>Click to edit Master title style</a:t>
             </a:r>
             <a:endParaRPr lang="en-US" dirty="0"/>
@@ -799,7 +799,7 @@
           <a:p>
             <a:pPr lvl="0"/>
             <a:r>
-              <a:rPr lang="en-US" smtClean="0"/>
+              <a:rPr lang="en-US"/>
               <a:t>Click to edit Master text styles</a:t>
             </a:r>
           </a:p>
@@ -822,7 +822,7 @@
           <a:p>
             <a:fld id="{4509A250-FF31-4206-8172-F9D3106AACB1}" type="datetimeFigureOut">
               <a:rPr lang="en-US" dirty="0"/>
-              <a:t>3/5/2018</a:t>
+              <a:t>6/28/2018</a:t>
             </a:fld>
             <a:endParaRPr lang="en-US" dirty="0"/>
           </a:p>
@@ -920,7 +920,7 @@
           </a:lstStyle>
           <a:p>
             <a:r>
-              <a:rPr lang="en-US" smtClean="0"/>
+              <a:rPr lang="en-US"/>
               <a:t>Click to edit Master title style</a:t>
             </a:r>
             <a:endParaRPr lang="en-US" dirty="0"/>
@@ -1000,7 +1000,7 @@
               <a:buNone/>
             </a:pPr>
             <a:r>
-              <a:rPr lang="en-US" smtClean="0"/>
+              <a:rPr lang="en-US"/>
               <a:t>Click to edit Master text styles</a:t>
             </a:r>
           </a:p>
@@ -1067,7 +1067,7 @@
           <a:p>
             <a:pPr lvl="0"/>
             <a:r>
-              <a:rPr lang="en-US" smtClean="0"/>
+              <a:rPr lang="en-US"/>
               <a:t>Click to edit Master text styles</a:t>
             </a:r>
           </a:p>
@@ -1090,7 +1090,7 @@
           <a:p>
             <a:fld id="{4509A250-FF31-4206-8172-F9D3106AACB1}" type="datetimeFigureOut">
               <a:rPr lang="en-US" dirty="0"/>
-              <a:t>3/5/2018</a:t>
+              <a:t>6/28/2018</a:t>
             </a:fld>
             <a:endParaRPr lang="en-US" dirty="0"/>
           </a:p>
@@ -1282,7 +1282,7 @@
           </a:lstStyle>
           <a:p>
             <a:r>
-              <a:rPr lang="en-US" smtClean="0"/>
+              <a:rPr lang="en-US"/>
               <a:t>Click to edit Master title style</a:t>
             </a:r>
             <a:endParaRPr lang="en-US" dirty="0"/>
@@ -1403,7 +1403,7 @@
           <a:p>
             <a:pPr lvl="0"/>
             <a:r>
-              <a:rPr lang="en-US" smtClean="0"/>
+              <a:rPr lang="en-US"/>
               <a:t>Click to edit Master text styles</a:t>
             </a:r>
           </a:p>
@@ -1426,7 +1426,7 @@
           <a:p>
             <a:fld id="{4509A250-FF31-4206-8172-F9D3106AACB1}" type="datetimeFigureOut">
               <a:rPr lang="en-US" dirty="0"/>
-              <a:t>3/5/2018</a:t>
+              <a:t>6/28/2018</a:t>
             </a:fld>
             <a:endParaRPr lang="en-US" dirty="0"/>
           </a:p>
@@ -1519,7 +1519,7 @@
           </a:lstStyle>
           <a:p>
             <a:r>
-              <a:rPr lang="en-US" smtClean="0"/>
+              <a:rPr lang="en-US"/>
               <a:t>Click to edit Master title style</a:t>
             </a:r>
             <a:endParaRPr lang="en-US" dirty="0"/>
@@ -1594,7 +1594,7 @@
           <a:p>
             <a:pPr lvl="0"/>
             <a:r>
-              <a:rPr lang="en-US" smtClean="0"/>
+              <a:rPr lang="en-US"/>
               <a:t>Click to edit Master text styles</a:t>
             </a:r>
           </a:p>
@@ -1661,7 +1661,7 @@
           <a:p>
             <a:pPr lvl="0"/>
             <a:r>
-              <a:rPr lang="en-US" smtClean="0"/>
+              <a:rPr lang="en-US"/>
               <a:t>Click to edit Master text styles</a:t>
             </a:r>
           </a:p>
@@ -1735,7 +1735,7 @@
           <a:p>
             <a:pPr lvl="0"/>
             <a:r>
-              <a:rPr lang="en-US" smtClean="0"/>
+              <a:rPr lang="en-US"/>
               <a:t>Click to edit Master text styles</a:t>
             </a:r>
           </a:p>
@@ -1802,7 +1802,7 @@
           <a:p>
             <a:pPr lvl="0"/>
             <a:r>
-              <a:rPr lang="en-US" smtClean="0"/>
+              <a:rPr lang="en-US"/>
               <a:t>Click to edit Master text styles</a:t>
             </a:r>
           </a:p>
@@ -1876,7 +1876,7 @@
           <a:p>
             <a:pPr lvl="0"/>
             <a:r>
-              <a:rPr lang="en-US" smtClean="0"/>
+              <a:rPr lang="en-US"/>
               <a:t>Click to edit Master text styles</a:t>
             </a:r>
           </a:p>
@@ -1943,7 +1943,7 @@
           <a:p>
             <a:pPr lvl="0"/>
             <a:r>
-              <a:rPr lang="en-US" smtClean="0"/>
+              <a:rPr lang="en-US"/>
               <a:t>Click to edit Master text styles</a:t>
             </a:r>
           </a:p>
@@ -2044,7 +2044,7 @@
           <a:p>
             <a:fld id="{4509A250-FF31-4206-8172-F9D3106AACB1}" type="datetimeFigureOut">
               <a:rPr lang="en-US" dirty="0"/>
-              <a:t>3/5/2018</a:t>
+              <a:t>6/28/2018</a:t>
             </a:fld>
             <a:endParaRPr lang="en-US" dirty="0"/>
           </a:p>
@@ -2137,7 +2137,7 @@
           </a:lstStyle>
           <a:p>
             <a:r>
-              <a:rPr lang="en-US" smtClean="0"/>
+              <a:rPr lang="en-US"/>
               <a:t>Click to edit Master title style</a:t>
             </a:r>
             <a:endParaRPr lang="en-US" dirty="0"/>
@@ -2212,7 +2212,7 @@
           <a:p>
             <a:pPr lvl="0"/>
             <a:r>
-              <a:rPr lang="en-US" smtClean="0"/>
+              <a:rPr lang="en-US"/>
               <a:t>Click to edit Master text styles</a:t>
             </a:r>
           </a:p>
@@ -2290,7 +2290,7 @@
           </a:lstStyle>
           <a:p>
             <a:r>
-              <a:rPr lang="en-US" smtClean="0"/>
+              <a:rPr lang="en-US"/>
               <a:t>Click icon to add picture</a:t>
             </a:r>
             <a:endParaRPr lang="en-US" dirty="0"/>
@@ -2358,7 +2358,7 @@
           <a:p>
             <a:pPr lvl="0"/>
             <a:r>
-              <a:rPr lang="en-US" smtClean="0"/>
+              <a:rPr lang="en-US"/>
               <a:t>Click to edit Master text styles</a:t>
             </a:r>
           </a:p>
@@ -2432,7 +2432,7 @@
           <a:p>
             <a:pPr lvl="0"/>
             <a:r>
-              <a:rPr lang="en-US" smtClean="0"/>
+              <a:rPr lang="en-US"/>
               <a:t>Click to edit Master text styles</a:t>
             </a:r>
           </a:p>
@@ -2510,7 +2510,7 @@
           </a:lstStyle>
           <a:p>
             <a:r>
-              <a:rPr lang="en-US" smtClean="0"/>
+              <a:rPr lang="en-US"/>
               <a:t>Click icon to add picture</a:t>
             </a:r>
             <a:endParaRPr lang="en-US" dirty="0"/>
@@ -2578,7 +2578,7 @@
           <a:p>
             <a:pPr lvl="0"/>
             <a:r>
-              <a:rPr lang="en-US" smtClean="0"/>
+              <a:rPr lang="en-US"/>
               <a:t>Click to edit Master text styles</a:t>
             </a:r>
           </a:p>
@@ -2652,7 +2652,7 @@
           <a:p>
             <a:pPr lvl="0"/>
             <a:r>
-              <a:rPr lang="en-US" smtClean="0"/>
+              <a:rPr lang="en-US"/>
               <a:t>Click to edit Master text styles</a:t>
             </a:r>
           </a:p>
@@ -2730,7 +2730,7 @@
           </a:lstStyle>
           <a:p>
             <a:r>
-              <a:rPr lang="en-US" smtClean="0"/>
+              <a:rPr lang="en-US"/>
               <a:t>Click icon to add picture</a:t>
             </a:r>
             <a:endParaRPr lang="en-US" dirty="0"/>
@@ -2798,7 +2798,7 @@
           <a:p>
             <a:pPr lvl="0"/>
             <a:r>
-              <a:rPr lang="en-US" smtClean="0"/>
+              <a:rPr lang="en-US"/>
               <a:t>Click to edit Master text styles</a:t>
             </a:r>
           </a:p>
@@ -2899,7 +2899,7 @@
           <a:p>
             <a:fld id="{4509A250-FF31-4206-8172-F9D3106AACB1}" type="datetimeFigureOut">
               <a:rPr lang="en-US" dirty="0"/>
-              <a:t>3/5/2018</a:t>
+              <a:t>6/28/2018</a:t>
             </a:fld>
             <a:endParaRPr lang="en-US" dirty="0"/>
           </a:p>
@@ -2988,7 +2988,7 @@
           <a:lstStyle/>
           <a:p>
             <a:r>
-              <a:rPr lang="en-US" smtClean="0"/>
+              <a:rPr lang="en-US"/>
               <a:t>Click to edit Master title style</a:t>
             </a:r>
             <a:endParaRPr lang="en-US" dirty="0"/>
@@ -3012,35 +3012,35 @@
           <a:p>
             <a:pPr lvl="0"/>
             <a:r>
-              <a:rPr lang="en-US" smtClean="0"/>
+              <a:rPr lang="en-US"/>
               <a:t>Click to edit Master text styles</a:t>
             </a:r>
           </a:p>
           <a:p>
             <a:pPr lvl="1"/>
             <a:r>
-              <a:rPr lang="en-US" smtClean="0"/>
+              <a:rPr lang="en-US"/>
               <a:t>Second level</a:t>
             </a:r>
           </a:p>
           <a:p>
             <a:pPr lvl="2"/>
             <a:r>
-              <a:rPr lang="en-US" smtClean="0"/>
+              <a:rPr lang="en-US"/>
               <a:t>Third level</a:t>
             </a:r>
           </a:p>
           <a:p>
             <a:pPr lvl="3"/>
             <a:r>
-              <a:rPr lang="en-US" smtClean="0"/>
+              <a:rPr lang="en-US"/>
               <a:t>Fourth level</a:t>
             </a:r>
           </a:p>
           <a:p>
             <a:pPr lvl="4"/>
             <a:r>
-              <a:rPr lang="en-US" smtClean="0"/>
+              <a:rPr lang="en-US"/>
               <a:t>Fifth level</a:t>
             </a:r>
             <a:endParaRPr lang="en-US" dirty="0"/>
@@ -3064,7 +3064,7 @@
           <a:p>
             <a:fld id="{4509A250-FF31-4206-8172-F9D3106AACB1}" type="datetimeFigureOut">
               <a:rPr lang="en-US" dirty="0"/>
-              <a:t>3/5/2018</a:t>
+              <a:t>6/28/2018</a:t>
             </a:fld>
             <a:endParaRPr lang="en-US" dirty="0"/>
           </a:p>
@@ -3158,7 +3158,7 @@
           <a:lstStyle/>
           <a:p>
             <a:r>
-              <a:rPr lang="en-US" smtClean="0"/>
+              <a:rPr lang="en-US"/>
               <a:t>Click to edit Master title style</a:t>
             </a:r>
             <a:endParaRPr lang="en-US" dirty="0"/>
@@ -3187,35 +3187,35 @@
           <a:p>
             <a:pPr lvl="0"/>
             <a:r>
-              <a:rPr lang="en-US" smtClean="0"/>
+              <a:rPr lang="en-US"/>
               <a:t>Click to edit Master text styles</a:t>
             </a:r>
           </a:p>
           <a:p>
             <a:pPr lvl="1"/>
             <a:r>
-              <a:rPr lang="en-US" smtClean="0"/>
+              <a:rPr lang="en-US"/>
               <a:t>Second level</a:t>
             </a:r>
           </a:p>
           <a:p>
             <a:pPr lvl="2"/>
             <a:r>
-              <a:rPr lang="en-US" smtClean="0"/>
+              <a:rPr lang="en-US"/>
               <a:t>Third level</a:t>
             </a:r>
           </a:p>
           <a:p>
             <a:pPr lvl="3"/>
             <a:r>
-              <a:rPr lang="en-US" smtClean="0"/>
+              <a:rPr lang="en-US"/>
               <a:t>Fourth level</a:t>
             </a:r>
           </a:p>
           <a:p>
             <a:pPr lvl="4"/>
             <a:r>
-              <a:rPr lang="en-US" smtClean="0"/>
+              <a:rPr lang="en-US"/>
               <a:t>Fifth level</a:t>
             </a:r>
             <a:endParaRPr lang="en-US" dirty="0"/>
@@ -3239,7 +3239,7 @@
           <a:p>
             <a:fld id="{4509A250-FF31-4206-8172-F9D3106AACB1}" type="datetimeFigureOut">
               <a:rPr lang="en-US" dirty="0"/>
-              <a:t>3/5/2018</a:t>
+              <a:t>6/28/2018</a:t>
             </a:fld>
             <a:endParaRPr lang="en-US" dirty="0"/>
           </a:p>
@@ -3328,7 +3328,7 @@
           <a:lstStyle/>
           <a:p>
             <a:r>
-              <a:rPr lang="en-US" smtClean="0"/>
+              <a:rPr lang="en-US"/>
               <a:t>Click to edit Master title style</a:t>
             </a:r>
             <a:endParaRPr lang="en-US" dirty="0"/>
@@ -3352,35 +3352,35 @@
           <a:p>
             <a:pPr lvl="0"/>
             <a:r>
-              <a:rPr lang="en-US" smtClean="0"/>
+              <a:rPr lang="en-US"/>
               <a:t>Click to edit Master text styles</a:t>
             </a:r>
           </a:p>
           <a:p>
             <a:pPr lvl="1"/>
             <a:r>
-              <a:rPr lang="en-US" smtClean="0"/>
+              <a:rPr lang="en-US"/>
               <a:t>Second level</a:t>
             </a:r>
           </a:p>
           <a:p>
             <a:pPr lvl="2"/>
             <a:r>
-              <a:rPr lang="en-US" smtClean="0"/>
+              <a:rPr lang="en-US"/>
               <a:t>Third level</a:t>
             </a:r>
           </a:p>
           <a:p>
             <a:pPr lvl="3"/>
             <a:r>
-              <a:rPr lang="en-US" smtClean="0"/>
+              <a:rPr lang="en-US"/>
               <a:t>Fourth level</a:t>
             </a:r>
           </a:p>
           <a:p>
             <a:pPr lvl="4"/>
             <a:r>
-              <a:rPr lang="en-US" smtClean="0"/>
+              <a:rPr lang="en-US"/>
               <a:t>Fifth level</a:t>
             </a:r>
             <a:endParaRPr lang="en-US" dirty="0"/>
@@ -3404,7 +3404,7 @@
           <a:p>
             <a:fld id="{4509A250-FF31-4206-8172-F9D3106AACB1}" type="datetimeFigureOut">
               <a:rPr lang="en-US" dirty="0"/>
-              <a:t>3/5/2018</a:t>
+              <a:t>6/28/2018</a:t>
             </a:fld>
             <a:endParaRPr lang="en-US" dirty="0"/>
           </a:p>
@@ -3502,7 +3502,7 @@
           </a:lstStyle>
           <a:p>
             <a:r>
-              <a:rPr lang="en-US" smtClean="0"/>
+              <a:rPr lang="en-US"/>
               <a:t>Click to edit Master title style</a:t>
             </a:r>
             <a:endParaRPr lang="en-US" dirty="0"/>
@@ -3623,7 +3623,7 @@
           <a:p>
             <a:pPr lvl="0"/>
             <a:r>
-              <a:rPr lang="en-US" smtClean="0"/>
+              <a:rPr lang="en-US"/>
               <a:t>Click to edit Master text styles</a:t>
             </a:r>
           </a:p>
@@ -3646,7 +3646,7 @@
           <a:p>
             <a:fld id="{9796027F-7875-4030-9381-8BD8C4F21935}" type="datetimeFigureOut">
               <a:rPr lang="en-US" dirty="0"/>
-              <a:t>3/5/2018</a:t>
+              <a:t>6/28/2018</a:t>
             </a:fld>
             <a:endParaRPr lang="en-US" dirty="0"/>
           </a:p>
@@ -3735,7 +3735,7 @@
           <a:lstStyle/>
           <a:p>
             <a:r>
-              <a:rPr lang="en-US" smtClean="0"/>
+              <a:rPr lang="en-US"/>
               <a:t>Click to edit Master title style</a:t>
             </a:r>
             <a:endParaRPr lang="en-US" dirty="0"/>
@@ -3794,35 +3794,35 @@
           <a:p>
             <a:pPr lvl="0"/>
             <a:r>
-              <a:rPr lang="en-US" smtClean="0"/>
+              <a:rPr lang="en-US"/>
               <a:t>Click to edit Master text styles</a:t>
             </a:r>
           </a:p>
           <a:p>
             <a:pPr lvl="1"/>
             <a:r>
-              <a:rPr lang="en-US" smtClean="0"/>
+              <a:rPr lang="en-US"/>
               <a:t>Second level</a:t>
             </a:r>
           </a:p>
           <a:p>
             <a:pPr lvl="2"/>
             <a:r>
-              <a:rPr lang="en-US" smtClean="0"/>
+              <a:rPr lang="en-US"/>
               <a:t>Third level</a:t>
             </a:r>
           </a:p>
           <a:p>
             <a:pPr lvl="3"/>
             <a:r>
-              <a:rPr lang="en-US" smtClean="0"/>
+              <a:rPr lang="en-US"/>
               <a:t>Fourth level</a:t>
             </a:r>
           </a:p>
           <a:p>
             <a:pPr lvl="4"/>
             <a:r>
-              <a:rPr lang="en-US" smtClean="0"/>
+              <a:rPr lang="en-US"/>
               <a:t>Fifth level</a:t>
             </a:r>
             <a:endParaRPr lang="en-US" dirty="0"/>
@@ -3881,35 +3881,35 @@
           <a:p>
             <a:pPr lvl="0"/>
             <a:r>
-              <a:rPr lang="en-US" smtClean="0"/>
+              <a:rPr lang="en-US"/>
               <a:t>Click to edit Master text styles</a:t>
             </a:r>
           </a:p>
           <a:p>
             <a:pPr lvl="1"/>
             <a:r>
-              <a:rPr lang="en-US" smtClean="0"/>
+              <a:rPr lang="en-US"/>
               <a:t>Second level</a:t>
             </a:r>
           </a:p>
           <a:p>
             <a:pPr lvl="2"/>
             <a:r>
-              <a:rPr lang="en-US" smtClean="0"/>
+              <a:rPr lang="en-US"/>
               <a:t>Third level</a:t>
             </a:r>
           </a:p>
           <a:p>
             <a:pPr lvl="3"/>
             <a:r>
-              <a:rPr lang="en-US" smtClean="0"/>
+              <a:rPr lang="en-US"/>
               <a:t>Fourth level</a:t>
             </a:r>
           </a:p>
           <a:p>
             <a:pPr lvl="4"/>
             <a:r>
-              <a:rPr lang="en-US" smtClean="0"/>
+              <a:rPr lang="en-US"/>
               <a:t>Fifth level</a:t>
             </a:r>
             <a:endParaRPr lang="en-US" dirty="0"/>
@@ -3933,7 +3933,7 @@
           <a:p>
             <a:fld id="{9796027F-7875-4030-9381-8BD8C4F21935}" type="datetimeFigureOut">
               <a:rPr lang="en-US" dirty="0"/>
-              <a:t>3/5/2018</a:t>
+              <a:t>6/28/2018</a:t>
             </a:fld>
             <a:endParaRPr lang="en-US" dirty="0"/>
           </a:p>
@@ -4026,7 +4026,7 @@
           </a:lstStyle>
           <a:p>
             <a:r>
-              <a:rPr lang="en-US" smtClean="0"/>
+              <a:rPr lang="en-US"/>
               <a:t>Click to edit Master title style</a:t>
             </a:r>
             <a:endParaRPr lang="en-US" dirty="0"/>
@@ -4101,7 +4101,7 @@
           <a:p>
             <a:pPr lvl="0"/>
             <a:r>
-              <a:rPr lang="en-US" smtClean="0"/>
+              <a:rPr lang="en-US"/>
               <a:t>Click to edit Master text styles</a:t>
             </a:r>
           </a:p>
@@ -4159,35 +4159,35 @@
           <a:p>
             <a:pPr lvl="0"/>
             <a:r>
-              <a:rPr lang="en-US" smtClean="0"/>
+              <a:rPr lang="en-US"/>
               <a:t>Click to edit Master text styles</a:t>
             </a:r>
           </a:p>
           <a:p>
             <a:pPr lvl="1"/>
             <a:r>
-              <a:rPr lang="en-US" smtClean="0"/>
+              <a:rPr lang="en-US"/>
               <a:t>Second level</a:t>
             </a:r>
           </a:p>
           <a:p>
             <a:pPr lvl="2"/>
             <a:r>
-              <a:rPr lang="en-US" smtClean="0"/>
+              <a:rPr lang="en-US"/>
               <a:t>Third level</a:t>
             </a:r>
           </a:p>
           <a:p>
             <a:pPr lvl="3"/>
             <a:r>
-              <a:rPr lang="en-US" smtClean="0"/>
+              <a:rPr lang="en-US"/>
               <a:t>Fourth level</a:t>
             </a:r>
           </a:p>
           <a:p>
             <a:pPr lvl="4"/>
             <a:r>
-              <a:rPr lang="en-US" smtClean="0"/>
+              <a:rPr lang="en-US"/>
               <a:t>Fifth level</a:t>
             </a:r>
             <a:endParaRPr lang="en-US" dirty="0"/>
@@ -4262,7 +4262,7 @@
           <a:p>
             <a:pPr lvl="0"/>
             <a:r>
-              <a:rPr lang="en-US" smtClean="0"/>
+              <a:rPr lang="en-US"/>
               <a:t>Click to edit Master text styles</a:t>
             </a:r>
           </a:p>
@@ -4320,35 +4320,35 @@
           <a:p>
             <a:pPr lvl="0"/>
             <a:r>
-              <a:rPr lang="en-US" smtClean="0"/>
+              <a:rPr lang="en-US"/>
               <a:t>Click to edit Master text styles</a:t>
             </a:r>
           </a:p>
           <a:p>
             <a:pPr lvl="1"/>
             <a:r>
-              <a:rPr lang="en-US" smtClean="0"/>
+              <a:rPr lang="en-US"/>
               <a:t>Second level</a:t>
             </a:r>
           </a:p>
           <a:p>
             <a:pPr lvl="2"/>
             <a:r>
-              <a:rPr lang="en-US" smtClean="0"/>
+              <a:rPr lang="en-US"/>
               <a:t>Third level</a:t>
             </a:r>
           </a:p>
           <a:p>
             <a:pPr lvl="3"/>
             <a:r>
-              <a:rPr lang="en-US" smtClean="0"/>
+              <a:rPr lang="en-US"/>
               <a:t>Fourth level</a:t>
             </a:r>
           </a:p>
           <a:p>
             <a:pPr lvl="4"/>
             <a:r>
-              <a:rPr lang="en-US" smtClean="0"/>
+              <a:rPr lang="en-US"/>
               <a:t>Fifth level</a:t>
             </a:r>
             <a:endParaRPr lang="en-US" dirty="0"/>
@@ -4372,7 +4372,7 @@
           <a:p>
             <a:fld id="{9796027F-7875-4030-9381-8BD8C4F21935}" type="datetimeFigureOut">
               <a:rPr lang="en-US" dirty="0"/>
-              <a:t>3/5/2018</a:t>
+              <a:t>6/28/2018</a:t>
             </a:fld>
             <a:endParaRPr lang="en-US" dirty="0"/>
           </a:p>
@@ -4461,7 +4461,7 @@
           <a:lstStyle/>
           <a:p>
             <a:r>
-              <a:rPr lang="en-US" smtClean="0"/>
+              <a:rPr lang="en-US"/>
               <a:t>Click to edit Master title style</a:t>
             </a:r>
             <a:endParaRPr lang="en-US" dirty="0"/>
@@ -4485,7 +4485,7 @@
           <a:p>
             <a:fld id="{4509A250-FF31-4206-8172-F9D3106AACB1}" type="datetimeFigureOut">
               <a:rPr lang="en-US" dirty="0"/>
-              <a:t>3/5/2018</a:t>
+              <a:t>6/28/2018</a:t>
             </a:fld>
             <a:endParaRPr lang="en-US" dirty="0"/>
           </a:p>
@@ -4575,7 +4575,7 @@
           <a:p>
             <a:fld id="{4509A250-FF31-4206-8172-F9D3106AACB1}" type="datetimeFigureOut">
               <a:rPr lang="en-US" dirty="0"/>
-              <a:t>3/5/2018</a:t>
+              <a:t>6/28/2018</a:t>
             </a:fld>
             <a:endParaRPr lang="en-US" dirty="0"/>
           </a:p>
@@ -4673,7 +4673,7 @@
           </a:lstStyle>
           <a:p>
             <a:r>
-              <a:rPr lang="en-US" smtClean="0"/>
+              <a:rPr lang="en-US"/>
               <a:t>Click to edit Master title style</a:t>
             </a:r>
             <a:endParaRPr lang="en-US" dirty="0"/>
@@ -4732,35 +4732,35 @@
           <a:p>
             <a:pPr lvl="0"/>
             <a:r>
-              <a:rPr lang="en-US" smtClean="0"/>
+              <a:rPr lang="en-US"/>
               <a:t>Click to edit Master text styles</a:t>
             </a:r>
           </a:p>
           <a:p>
             <a:pPr lvl="1"/>
             <a:r>
-              <a:rPr lang="en-US" smtClean="0"/>
+              <a:rPr lang="en-US"/>
               <a:t>Second level</a:t>
             </a:r>
           </a:p>
           <a:p>
             <a:pPr lvl="2"/>
             <a:r>
-              <a:rPr lang="en-US" smtClean="0"/>
+              <a:rPr lang="en-US"/>
               <a:t>Third level</a:t>
             </a:r>
           </a:p>
           <a:p>
             <a:pPr lvl="3"/>
             <a:r>
-              <a:rPr lang="en-US" smtClean="0"/>
+              <a:rPr lang="en-US"/>
               <a:t>Fourth level</a:t>
             </a:r>
           </a:p>
           <a:p>
             <a:pPr lvl="4"/>
             <a:r>
-              <a:rPr lang="en-US" smtClean="0"/>
+              <a:rPr lang="en-US"/>
               <a:t>Fifth level</a:t>
             </a:r>
             <a:endParaRPr lang="en-US" dirty="0"/>
@@ -4826,7 +4826,7 @@
           <a:p>
             <a:pPr lvl="0"/>
             <a:r>
-              <a:rPr lang="en-US" smtClean="0"/>
+              <a:rPr lang="en-US"/>
               <a:t>Click to edit Master text styles</a:t>
             </a:r>
           </a:p>
@@ -4849,7 +4849,7 @@
           <a:p>
             <a:fld id="{4509A250-FF31-4206-8172-F9D3106AACB1}" type="datetimeFigureOut">
               <a:rPr lang="en-US" dirty="0"/>
-              <a:t>3/5/2018</a:t>
+              <a:t>6/28/2018</a:t>
             </a:fld>
             <a:endParaRPr lang="en-US" dirty="0"/>
           </a:p>
@@ -4949,7 +4949,7 @@
           </a:lstStyle>
           <a:p>
             <a:r>
-              <a:rPr lang="en-US" smtClean="0"/>
+              <a:rPr lang="en-US"/>
               <a:t>Click to edit Master title style</a:t>
             </a:r>
             <a:endParaRPr lang="en-US" dirty="0"/>
@@ -5028,7 +5028,7 @@
           </a:lstStyle>
           <a:p>
             <a:r>
-              <a:rPr lang="en-US" smtClean="0"/>
+              <a:rPr lang="en-US"/>
               <a:t>Click icon to add picture</a:t>
             </a:r>
             <a:endParaRPr lang="en-US" dirty="0"/>
@@ -5096,7 +5096,7 @@
           <a:p>
             <a:pPr lvl="0"/>
             <a:r>
-              <a:rPr lang="en-US" smtClean="0"/>
+              <a:rPr lang="en-US"/>
               <a:t>Click to edit Master text styles</a:t>
             </a:r>
           </a:p>
@@ -5119,7 +5119,7 @@
           <a:p>
             <a:fld id="{4509A250-FF31-4206-8172-F9D3106AACB1}" type="datetimeFigureOut">
               <a:rPr lang="en-US" dirty="0"/>
-              <a:t>3/5/2018</a:t>
+              <a:t>6/28/2018</a:t>
             </a:fld>
             <a:endParaRPr lang="en-US" dirty="0"/>
           </a:p>
@@ -5438,7 +5438,7 @@
           <a:lstStyle/>
           <a:p>
             <a:r>
-              <a:rPr lang="en-US" smtClean="0"/>
+              <a:rPr lang="en-US"/>
               <a:t>Click to edit Master title style</a:t>
             </a:r>
             <a:endParaRPr lang="en-US" dirty="0"/>
@@ -5472,35 +5472,35 @@
           <a:p>
             <a:pPr lvl="0"/>
             <a:r>
-              <a:rPr lang="en-US" smtClean="0"/>
+              <a:rPr lang="en-US"/>
               <a:t>Click to edit Master text styles</a:t>
             </a:r>
           </a:p>
           <a:p>
             <a:pPr lvl="1"/>
             <a:r>
-              <a:rPr lang="en-US" smtClean="0"/>
+              <a:rPr lang="en-US"/>
               <a:t>Second level</a:t>
             </a:r>
           </a:p>
           <a:p>
             <a:pPr lvl="2"/>
             <a:r>
-              <a:rPr lang="en-US" smtClean="0"/>
+              <a:rPr lang="en-US"/>
               <a:t>Third level</a:t>
             </a:r>
           </a:p>
           <a:p>
             <a:pPr lvl="3"/>
             <a:r>
-              <a:rPr lang="en-US" smtClean="0"/>
+              <a:rPr lang="en-US"/>
               <a:t>Fourth level</a:t>
             </a:r>
           </a:p>
           <a:p>
             <a:pPr lvl="4"/>
             <a:r>
-              <a:rPr lang="en-US" smtClean="0"/>
+              <a:rPr lang="en-US"/>
               <a:t>Fifth level</a:t>
             </a:r>
             <a:endParaRPr lang="en-US" dirty="0"/>
@@ -5543,7 +5543,7 @@
           <a:p>
             <a:fld id="{4AAD347D-5ACD-4C99-B74B-A9C85AD731AF}" type="datetimeFigureOut">
               <a:rPr lang="en-US" dirty="0"/>
-              <a:t>3/5/2018</a:t>
+              <a:t>6/28/2018</a:t>
             </a:fld>
             <a:endParaRPr lang="en-US" dirty="0"/>
           </a:p>
@@ -6083,11 +6083,11 @@
           <a:lstStyle/>
           <a:p>
             <a:r>
-              <a:rPr lang="en-GB" dirty="0" smtClean="0"/>
+              <a:rPr lang="en-GB" dirty="0"/>
               <a:t>Learning Python 3</a:t>
             </a:r>
             <a:br>
-              <a:rPr lang="en-GB" dirty="0" smtClean="0"/>
+              <a:rPr lang="en-GB" dirty="0"/>
             </a:br>
             <a:endParaRPr lang="en-GB" dirty="0"/>
           </a:p>
@@ -6109,10 +6109,9 @@
           <a:lstStyle/>
           <a:p>
             <a:r>
-              <a:rPr lang="en-GB" dirty="0" smtClean="0"/>
+              <a:rPr lang="en-GB" dirty="0"/>
               <a:t>Week 4: More LISTS, MORE STRINGS and MORE TESTING.</a:t>
             </a:r>
-            <a:endParaRPr lang="en-GB" dirty="0"/>
           </a:p>
         </p:txBody>
       </p:sp>
@@ -6126,13 +6125,6 @@
   <p:clrMapOvr>
     <a:masterClrMapping/>
   </p:clrMapOvr>
-  <p:timing>
-    <p:tnLst>
-      <p:par>
-        <p:cTn id="1" dur="indefinite" restart="never" nodeType="tmRoot"/>
-      </p:par>
-    </p:tnLst>
-  </p:timing>
 </p:sld>
 </file>
 
@@ -6169,10 +6161,9 @@
           <a:lstStyle/>
           <a:p>
             <a:r>
-              <a:rPr lang="en-GB" dirty="0" smtClean="0"/>
+              <a:rPr lang="en-GB" dirty="0"/>
               <a:t>More Negative Steps.</a:t>
             </a:r>
-            <a:endParaRPr lang="en-GB" dirty="0"/>
           </a:p>
         </p:txBody>
       </p:sp>
@@ -6199,13 +6190,13 @@
           <a:lstStyle/>
           <a:p>
             <a:r>
-              <a:rPr lang="en-GB" sz="1800" dirty="0" smtClean="0"/>
+              <a:rPr lang="en-GB" sz="1800" dirty="0"/>
               <a:t>Here is some more examples of negative steps.</a:t>
             </a:r>
             <a:endParaRPr lang="en-GB" sz="1600" dirty="0"/>
           </a:p>
           <a:p>
-            <a:endParaRPr lang="en-GB" dirty="0" smtClean="0"/>
+            <a:endParaRPr lang="en-GB" dirty="0"/>
           </a:p>
           <a:p>
             <a:endParaRPr lang="en-GB" dirty="0"/>
@@ -6285,18 +6276,11 @@
           <a:lstStyle/>
           <a:p>
             <a:r>
-              <a:rPr lang="en-GB" sz="1400" dirty="0" smtClean="0">
-                <a:latin typeface="Courier New" panose="02070309020205020404" pitchFamily="49" charset="0"/>
-                <a:cs typeface="Courier New" panose="02070309020205020404" pitchFamily="49" charset="0"/>
-              </a:rPr>
-              <a:t># </a:t>
-            </a:r>
-            <a:r>
               <a:rPr lang="en-GB" sz="1400" dirty="0">
                 <a:latin typeface="Courier New" panose="02070309020205020404" pitchFamily="49" charset="0"/>
                 <a:cs typeface="Courier New" panose="02070309020205020404" pitchFamily="49" charset="0"/>
               </a:rPr>
-              <a:t>Week4, Program7</a:t>
+              <a:t># Week4, Program6</a:t>
             </a:r>
           </a:p>
           <a:p>
@@ -6392,13 +6376,6 @@
   <p:clrMapOvr>
     <a:masterClrMapping/>
   </p:clrMapOvr>
-  <p:timing>
-    <p:tnLst>
-      <p:par>
-        <p:cTn id="1" dur="indefinite" restart="never" nodeType="tmRoot"/>
-      </p:par>
-    </p:tnLst>
-  </p:timing>
 </p:sld>
 </file>
 
@@ -6435,10 +6412,9 @@
           <a:lstStyle/>
           <a:p>
             <a:r>
-              <a:rPr lang="en-GB" dirty="0" smtClean="0"/>
+              <a:rPr lang="en-GB" dirty="0"/>
               <a:t>How strings can be like lists.</a:t>
             </a:r>
-            <a:endParaRPr lang="en-GB" dirty="0"/>
           </a:p>
         </p:txBody>
       </p:sp>
@@ -6465,21 +6441,21 @@
           <a:lstStyle/>
           <a:p>
             <a:r>
-              <a:rPr lang="en-GB" sz="1800" dirty="0" smtClean="0"/>
+              <a:rPr lang="en-GB" sz="1800" dirty="0"/>
               <a:t>You can use the same square brackets we have been using with lists to work with strings.</a:t>
             </a:r>
           </a:p>
           <a:p>
             <a:pPr lvl="1"/>
             <a:r>
-              <a:rPr lang="en-GB" sz="1600" dirty="0" smtClean="0"/>
+              <a:rPr lang="en-GB" sz="1600" dirty="0"/>
               <a:t>You can get individual characters.</a:t>
             </a:r>
           </a:p>
           <a:p>
             <a:pPr lvl="1"/>
             <a:r>
-              <a:rPr lang="en-GB" sz="1600" dirty="0" smtClean="0"/>
+              <a:rPr lang="en-GB" sz="1600" dirty="0"/>
               <a:t>Or you can use slices !</a:t>
             </a:r>
           </a:p>
@@ -6488,13 +6464,13 @@
           </a:p>
           <a:p>
             <a:r>
-              <a:rPr lang="en-GB" sz="1800" dirty="0" smtClean="0"/>
+              <a:rPr lang="en-GB" sz="1800" dirty="0"/>
               <a:t>Although you haven't done this before, see if you can work out what this program will do ?</a:t>
             </a:r>
             <a:endParaRPr lang="en-GB" sz="1600" dirty="0"/>
           </a:p>
           <a:p>
-            <a:endParaRPr lang="en-GB" dirty="0" smtClean="0"/>
+            <a:endParaRPr lang="en-GB" dirty="0"/>
           </a:p>
           <a:p>
             <a:endParaRPr lang="en-GB" dirty="0"/>
@@ -6574,18 +6550,11 @@
           <a:lstStyle/>
           <a:p>
             <a:r>
-              <a:rPr lang="en-GB" sz="1200" dirty="0" smtClean="0">
-                <a:latin typeface="Courier New" panose="02070309020205020404" pitchFamily="49" charset="0"/>
-                <a:cs typeface="Courier New" panose="02070309020205020404" pitchFamily="49" charset="0"/>
-              </a:rPr>
-              <a:t># </a:t>
-            </a:r>
-            <a:r>
               <a:rPr lang="en-GB" sz="1200" dirty="0">
                 <a:latin typeface="Courier New" panose="02070309020205020404" pitchFamily="49" charset="0"/>
                 <a:cs typeface="Courier New" panose="02070309020205020404" pitchFamily="49" charset="0"/>
               </a:rPr>
-              <a:t>Week4, Program8</a:t>
+              <a:t># Week4, Program7</a:t>
             </a:r>
           </a:p>
           <a:p>
@@ -6753,13 +6722,6 @@
   <p:clrMapOvr>
     <a:masterClrMapping/>
   </p:clrMapOvr>
-  <p:timing>
-    <p:tnLst>
-      <p:par>
-        <p:cTn id="1" dur="indefinite" restart="never" nodeType="tmRoot"/>
-      </p:par>
-    </p:tnLst>
-  </p:timing>
 </p:sld>
 </file>
 
@@ -6801,7 +6763,7 @@
           <a:lstStyle/>
           <a:p>
             <a:r>
-              <a:rPr lang="en-GB" smtClean="0"/>
+              <a:rPr lang="en-GB"/>
               <a:t>More about testing things.</a:t>
             </a:r>
             <a:endParaRPr lang="en-GB" dirty="0"/>
@@ -6873,10 +6835,9 @@
           <a:lstStyle/>
           <a:p>
             <a:r>
-              <a:rPr lang="en-GB" dirty="0" smtClean="0"/>
+              <a:rPr lang="en-GB" dirty="0"/>
               <a:t>Truth</a:t>
             </a:r>
-            <a:endParaRPr lang="en-GB" dirty="0"/>
           </a:p>
         </p:txBody>
       </p:sp>
@@ -6903,63 +6864,62 @@
           <a:lstStyle/>
           <a:p>
             <a:r>
-              <a:rPr lang="en-GB" sz="1800" dirty="0" smtClean="0"/>
+              <a:rPr lang="en-GB" sz="1800" dirty="0"/>
               <a:t>Python has the concept of things being </a:t>
             </a:r>
             <a:r>
-              <a:rPr lang="en-GB" sz="1800" u="sng" dirty="0" smtClean="0"/>
+              <a:rPr lang="en-GB" sz="1800" u="sng" dirty="0"/>
               <a:t>True</a:t>
             </a:r>
             <a:r>
-              <a:rPr lang="en-GB" sz="1800" dirty="0" smtClean="0"/>
+              <a:rPr lang="en-GB" sz="1800" dirty="0"/>
               <a:t> or being </a:t>
             </a:r>
             <a:r>
-              <a:rPr lang="en-GB" sz="1800" u="sng" dirty="0" smtClean="0"/>
+              <a:rPr lang="en-GB" sz="1800" u="sng" dirty="0"/>
               <a:t>False</a:t>
             </a:r>
             <a:r>
-              <a:rPr lang="en-GB" sz="1800" dirty="0" smtClean="0"/>
+              <a:rPr lang="en-GB" sz="1800" dirty="0"/>
               <a:t>.</a:t>
             </a:r>
           </a:p>
           <a:p>
             <a:r>
-              <a:rPr lang="en-GB" sz="1800" dirty="0" smtClean="0"/>
+              <a:rPr lang="en-GB" sz="1800" dirty="0"/>
               <a:t>You have already used this when using the </a:t>
             </a:r>
             <a:r>
-              <a:rPr lang="en-GB" sz="1800" u="sng" dirty="0" smtClean="0"/>
+              <a:rPr lang="en-GB" sz="1800" u="sng" dirty="0"/>
               <a:t>if</a:t>
             </a:r>
             <a:r>
-              <a:rPr lang="en-GB" sz="1800" dirty="0" smtClean="0"/>
+              <a:rPr lang="en-GB" sz="1800" dirty="0"/>
               <a:t> statement, but without knowing it.</a:t>
             </a:r>
           </a:p>
           <a:p>
             <a:r>
-              <a:rPr lang="en-GB" sz="1600" dirty="0" smtClean="0"/>
+              <a:rPr lang="en-GB" sz="1600" dirty="0"/>
               <a:t>You can print tests with the == operator, or the &gt;= operator, or other tests of truth.</a:t>
             </a:r>
           </a:p>
           <a:p>
             <a:pPr lvl="1"/>
             <a:r>
-              <a:rPr lang="en-GB" sz="1400" dirty="0" smtClean="0"/>
+              <a:rPr lang="en-GB" sz="1400" dirty="0"/>
               <a:t>If they are true, you will get True</a:t>
             </a:r>
           </a:p>
           <a:p>
             <a:pPr lvl="1"/>
             <a:r>
-              <a:rPr lang="en-GB" sz="1400" dirty="0" smtClean="0"/>
+              <a:rPr lang="en-GB" sz="1400" dirty="0"/>
               <a:t>If they are false, you will get False</a:t>
             </a:r>
-            <a:endParaRPr lang="en-GB" sz="1400" dirty="0"/>
-          </a:p>
-          <a:p>
-            <a:endParaRPr lang="en-GB" dirty="0" smtClean="0"/>
+          </a:p>
+          <a:p>
+            <a:endParaRPr lang="en-GB" dirty="0"/>
           </a:p>
           <a:p>
             <a:endParaRPr lang="en-GB" dirty="0"/>
@@ -7039,18 +6999,11 @@
           <a:lstStyle/>
           <a:p>
             <a:r>
-              <a:rPr lang="en-GB" sz="1200" dirty="0" smtClean="0">
-                <a:latin typeface="Courier New" panose="02070309020205020404" pitchFamily="49" charset="0"/>
-                <a:cs typeface="Courier New" panose="02070309020205020404" pitchFamily="49" charset="0"/>
-              </a:rPr>
-              <a:t># </a:t>
-            </a:r>
-            <a:r>
               <a:rPr lang="en-GB" sz="1200" dirty="0">
                 <a:latin typeface="Courier New" panose="02070309020205020404" pitchFamily="49" charset="0"/>
                 <a:cs typeface="Courier New" panose="02070309020205020404" pitchFamily="49" charset="0"/>
               </a:rPr>
-              <a:t>Week4, Program9</a:t>
+              <a:t># Week4, Program8</a:t>
             </a:r>
           </a:p>
           <a:p>
@@ -7218,13 +7171,6 @@
   <p:clrMapOvr>
     <a:masterClrMapping/>
   </p:clrMapOvr>
-  <p:timing>
-    <p:tnLst>
-      <p:par>
-        <p:cTn id="1" dur="indefinite" restart="never" nodeType="tmRoot"/>
-      </p:par>
-    </p:tnLst>
-  </p:timing>
 </p:sld>
 </file>
 
@@ -7261,10 +7207,9 @@
           <a:lstStyle/>
           <a:p>
             <a:r>
-              <a:rPr lang="en-GB" dirty="0" smtClean="0"/>
+              <a:rPr lang="en-GB" dirty="0"/>
               <a:t>Testing for inequality.</a:t>
             </a:r>
-            <a:endParaRPr lang="en-GB" dirty="0"/>
           </a:p>
         </p:txBody>
       </p:sp>
@@ -7291,37 +7236,37 @@
           <a:lstStyle/>
           <a:p>
             <a:r>
-              <a:rPr lang="en-GB" dirty="0" smtClean="0"/>
+              <a:rPr lang="en-GB" dirty="0"/>
               <a:t>You can use </a:t>
             </a:r>
             <a:r>
-              <a:rPr lang="en-GB" u="sng" dirty="0" smtClean="0"/>
+              <a:rPr lang="en-GB" u="sng" dirty="0"/>
               <a:t>==</a:t>
             </a:r>
             <a:r>
-              <a:rPr lang="en-GB" dirty="0" smtClean="0"/>
+              <a:rPr lang="en-GB" dirty="0"/>
               <a:t> to test for equality.</a:t>
             </a:r>
           </a:p>
           <a:p>
-            <a:endParaRPr lang="en-GB" dirty="0" smtClean="0"/>
-          </a:p>
-          <a:p>
-            <a:r>
-              <a:rPr lang="en-GB" dirty="0" smtClean="0"/>
+            <a:endParaRPr lang="en-GB" dirty="0"/>
+          </a:p>
+          <a:p>
+            <a:r>
+              <a:rPr lang="en-GB" dirty="0"/>
               <a:t>You can also use </a:t>
             </a:r>
             <a:r>
-              <a:rPr lang="en-GB" u="sng" dirty="0" smtClean="0"/>
+              <a:rPr lang="en-GB" u="sng" dirty="0"/>
               <a:t>!=</a:t>
             </a:r>
             <a:r>
-              <a:rPr lang="en-GB" dirty="0" smtClean="0"/>
+              <a:rPr lang="en-GB" dirty="0"/>
               <a:t> to test for inequality.</a:t>
             </a:r>
           </a:p>
           <a:p>
-            <a:endParaRPr lang="en-GB" dirty="0" smtClean="0"/>
+            <a:endParaRPr lang="en-GB" dirty="0"/>
           </a:p>
           <a:p>
             <a:endParaRPr lang="en-GB" dirty="0"/>
@@ -7401,18 +7346,11 @@
           <a:lstStyle/>
           <a:p>
             <a:r>
-              <a:rPr lang="en-GB" sz="1200" dirty="0" smtClean="0">
-                <a:latin typeface="Courier New" panose="02070309020205020404" pitchFamily="49" charset="0"/>
-                <a:cs typeface="Courier New" panose="02070309020205020404" pitchFamily="49" charset="0"/>
-              </a:rPr>
-              <a:t># </a:t>
-            </a:r>
-            <a:r>
               <a:rPr lang="en-GB" sz="1200" dirty="0">
                 <a:latin typeface="Courier New" panose="02070309020205020404" pitchFamily="49" charset="0"/>
                 <a:cs typeface="Courier New" panose="02070309020205020404" pitchFamily="49" charset="0"/>
               </a:rPr>
-              <a:t>Week4, Program10</a:t>
+              <a:t># Week4, Program9</a:t>
             </a:r>
           </a:p>
           <a:p>
@@ -7640,13 +7578,6 @@
   <p:clrMapOvr>
     <a:masterClrMapping/>
   </p:clrMapOvr>
-  <p:timing>
-    <p:tnLst>
-      <p:par>
-        <p:cTn id="1" dur="indefinite" restart="never" nodeType="tmRoot"/>
-      </p:par>
-    </p:tnLst>
-  </p:timing>
 </p:sld>
 </file>
 
@@ -7683,18 +7614,17 @@
           <a:lstStyle/>
           <a:p>
             <a:r>
-              <a:rPr lang="en-GB" dirty="0" smtClean="0"/>
+              <a:rPr lang="en-GB" dirty="0"/>
               <a:t>Testing with "</a:t>
             </a:r>
             <a:r>
-              <a:rPr lang="en-GB" u="sng" dirty="0" smtClean="0"/>
+              <a:rPr lang="en-GB" u="sng" dirty="0"/>
               <a:t>or</a:t>
             </a:r>
             <a:r>
-              <a:rPr lang="en-GB" dirty="0" smtClean="0"/>
+              <a:rPr lang="en-GB" dirty="0"/>
               <a:t>" on Multiple Things</a:t>
             </a:r>
-            <a:endParaRPr lang="en-GB" dirty="0"/>
           </a:p>
         </p:txBody>
       </p:sp>
@@ -7721,28 +7651,28 @@
           <a:lstStyle/>
           <a:p>
             <a:r>
-              <a:rPr lang="en-GB" dirty="0" smtClean="0"/>
+              <a:rPr lang="en-GB" dirty="0"/>
               <a:t>You can use the </a:t>
             </a:r>
             <a:r>
-              <a:rPr lang="en-GB" u="sng" dirty="0" smtClean="0"/>
+              <a:rPr lang="en-GB" u="sng" dirty="0"/>
               <a:t>or</a:t>
             </a:r>
             <a:r>
-              <a:rPr lang="en-GB" dirty="0" smtClean="0"/>
+              <a:rPr lang="en-GB" dirty="0"/>
               <a:t> statement to check the truth on multiple conditions.</a:t>
             </a:r>
           </a:p>
           <a:p>
             <a:r>
-              <a:rPr lang="en-GB" dirty="0" smtClean="0"/>
+              <a:rPr lang="en-GB" dirty="0"/>
               <a:t>If you have a test for truth that is </a:t>
             </a:r>
           </a:p>
           <a:p>
             <a:pPr lvl="1"/>
             <a:r>
-              <a:rPr lang="en-GB" u="sng" dirty="0" smtClean="0">
+              <a:rPr lang="en-GB" u="sng" dirty="0">
                 <a:latin typeface="Courier New" panose="02070309020205020404" pitchFamily="49" charset="0"/>
                 <a:cs typeface="Courier New" panose="02070309020205020404" pitchFamily="49" charset="0"/>
               </a:rPr>
@@ -7760,40 +7690,25 @@
             <a:pPr lvl="2"/>
             <a:r>
               <a:rPr lang="en-GB" dirty="0"/>
-              <a:t>a is </a:t>
-            </a:r>
-            <a:r>
-              <a:rPr lang="en-GB" dirty="0" smtClean="0"/>
-              <a:t>True</a:t>
-            </a:r>
+              <a:t>a is True</a:t>
+            </a:r>
+          </a:p>
+          <a:p>
+            <a:pPr lvl="2"/>
+            <a:r>
+              <a:rPr lang="en-GB" dirty="0"/>
+              <a:t>b is True</a:t>
+            </a:r>
+          </a:p>
+          <a:p>
+            <a:pPr lvl="2"/>
+            <a:r>
+              <a:rPr lang="en-GB" dirty="0"/>
+              <a:t>Both are True</a:t>
+            </a:r>
+          </a:p>
+          <a:p>
             <a:endParaRPr lang="en-GB" dirty="0"/>
-          </a:p>
-          <a:p>
-            <a:pPr lvl="2"/>
-            <a:r>
-              <a:rPr lang="en-GB" dirty="0"/>
-              <a:t>b is </a:t>
-            </a:r>
-            <a:r>
-              <a:rPr lang="en-GB" dirty="0" smtClean="0"/>
-              <a:t>True</a:t>
-            </a:r>
-            <a:endParaRPr lang="en-GB" dirty="0"/>
-          </a:p>
-          <a:p>
-            <a:pPr lvl="2"/>
-            <a:r>
-              <a:rPr lang="en-GB" dirty="0"/>
-              <a:t>Both are </a:t>
-            </a:r>
-            <a:r>
-              <a:rPr lang="en-GB" dirty="0" smtClean="0"/>
-              <a:t>True</a:t>
-            </a:r>
-            <a:endParaRPr lang="en-GB" dirty="0"/>
-          </a:p>
-          <a:p>
-            <a:endParaRPr lang="en-GB" dirty="0" smtClean="0"/>
           </a:p>
           <a:p>
             <a:endParaRPr lang="en-GB" dirty="0"/>
@@ -7917,7 +7832,7 @@
                 <a:latin typeface="Courier New" panose="02070309020205020404" pitchFamily="49" charset="0"/>
                 <a:cs typeface="Courier New" panose="02070309020205020404" pitchFamily="49" charset="0"/>
               </a:rPr>
-              <a:t># Week4, Program11</a:t>
+              <a:t># Week4, Program10</a:t>
             </a:r>
           </a:p>
           <a:p>
@@ -8113,21 +8028,7 @@
                 <a:latin typeface="Courier New" panose="02070309020205020404" pitchFamily="49" charset="0"/>
                 <a:cs typeface="Courier New" panose="02070309020205020404" pitchFamily="49" charset="0"/>
               </a:rPr>
-              <a:t>print (True == False or False </a:t>
-            </a:r>
-            <a:r>
-              <a:rPr lang="en-GB" sz="1400" dirty="0" smtClean="0">
-                <a:latin typeface="Courier New" panose="02070309020205020404" pitchFamily="49" charset="0"/>
-                <a:cs typeface="Courier New" panose="02070309020205020404" pitchFamily="49" charset="0"/>
-              </a:rPr>
-              <a:t>!= </a:t>
-            </a:r>
-            <a:r>
-              <a:rPr lang="en-GB" sz="1400" dirty="0">
-                <a:latin typeface="Courier New" panose="02070309020205020404" pitchFamily="49" charset="0"/>
-                <a:cs typeface="Courier New" panose="02070309020205020404" pitchFamily="49" charset="0"/>
-              </a:rPr>
-              <a:t>True)</a:t>
+              <a:t>print (True == False or False != True)</a:t>
             </a:r>
           </a:p>
         </p:txBody>
@@ -8142,13 +8043,6 @@
   <p:clrMapOvr>
     <a:masterClrMapping/>
   </p:clrMapOvr>
-  <p:timing>
-    <p:tnLst>
-      <p:par>
-        <p:cTn id="1" dur="indefinite" restart="never" nodeType="tmRoot"/>
-      </p:par>
-    </p:tnLst>
-  </p:timing>
 </p:sld>
 </file>
 
@@ -8185,18 +8079,17 @@
           <a:lstStyle/>
           <a:p>
             <a:r>
-              <a:rPr lang="en-GB" dirty="0" smtClean="0"/>
+              <a:rPr lang="en-GB" dirty="0"/>
               <a:t>Testing with "</a:t>
             </a:r>
             <a:r>
-              <a:rPr lang="en-GB" u="sng" dirty="0" smtClean="0"/>
+              <a:rPr lang="en-GB" u="sng" dirty="0"/>
               <a:t>and</a:t>
             </a:r>
             <a:r>
-              <a:rPr lang="en-GB" dirty="0" smtClean="0"/>
+              <a:rPr lang="en-GB" dirty="0"/>
               <a:t>" on Multiple Things</a:t>
             </a:r>
-            <a:endParaRPr lang="en-GB" dirty="0"/>
           </a:p>
         </p:txBody>
       </p:sp>
@@ -8223,28 +8116,28 @@
           <a:lstStyle/>
           <a:p>
             <a:r>
-              <a:rPr lang="en-GB" dirty="0" smtClean="0"/>
+              <a:rPr lang="en-GB" dirty="0"/>
               <a:t>You can use the </a:t>
             </a:r>
             <a:r>
-              <a:rPr lang="en-GB" u="sng" dirty="0" smtClean="0"/>
+              <a:rPr lang="en-GB" u="sng" dirty="0"/>
               <a:t>and</a:t>
             </a:r>
             <a:r>
-              <a:rPr lang="en-GB" dirty="0" smtClean="0"/>
+              <a:rPr lang="en-GB" dirty="0"/>
               <a:t> statement to check the truth on multiple conditions.</a:t>
             </a:r>
           </a:p>
           <a:p>
             <a:r>
-              <a:rPr lang="en-GB" dirty="0" smtClean="0"/>
+              <a:rPr lang="en-GB" dirty="0"/>
               <a:t>If you have a test for truth that is </a:t>
             </a:r>
           </a:p>
           <a:p>
             <a:pPr lvl="1"/>
             <a:r>
-              <a:rPr lang="en-GB" u="sng" dirty="0" smtClean="0">
+              <a:rPr lang="en-GB" u="sng" dirty="0">
                 <a:latin typeface="Courier New" panose="02070309020205020404" pitchFamily="49" charset="0"/>
                 <a:cs typeface="Courier New" panose="02070309020205020404" pitchFamily="49" charset="0"/>
               </a:rPr>
@@ -8255,11 +8148,7 @@
             <a:pPr lvl="1"/>
             <a:r>
               <a:rPr lang="en-GB" dirty="0"/>
-              <a:t>This will </a:t>
-            </a:r>
-            <a:r>
-              <a:rPr lang="en-GB" dirty="0" smtClean="0"/>
-              <a:t>return only if both a and b are true.</a:t>
+              <a:t>This will return only if both a and b are true.</a:t>
             </a:r>
           </a:p>
           <a:p>
@@ -8380,18 +8269,11 @@
           <a:lstStyle/>
           <a:p>
             <a:r>
-              <a:rPr lang="en-GB" sz="1400" dirty="0" smtClean="0">
-                <a:latin typeface="Courier New" panose="02070309020205020404" pitchFamily="49" charset="0"/>
-                <a:cs typeface="Courier New" panose="02070309020205020404" pitchFamily="49" charset="0"/>
-              </a:rPr>
-              <a:t># </a:t>
-            </a:r>
-            <a:r>
               <a:rPr lang="en-GB" sz="1400" dirty="0">
                 <a:latin typeface="Courier New" panose="02070309020205020404" pitchFamily="49" charset="0"/>
                 <a:cs typeface="Courier New" panose="02070309020205020404" pitchFamily="49" charset="0"/>
               </a:rPr>
-              <a:t>Week4, Program12</a:t>
+              <a:t># Week4, Program11</a:t>
             </a:r>
           </a:p>
           <a:p>
@@ -8590,13 +8472,6 @@
   <p:clrMapOvr>
     <a:masterClrMapping/>
   </p:clrMapOvr>
-  <p:timing>
-    <p:tnLst>
-      <p:par>
-        <p:cTn id="1" dur="indefinite" restart="never" nodeType="tmRoot"/>
-      </p:par>
-    </p:tnLst>
-  </p:timing>
 </p:sld>
 </file>
 
@@ -8633,10 +8508,9 @@
           <a:lstStyle/>
           <a:p>
             <a:r>
-              <a:rPr lang="en-GB" dirty="0" smtClean="0"/>
+              <a:rPr lang="en-GB" dirty="0"/>
               <a:t>Nesting Tests.</a:t>
             </a:r>
-            <a:endParaRPr lang="en-GB" dirty="0"/>
           </a:p>
         </p:txBody>
       </p:sp>
@@ -8663,23 +8537,23 @@
           <a:lstStyle/>
           <a:p>
             <a:r>
-              <a:rPr lang="en-GB" dirty="0" smtClean="0"/>
+              <a:rPr lang="en-GB" dirty="0"/>
               <a:t>You can have more than 1 </a:t>
             </a:r>
             <a:r>
-              <a:rPr lang="en-GB" u="sng" dirty="0" smtClean="0"/>
+              <a:rPr lang="en-GB" u="sng" dirty="0"/>
               <a:t>and</a:t>
             </a:r>
             <a:r>
-              <a:rPr lang="en-GB" dirty="0" smtClean="0"/>
+              <a:rPr lang="en-GB" dirty="0"/>
               <a:t> / </a:t>
             </a:r>
             <a:r>
-              <a:rPr lang="en-GB" u="sng" dirty="0" smtClean="0"/>
+              <a:rPr lang="en-GB" u="sng" dirty="0"/>
               <a:t>or</a:t>
             </a:r>
             <a:r>
-              <a:rPr lang="en-GB" dirty="0" smtClean="0"/>
+              <a:rPr lang="en-GB" dirty="0"/>
               <a:t> statement.</a:t>
             </a:r>
           </a:p>
@@ -8693,71 +8567,67 @@
             <a:pPr lvl="1"/>
             <a:r>
               <a:rPr lang="en-GB" dirty="0"/>
-              <a:t>Just like maths, you do the things inside the innermost brackets first</a:t>
-            </a:r>
-            <a:r>
-              <a:rPr lang="en-GB" dirty="0" smtClean="0"/>
-              <a:t>.</a:t>
+              <a:t>Just like maths, you do the things inside the innermost brackets first.</a:t>
             </a:r>
           </a:p>
           <a:p>
             <a:pPr lvl="1"/>
-            <a:endParaRPr lang="en-GB" dirty="0" smtClean="0"/>
-          </a:p>
-          <a:p>
-            <a:r>
-              <a:rPr lang="en-GB" dirty="0" smtClean="0"/>
+            <a:endParaRPr lang="en-GB" dirty="0"/>
+          </a:p>
+          <a:p>
+            <a:r>
+              <a:rPr lang="en-GB" dirty="0"/>
               <a:t>You can even combine </a:t>
             </a:r>
             <a:r>
-              <a:rPr lang="en-GB" u="sng" dirty="0" smtClean="0"/>
+              <a:rPr lang="en-GB" u="sng" dirty="0"/>
               <a:t>and</a:t>
             </a:r>
             <a:r>
-              <a:rPr lang="en-GB" dirty="0" smtClean="0"/>
+              <a:rPr lang="en-GB" dirty="0"/>
               <a:t> / </a:t>
             </a:r>
             <a:r>
-              <a:rPr lang="en-GB" u="sng" dirty="0" smtClean="0"/>
+              <a:rPr lang="en-GB" u="sng" dirty="0"/>
               <a:t>or</a:t>
             </a:r>
             <a:r>
-              <a:rPr lang="en-GB" dirty="0" smtClean="0"/>
+              <a:rPr lang="en-GB" dirty="0"/>
               <a:t> in a single statement.</a:t>
             </a:r>
           </a:p>
           <a:p>
             <a:pPr lvl="1"/>
             <a:r>
-              <a:rPr lang="en-GB" dirty="0" smtClean="0"/>
-              <a:t>I always recommend using brackets to avoid confusion. If you don't however :-</a:t>
+              <a:rPr lang="en-GB" dirty="0"/>
+              <a:t>I always recommend using brackets to avoid confusion.</a:t>
             </a:r>
           </a:p>
           <a:p>
             <a:pPr lvl="1"/>
             <a:r>
-              <a:rPr lang="en-GB" dirty="0" smtClean="0"/>
-              <a:t>If you do no use brackets though, "or" is evaluated before "and".</a:t>
+              <a:rPr lang="en-GB" dirty="0"/>
+              <a:t>However, if you do not use brackets, "or" is evaluated before "and".</a:t>
             </a:r>
           </a:p>
           <a:p>
             <a:pPr lvl="1"/>
             <a:r>
-              <a:rPr lang="en-GB" dirty="0" smtClean="0"/>
+              <a:rPr lang="en-GB" dirty="0"/>
               <a:t>For example</a:t>
             </a:r>
           </a:p>
           <a:p>
             <a:pPr lvl="2"/>
             <a:r>
-              <a:rPr lang="en-GB" dirty="0" smtClean="0">
+              <a:rPr lang="en-GB" dirty="0">
                 <a:latin typeface="Courier New" panose="02070309020205020404" pitchFamily="49" charset="0"/>
                 <a:cs typeface="Courier New" panose="02070309020205020404" pitchFamily="49" charset="0"/>
               </a:rPr>
               <a:t>1 == 1 and 2 == 3 or 4 == 4</a:t>
             </a:r>
             <a:r>
-              <a:rPr lang="en-GB" dirty="0" smtClean="0"/>
+              <a:rPr lang="en-GB" dirty="0"/>
               <a:t> is the same as.</a:t>
             </a:r>
           </a:p>
@@ -8768,38 +8638,17 @@
                 <a:latin typeface="Courier New" panose="02070309020205020404" pitchFamily="49" charset="0"/>
                 <a:cs typeface="Courier New" panose="02070309020205020404" pitchFamily="49" charset="0"/>
               </a:rPr>
-              <a:t>1 == 1 and </a:t>
-            </a:r>
-            <a:r>
-              <a:rPr lang="en-GB" dirty="0" smtClean="0">
-                <a:latin typeface="Courier New" panose="02070309020205020404" pitchFamily="49" charset="0"/>
-                <a:cs typeface="Courier New" panose="02070309020205020404" pitchFamily="49" charset="0"/>
-              </a:rPr>
-              <a:t>(2 </a:t>
-            </a:r>
-            <a:r>
-              <a:rPr lang="en-GB" dirty="0">
-                <a:latin typeface="Courier New" panose="02070309020205020404" pitchFamily="49" charset="0"/>
-                <a:cs typeface="Courier New" panose="02070309020205020404" pitchFamily="49" charset="0"/>
-              </a:rPr>
-              <a:t>== 3 or 4 == </a:t>
-            </a:r>
-            <a:r>
-              <a:rPr lang="en-GB" dirty="0" smtClean="0">
-                <a:latin typeface="Courier New" panose="02070309020205020404" pitchFamily="49" charset="0"/>
-                <a:cs typeface="Courier New" panose="02070309020205020404" pitchFamily="49" charset="0"/>
-              </a:rPr>
-              <a:t>4)</a:t>
-            </a:r>
-            <a:endParaRPr lang="en-GB" dirty="0" smtClean="0"/>
+              <a:t>1 == 1 and (2 == 3 or 4 == 4)</a:t>
+            </a:r>
+            <a:endParaRPr lang="en-GB" dirty="0"/>
           </a:p>
           <a:p>
             <a:pPr lvl="2"/>
-            <a:endParaRPr lang="en-GB" dirty="0" smtClean="0"/>
+            <a:endParaRPr lang="en-GB" dirty="0"/>
           </a:p>
           <a:p>
             <a:pPr lvl="2"/>
-            <a:endParaRPr lang="en-GB" dirty="0" smtClean="0"/>
+            <a:endParaRPr lang="en-GB" dirty="0"/>
           </a:p>
           <a:p>
             <a:endParaRPr lang="en-GB" dirty="0"/>
@@ -8856,13 +8705,6 @@
   <p:clrMapOvr>
     <a:masterClrMapping/>
   </p:clrMapOvr>
-  <p:timing>
-    <p:tnLst>
-      <p:par>
-        <p:cTn id="1" dur="indefinite" restart="never" nodeType="tmRoot"/>
-      </p:par>
-    </p:tnLst>
-  </p:timing>
 </p:sld>
 </file>
 
@@ -8899,14 +8741,9 @@
           <a:lstStyle/>
           <a:p>
             <a:r>
-              <a:rPr lang="en-GB" dirty="0" smtClean="0"/>
-              <a:t>Nesting </a:t>
-            </a:r>
-            <a:r>
-              <a:rPr lang="en-GB" dirty="0" smtClean="0"/>
-              <a:t>Tests – Examples.</a:t>
-            </a:r>
-            <a:endParaRPr lang="en-GB" dirty="0"/>
+              <a:rPr lang="en-GB" dirty="0"/>
+              <a:t>Nesting Tests – Examples.</a:t>
+            </a:r>
           </a:p>
         </p:txBody>
       </p:sp>
@@ -8976,8 +8813,19 @@
                 <a:latin typeface="Courier New" panose="02070309020205020404" pitchFamily="49" charset="0"/>
                 <a:cs typeface="Courier New" panose="02070309020205020404" pitchFamily="49" charset="0"/>
               </a:rPr>
-              <a:t># Week4, Program13</a:t>
-            </a:r>
+              <a:t># Week4</a:t>
+            </a:r>
+            <a:r>
+              <a:rPr lang="en-GB" sz="1200">
+                <a:latin typeface="Courier New" panose="02070309020205020404" pitchFamily="49" charset="0"/>
+                <a:cs typeface="Courier New" panose="02070309020205020404" pitchFamily="49" charset="0"/>
+              </a:rPr>
+              <a:t>, Program12</a:t>
+            </a:r>
+            <a:endParaRPr lang="en-GB" sz="1200" dirty="0">
+              <a:latin typeface="Courier New" panose="02070309020205020404" pitchFamily="49" charset="0"/>
+              <a:cs typeface="Courier New" panose="02070309020205020404" pitchFamily="49" charset="0"/>
+            </a:endParaRPr>
           </a:p>
           <a:p>
             <a:endParaRPr lang="en-GB" sz="1200" dirty="0">
@@ -9285,13 +9133,6 @@
   <p:clrMapOvr>
     <a:masterClrMapping/>
   </p:clrMapOvr>
-  <p:timing>
-    <p:tnLst>
-      <p:par>
-        <p:cTn id="1" dur="indefinite" restart="never" nodeType="tmRoot"/>
-      </p:par>
-    </p:tnLst>
-  </p:timing>
 </p:sld>
 </file>
 
@@ -9328,10 +9169,9 @@
           <a:lstStyle/>
           <a:p>
             <a:r>
-              <a:rPr lang="en-GB" dirty="0" smtClean="0"/>
+              <a:rPr lang="en-GB" dirty="0"/>
               <a:t>Homework 1.</a:t>
             </a:r>
-            <a:endParaRPr lang="en-GB" dirty="0"/>
           </a:p>
         </p:txBody>
       </p:sp>
@@ -9398,56 +9238,55 @@
           <a:lstStyle/>
           <a:p>
             <a:r>
-              <a:rPr lang="en-GB" dirty="0" smtClean="0"/>
+              <a:rPr lang="en-GB" dirty="0"/>
               <a:t>Starting with the program on the right, add to it so :-</a:t>
             </a:r>
           </a:p>
           <a:p>
             <a:pPr lvl="1"/>
             <a:r>
-              <a:rPr lang="en-GB" dirty="0" smtClean="0"/>
+              <a:rPr lang="en-GB" dirty="0"/>
               <a:t>Print the planets backwards.</a:t>
             </a:r>
           </a:p>
           <a:p>
             <a:pPr lvl="1"/>
             <a:r>
-              <a:rPr lang="en-GB" dirty="0" smtClean="0"/>
+              <a:rPr lang="en-GB" dirty="0"/>
               <a:t>Print only the rocky planets.</a:t>
             </a:r>
           </a:p>
           <a:p>
             <a:pPr lvl="1"/>
             <a:r>
-              <a:rPr lang="en-GB" dirty="0" smtClean="0"/>
+              <a:rPr lang="en-GB" dirty="0"/>
               <a:t>Print only the gas giants.</a:t>
             </a:r>
           </a:p>
           <a:p>
             <a:pPr lvl="1"/>
             <a:r>
-              <a:rPr lang="en-GB" dirty="0" smtClean="0"/>
+              <a:rPr lang="en-GB" dirty="0"/>
               <a:t>Print the gas giants backwards.</a:t>
             </a:r>
           </a:p>
           <a:p>
             <a:pPr lvl="1"/>
             <a:r>
-              <a:rPr lang="en-GB" dirty="0" smtClean="0"/>
+              <a:rPr lang="en-GB" dirty="0"/>
               <a:t>Print everyone other planet, starting with Mercury.</a:t>
             </a:r>
           </a:p>
           <a:p>
             <a:pPr lvl="1"/>
             <a:r>
-              <a:rPr lang="en-GB" dirty="0" smtClean="0"/>
+              <a:rPr lang="en-GB" dirty="0"/>
               <a:t>Print every other planet backwards, starting at Saturn.</a:t>
             </a:r>
-            <a:endParaRPr lang="en-GB" dirty="0" smtClean="0"/>
           </a:p>
           <a:p>
             <a:pPr lvl="1"/>
-            <a:endParaRPr lang="en-GB" dirty="0" smtClean="0"/>
+            <a:endParaRPr lang="en-GB" dirty="0"/>
           </a:p>
           <a:p>
             <a:endParaRPr lang="en-GB" dirty="0"/>
@@ -9476,18 +9315,11 @@
           <a:lstStyle/>
           <a:p>
             <a:r>
-              <a:rPr lang="en-GB" sz="1100" dirty="0" smtClean="0">
-                <a:latin typeface="Courier New" panose="02070309020205020404" pitchFamily="49" charset="0"/>
-                <a:cs typeface="Courier New" panose="02070309020205020404" pitchFamily="49" charset="0"/>
-              </a:rPr>
-              <a:t># </a:t>
-            </a:r>
-            <a:r>
               <a:rPr lang="en-GB" sz="1100" dirty="0">
                 <a:latin typeface="Courier New" panose="02070309020205020404" pitchFamily="49" charset="0"/>
                 <a:cs typeface="Courier New" panose="02070309020205020404" pitchFamily="49" charset="0"/>
               </a:rPr>
-              <a:t>Week4, Homework1</a:t>
+              <a:t># Week4, Homework1</a:t>
             </a:r>
           </a:p>
           <a:p>
@@ -9545,13 +9377,6 @@
   <p:clrMapOvr>
     <a:masterClrMapping/>
   </p:clrMapOvr>
-  <p:timing>
-    <p:tnLst>
-      <p:par>
-        <p:cTn id="1" dur="indefinite" restart="never" nodeType="tmRoot"/>
-      </p:par>
-    </p:tnLst>
-  </p:timing>
 </p:sld>
 </file>
 
@@ -9588,10 +9413,9 @@
           <a:lstStyle/>
           <a:p>
             <a:r>
-              <a:rPr lang="en-GB" dirty="0" smtClean="0"/>
+              <a:rPr lang="en-GB" dirty="0"/>
               <a:t>Goals of this week.</a:t>
             </a:r>
-            <a:endParaRPr lang="en-GB" dirty="0"/>
           </a:p>
         </p:txBody>
       </p:sp>
@@ -9613,39 +9437,38 @@
           <a:lstStyle/>
           <a:p>
             <a:r>
-              <a:rPr lang="en-GB" dirty="0" smtClean="0"/>
+              <a:rPr lang="en-GB" dirty="0"/>
               <a:t>This week, we will learn :-</a:t>
             </a:r>
           </a:p>
           <a:p>
             <a:pPr lvl="1"/>
             <a:r>
-              <a:rPr lang="en-GB" dirty="0" smtClean="0"/>
+              <a:rPr lang="en-GB" dirty="0"/>
               <a:t>We will learn more things we can do with lists, and how strings can be a bit like lists.</a:t>
             </a:r>
           </a:p>
           <a:p>
             <a:pPr lvl="1"/>
-            <a:endParaRPr lang="en-GB" dirty="0" smtClean="0"/>
+            <a:endParaRPr lang="en-GB" dirty="0"/>
           </a:p>
           <a:p>
             <a:pPr lvl="1"/>
             <a:r>
-              <a:rPr lang="en-GB" dirty="0" smtClean="0"/>
+              <a:rPr lang="en-GB" dirty="0"/>
               <a:t>We will learn different, easier ways to do things we already know how to do.</a:t>
             </a:r>
           </a:p>
           <a:p>
             <a:pPr lvl="1"/>
-            <a:endParaRPr lang="en-GB" dirty="0" smtClean="0"/>
+            <a:endParaRPr lang="en-GB" dirty="0"/>
           </a:p>
           <a:p>
             <a:pPr lvl="1"/>
             <a:r>
-              <a:rPr lang="en-GB" dirty="0" smtClean="0"/>
+              <a:rPr lang="en-GB" dirty="0"/>
               <a:t>We will learn more about testing for things with if.</a:t>
             </a:r>
-            <a:endParaRPr lang="en-GB" dirty="0"/>
           </a:p>
         </p:txBody>
       </p:sp>
@@ -9659,13 +9482,6 @@
   <p:clrMapOvr>
     <a:masterClrMapping/>
   </p:clrMapOvr>
-  <p:timing>
-    <p:tnLst>
-      <p:par>
-        <p:cTn id="1" dur="indefinite" restart="never" nodeType="tmRoot"/>
-      </p:par>
-    </p:tnLst>
-  </p:timing>
 </p:sld>
 </file>
 
@@ -9702,10 +9518,9 @@
           <a:lstStyle/>
           <a:p>
             <a:r>
-              <a:rPr lang="en-GB" dirty="0" smtClean="0"/>
+              <a:rPr lang="en-GB" dirty="0"/>
               <a:t>Homework 2.</a:t>
             </a:r>
-            <a:endParaRPr lang="en-GB" dirty="0"/>
           </a:p>
         </p:txBody>
       </p:sp>
@@ -9772,56 +9587,56 @@
           <a:lstStyle/>
           <a:p>
             <a:r>
-              <a:rPr lang="en-GB" dirty="0" smtClean="0"/>
+              <a:rPr lang="en-GB" dirty="0"/>
               <a:t>Write a program which :-</a:t>
             </a:r>
           </a:p>
           <a:p>
             <a:pPr lvl="1"/>
             <a:r>
-              <a:rPr lang="en-GB" dirty="0" smtClean="0"/>
+              <a:rPr lang="en-GB" dirty="0"/>
               <a:t>Uses a while loop to put the numbers 1 to 10 into a list.</a:t>
             </a:r>
           </a:p>
           <a:p>
             <a:pPr lvl="1"/>
             <a:r>
-              <a:rPr lang="en-GB" dirty="0" smtClean="0"/>
+              <a:rPr lang="en-GB" dirty="0"/>
               <a:t>Print that list.</a:t>
             </a:r>
           </a:p>
           <a:p>
             <a:pPr lvl="1"/>
             <a:r>
-              <a:rPr lang="en-GB" dirty="0" smtClean="0"/>
+              <a:rPr lang="en-GB" dirty="0"/>
               <a:t>Print that list backwords.</a:t>
             </a:r>
           </a:p>
           <a:p>
             <a:pPr lvl="1"/>
             <a:r>
-              <a:rPr lang="en-GB" dirty="0" smtClean="0"/>
+              <a:rPr lang="en-GB" dirty="0"/>
               <a:t>Print just the odd numbers.</a:t>
             </a:r>
           </a:p>
           <a:p>
             <a:pPr lvl="1"/>
             <a:r>
-              <a:rPr lang="en-GB" dirty="0" smtClean="0"/>
+              <a:rPr lang="en-GB" dirty="0"/>
               <a:t>Print just the even numbers.</a:t>
             </a:r>
           </a:p>
           <a:p>
             <a:pPr lvl="1"/>
             <a:r>
-              <a:rPr lang="en-GB" dirty="0" smtClean="0"/>
+              <a:rPr lang="en-GB" dirty="0"/>
               <a:t>Print just the odd numbers backwards.</a:t>
             </a:r>
           </a:p>
           <a:p>
             <a:pPr lvl="1"/>
             <a:r>
-              <a:rPr lang="en-GB" dirty="0" smtClean="0"/>
+              <a:rPr lang="en-GB" dirty="0"/>
               <a:t>Print just the even numbers backwards.</a:t>
             </a:r>
           </a:p>
@@ -9829,11 +9644,11 @@
             <a:endParaRPr lang="en-GB" dirty="0"/>
           </a:p>
           <a:p>
-            <a:endParaRPr lang="en-GB" dirty="0" smtClean="0"/>
+            <a:endParaRPr lang="en-GB" dirty="0"/>
           </a:p>
           <a:p>
             <a:pPr lvl="1"/>
-            <a:endParaRPr lang="en-GB" dirty="0" smtClean="0"/>
+            <a:endParaRPr lang="en-GB" dirty="0"/>
           </a:p>
           <a:p>
             <a:endParaRPr lang="en-GB" dirty="0"/>
@@ -9850,13 +9665,6 @@
   <p:clrMapOvr>
     <a:masterClrMapping/>
   </p:clrMapOvr>
-  <p:timing>
-    <p:tnLst>
-      <p:par>
-        <p:cTn id="1" dur="indefinite" restart="never" nodeType="tmRoot"/>
-      </p:par>
-    </p:tnLst>
-  </p:timing>
 </p:sld>
 </file>
 
@@ -9893,10 +9701,9 @@
           <a:lstStyle/>
           <a:p>
             <a:r>
-              <a:rPr lang="en-GB" dirty="0" smtClean="0"/>
+              <a:rPr lang="en-GB" dirty="0"/>
               <a:t>Homework 3.</a:t>
             </a:r>
-            <a:endParaRPr lang="en-GB" dirty="0"/>
           </a:p>
         </p:txBody>
       </p:sp>
@@ -9963,22 +9770,22 @@
           <a:lstStyle/>
           <a:p>
             <a:r>
-              <a:rPr lang="en-GB" dirty="0" smtClean="0"/>
+              <a:rPr lang="en-GB" dirty="0"/>
               <a:t>Write a program which takes the string.</a:t>
             </a:r>
           </a:p>
           <a:p>
             <a:pPr lvl="1"/>
             <a:r>
-              <a:rPr lang="en-GB" dirty="0" smtClean="0"/>
+              <a:rPr lang="en-GB" dirty="0"/>
               <a:t>"</a:t>
             </a:r>
             <a:r>
-              <a:rPr lang="en-GB" dirty="0" err="1" smtClean="0"/>
+              <a:rPr lang="en-GB" dirty="0" err="1"/>
               <a:t>racecar</a:t>
             </a:r>
             <a:r>
-              <a:rPr lang="en-GB" dirty="0" smtClean="0"/>
+              <a:rPr lang="en-GB" dirty="0"/>
               <a:t>"</a:t>
             </a:r>
           </a:p>
@@ -9988,35 +9795,27 @@
           </a:p>
           <a:p>
             <a:r>
-              <a:rPr lang="en-GB" dirty="0" smtClean="0"/>
+              <a:rPr lang="en-GB" dirty="0"/>
               <a:t>Using slices, print just "car" from the string.</a:t>
             </a:r>
           </a:p>
           <a:p>
             <a:r>
-              <a:rPr lang="en-GB" dirty="0" smtClean="0"/>
+              <a:rPr lang="en-GB" dirty="0"/>
               <a:t>Using slices, print just "race" from the string.</a:t>
             </a:r>
           </a:p>
           <a:p>
             <a:r>
-              <a:rPr lang="en-GB" dirty="0" smtClean="0"/>
+              <a:rPr lang="en-GB" dirty="0"/>
               <a:t>Using slices, print the string backwards. What do you notice about it ?</a:t>
             </a:r>
           </a:p>
           <a:p>
             <a:pPr lvl="1"/>
             <a:r>
-              <a:rPr lang="en-GB" i="1" dirty="0" smtClean="0"/>
-              <a:t>Extra Credit: Look </a:t>
-            </a:r>
-            <a:r>
               <a:rPr lang="en-GB" i="1" dirty="0"/>
-              <a:t>up </a:t>
-            </a:r>
-            <a:r>
-              <a:rPr lang="en-GB" i="1" dirty="0" smtClean="0"/>
-              <a:t>"palindrome" in a dictionary. We will be using palindromes in the program we write for next week.</a:t>
+              <a:t>Extra Credit: Look up "palindrome" in a dictionary. We will be using palindromes in the program we write for next week.</a:t>
             </a:r>
             <a:endParaRPr lang="en-GB" dirty="0"/>
           </a:p>
@@ -10032,13 +9831,6 @@
   <p:clrMapOvr>
     <a:masterClrMapping/>
   </p:clrMapOvr>
-  <p:timing>
-    <p:tnLst>
-      <p:par>
-        <p:cTn id="1" dur="indefinite" restart="never" nodeType="tmRoot"/>
-      </p:par>
-    </p:tnLst>
-  </p:timing>
 </p:sld>
 </file>
 
@@ -10075,10 +9867,9 @@
           <a:lstStyle/>
           <a:p>
             <a:r>
-              <a:rPr lang="en-GB" dirty="0" smtClean="0"/>
+              <a:rPr lang="en-GB" dirty="0"/>
               <a:t>Homework 4.</a:t>
             </a:r>
-            <a:endParaRPr lang="en-GB" dirty="0"/>
           </a:p>
         </p:txBody>
       </p:sp>
@@ -10145,7 +9936,7 @@
           <a:lstStyle/>
           <a:p>
             <a:r>
-              <a:rPr lang="en-GB" dirty="0" smtClean="0"/>
+              <a:rPr lang="en-GB" dirty="0"/>
               <a:t>Using a while loop, ask the user to input 3 peoples names. Store these names in a list.</a:t>
             </a:r>
           </a:p>
@@ -10154,33 +9945,33 @@
           </a:p>
           <a:p>
             <a:r>
-              <a:rPr lang="en-GB" dirty="0" smtClean="0"/>
+              <a:rPr lang="en-GB" dirty="0"/>
               <a:t>When the program runs, indicate if :-</a:t>
             </a:r>
           </a:p>
           <a:p>
             <a:pPr lvl="1"/>
             <a:r>
-              <a:rPr lang="en-GB" dirty="0" smtClean="0"/>
+              <a:rPr lang="en-GB" dirty="0"/>
               <a:t>All the names are the same.</a:t>
             </a:r>
           </a:p>
           <a:p>
             <a:pPr lvl="1"/>
             <a:r>
-              <a:rPr lang="en-GB" dirty="0" smtClean="0"/>
+              <a:rPr lang="en-GB" dirty="0"/>
               <a:t>Any of the names are the same.</a:t>
             </a:r>
           </a:p>
           <a:p>
             <a:pPr lvl="1"/>
             <a:r>
-              <a:rPr lang="en-GB" dirty="0" smtClean="0"/>
+              <a:rPr lang="en-GB" dirty="0"/>
               <a:t>All the names are different.</a:t>
             </a:r>
           </a:p>
           <a:p>
-            <a:endParaRPr lang="en-GB" dirty="0" smtClean="0"/>
+            <a:endParaRPr lang="en-GB" dirty="0"/>
           </a:p>
           <a:p>
             <a:endParaRPr lang="en-GB" dirty="0"/>
@@ -10197,13 +9988,6 @@
   <p:clrMapOvr>
     <a:masterClrMapping/>
   </p:clrMapOvr>
-  <p:timing>
-    <p:tnLst>
-      <p:par>
-        <p:cTn id="1" dur="indefinite" restart="never" nodeType="tmRoot"/>
-      </p:par>
-    </p:tnLst>
-  </p:timing>
 </p:sld>
 </file>
 
@@ -10240,10 +10024,9 @@
           <a:lstStyle/>
           <a:p>
             <a:r>
-              <a:rPr lang="en-GB" dirty="0" smtClean="0"/>
+              <a:rPr lang="en-GB" dirty="0"/>
               <a:t>Next Week</a:t>
             </a:r>
-            <a:endParaRPr lang="en-GB" dirty="0"/>
           </a:p>
         </p:txBody>
       </p:sp>
@@ -10265,16 +10048,16 @@
           <a:lstStyle/>
           <a:p>
             <a:r>
-              <a:rPr lang="en-GB" dirty="0" smtClean="0"/>
+              <a:rPr lang="en-GB" dirty="0"/>
               <a:t>We will learn about how to read things from files, and how to write things to files.</a:t>
             </a:r>
           </a:p>
           <a:p>
-            <a:endParaRPr lang="en-GB" dirty="0" smtClean="0"/>
-          </a:p>
-          <a:p>
-            <a:r>
-              <a:rPr lang="en-GB" dirty="0" smtClean="0"/>
+            <a:endParaRPr lang="en-GB" dirty="0"/>
+          </a:p>
+          <a:p>
+            <a:r>
+              <a:rPr lang="en-GB" dirty="0"/>
               <a:t>We will use what we learned this week about Palindromes to find ALL the palindromes in the English Language !</a:t>
             </a:r>
           </a:p>
@@ -10283,7 +10066,7 @@
           </a:p>
           <a:p>
             <a:r>
-              <a:rPr lang="en-GB" dirty="0" smtClean="0"/>
+              <a:rPr lang="en-GB" dirty="0"/>
               <a:t>We will learn about random numbers.</a:t>
             </a:r>
           </a:p>
@@ -10292,7 +10075,7 @@
           </a:p>
           <a:p>
             <a:r>
-              <a:rPr lang="en-GB" dirty="0" smtClean="0"/>
+              <a:rPr lang="en-GB" dirty="0"/>
               <a:t>We will learn about a new data structure, the dictionary.</a:t>
             </a:r>
           </a:p>
@@ -10349,10 +10132,9 @@
           <a:lstStyle/>
           <a:p>
             <a:r>
-              <a:rPr lang="en-GB" dirty="0" smtClean="0"/>
+              <a:rPr lang="en-GB" dirty="0"/>
               <a:t>Lists and Slices.</a:t>
             </a:r>
-            <a:endParaRPr lang="en-GB" dirty="0"/>
           </a:p>
         </p:txBody>
       </p:sp>
@@ -10421,10 +10203,9 @@
           <a:lstStyle/>
           <a:p>
             <a:r>
-              <a:rPr lang="en-GB" dirty="0" smtClean="0"/>
+              <a:rPr lang="en-GB" dirty="0"/>
               <a:t>Using slices.</a:t>
             </a:r>
-            <a:endParaRPr lang="en-GB" dirty="0"/>
           </a:p>
         </p:txBody>
       </p:sp>
@@ -10451,13 +10232,13 @@
           <a:lstStyle/>
           <a:p>
             <a:r>
-              <a:rPr lang="en-GB" dirty="0" smtClean="0"/>
+              <a:rPr lang="en-GB" dirty="0"/>
               <a:t>Python has a system called "slices" for accessing lists.</a:t>
             </a:r>
           </a:p>
           <a:p>
             <a:r>
-              <a:rPr lang="en-GB" dirty="0" smtClean="0"/>
+              <a:rPr lang="en-GB" dirty="0"/>
               <a:t>There is a lot to learn about slices, but this will cover the most frequently used parts of slices.</a:t>
             </a:r>
           </a:p>
@@ -10466,41 +10247,41 @@
           </a:p>
           <a:p>
             <a:r>
-              <a:rPr lang="en-GB" dirty="0" smtClean="0"/>
+              <a:rPr lang="en-GB" dirty="0"/>
               <a:t>Here we will learn how to :-</a:t>
             </a:r>
           </a:p>
           <a:p>
             <a:pPr lvl="1"/>
             <a:r>
-              <a:rPr lang="en-GB" dirty="0" smtClean="0"/>
+              <a:rPr lang="en-GB" dirty="0"/>
               <a:t>Get a range within a list.</a:t>
             </a:r>
           </a:p>
           <a:p>
             <a:pPr lvl="1"/>
             <a:r>
-              <a:rPr lang="en-GB" dirty="0" smtClean="0"/>
+              <a:rPr lang="en-GB" dirty="0"/>
               <a:t>Get an element counting from the end of the list</a:t>
             </a:r>
           </a:p>
           <a:p>
             <a:pPr lvl="1"/>
             <a:r>
-              <a:rPr lang="en-GB" dirty="0" smtClean="0"/>
+              <a:rPr lang="en-GB" dirty="0"/>
               <a:t>Get every n</a:t>
             </a:r>
             <a:r>
-              <a:rPr lang="en-GB" baseline="30000" dirty="0" smtClean="0"/>
+              <a:rPr lang="en-GB" baseline="30000" dirty="0"/>
               <a:t>th</a:t>
             </a:r>
             <a:r>
-              <a:rPr lang="en-GB" dirty="0" smtClean="0"/>
+              <a:rPr lang="en-GB" dirty="0"/>
               <a:t> element of a list.</a:t>
             </a:r>
           </a:p>
           <a:p>
-            <a:endParaRPr lang="en-GB" dirty="0" smtClean="0"/>
+            <a:endParaRPr lang="en-GB" dirty="0"/>
           </a:p>
           <a:p>
             <a:endParaRPr lang="en-GB" dirty="0"/>
@@ -10517,13 +10298,6 @@
   <p:clrMapOvr>
     <a:masterClrMapping/>
   </p:clrMapOvr>
-  <p:timing>
-    <p:tnLst>
-      <p:par>
-        <p:cTn id="1" dur="indefinite" restart="never" nodeType="tmRoot"/>
-      </p:par>
-    </p:tnLst>
-  </p:timing>
 </p:sld>
 </file>
 
@@ -10560,10 +10334,9 @@
           <a:lstStyle/>
           <a:p>
             <a:r>
-              <a:rPr lang="en-GB" dirty="0" smtClean="0"/>
+              <a:rPr lang="en-GB" dirty="0"/>
               <a:t>Introduction to Slices</a:t>
             </a:r>
-            <a:endParaRPr lang="en-GB" dirty="0"/>
           </a:p>
         </p:txBody>
       </p:sp>
@@ -10590,23 +10363,21 @@
           <a:lstStyle/>
           <a:p>
             <a:r>
-              <a:rPr lang="en-GB" dirty="0" smtClean="0"/>
+              <a:rPr lang="en-GB" dirty="0"/>
               <a:t>This program is similar to the first program from this week.</a:t>
             </a:r>
           </a:p>
           <a:p>
             <a:r>
-              <a:rPr lang="en-GB" dirty="0" smtClean="0"/>
+              <a:rPr lang="en-GB" dirty="0"/>
               <a:t>Both sections do the same thing !</a:t>
             </a:r>
-            <a:endParaRPr lang="en-GB" dirty="0"/>
-          </a:p>
-          <a:p>
-            <a:r>
-              <a:rPr lang="en-GB" dirty="0" smtClean="0"/>
+          </a:p>
+          <a:p>
+            <a:r>
+              <a:rPr lang="en-GB" dirty="0"/>
               <a:t>This shows you the slice syntax for getting a part of a list.</a:t>
             </a:r>
-            <a:endParaRPr lang="en-GB" dirty="0"/>
           </a:p>
           <a:p>
             <a:r>
@@ -10621,33 +10392,29 @@
               <a:t>[</a:t>
             </a:r>
             <a:r>
-              <a:rPr lang="en-GB" sz="1400" dirty="0" err="1" smtClean="0">
+              <a:rPr lang="en-GB" sz="1400" dirty="0" err="1">
                 <a:latin typeface="Courier New" panose="02070309020205020404" pitchFamily="49" charset="0"/>
                 <a:cs typeface="Courier New" panose="02070309020205020404" pitchFamily="49" charset="0"/>
               </a:rPr>
               <a:t>start_element:end_element:step</a:t>
             </a:r>
             <a:r>
-              <a:rPr lang="en-GB" sz="1400" dirty="0" smtClean="0">
+              <a:rPr lang="en-GB" sz="1400" dirty="0">
                 <a:latin typeface="Courier New" panose="02070309020205020404" pitchFamily="49" charset="0"/>
                 <a:cs typeface="Courier New" panose="02070309020205020404" pitchFamily="49" charset="0"/>
               </a:rPr>
               <a:t>]</a:t>
             </a:r>
-            <a:endParaRPr lang="en-GB" sz="1400" dirty="0">
-              <a:latin typeface="Courier New" panose="02070309020205020404" pitchFamily="49" charset="0"/>
-              <a:cs typeface="Courier New" panose="02070309020205020404" pitchFamily="49" charset="0"/>
-            </a:endParaRPr>
           </a:p>
           <a:p>
             <a:pPr lvl="1"/>
             <a:r>
-              <a:rPr lang="en-GB" sz="1200" i="1" dirty="0" smtClean="0"/>
+              <a:rPr lang="en-GB" sz="1200" i="1" dirty="0"/>
               <a:t>We will learn about step in a few slides.</a:t>
             </a:r>
           </a:p>
           <a:p>
-            <a:endParaRPr lang="en-GB" dirty="0" smtClean="0"/>
+            <a:endParaRPr lang="en-GB" dirty="0"/>
           </a:p>
           <a:p>
             <a:endParaRPr lang="en-GB" dirty="0"/>
@@ -10676,18 +10443,11 @@
           <a:lstStyle/>
           <a:p>
             <a:r>
-              <a:rPr lang="en-GB" sz="1200" dirty="0" smtClean="0">
-                <a:latin typeface="Courier New" panose="02070309020205020404" pitchFamily="49" charset="0"/>
-                <a:cs typeface="Courier New" panose="02070309020205020404" pitchFamily="49" charset="0"/>
-              </a:rPr>
-              <a:t># </a:t>
-            </a:r>
-            <a:r>
               <a:rPr lang="en-GB" sz="1200" dirty="0">
                 <a:latin typeface="Courier New" panose="02070309020205020404" pitchFamily="49" charset="0"/>
                 <a:cs typeface="Courier New" panose="02070309020205020404" pitchFamily="49" charset="0"/>
               </a:rPr>
-              <a:t>Week4, Program2</a:t>
+              <a:t># Week4, Program1</a:t>
             </a:r>
           </a:p>
           <a:p>
@@ -10953,13 +10713,6 @@
   <p:clrMapOvr>
     <a:masterClrMapping/>
   </p:clrMapOvr>
-  <p:timing>
-    <p:tnLst>
-      <p:par>
-        <p:cTn id="1" dur="indefinite" restart="never" nodeType="tmRoot"/>
-      </p:par>
-    </p:tnLst>
-  </p:timing>
 </p:sld>
 </file>
 
@@ -10996,10 +10749,9 @@
           <a:lstStyle/>
           <a:p>
             <a:r>
-              <a:rPr lang="en-GB" dirty="0" smtClean="0"/>
+              <a:rPr lang="en-GB" dirty="0"/>
               <a:t>Slices from the start and to the end.</a:t>
             </a:r>
-            <a:endParaRPr lang="en-GB" dirty="0"/>
           </a:p>
         </p:txBody>
       </p:sp>
@@ -11049,23 +10801,18 @@
             </a:r>
             <a:r>
               <a:rPr lang="en-GB" sz="1800" dirty="0"/>
-              <a:t>, it means to the end of the list</a:t>
-            </a:r>
-            <a:r>
-              <a:rPr lang="en-GB" sz="1800" dirty="0" smtClean="0"/>
-              <a:t>.</a:t>
+              <a:t>, it means to the end of the list.</a:t>
             </a:r>
           </a:p>
           <a:p>
             <a:pPr lvl="1"/>
             <a:r>
-              <a:rPr lang="en-GB" sz="1600" dirty="0" smtClean="0"/>
+              <a:rPr lang="en-GB" sz="1600" dirty="0"/>
               <a:t>This is particularly important because it means you don't need to know how long the list is.</a:t>
             </a:r>
-            <a:endParaRPr lang="en-GB" sz="1600" dirty="0"/>
-          </a:p>
-          <a:p>
-            <a:endParaRPr lang="en-GB" dirty="0" smtClean="0"/>
+          </a:p>
+          <a:p>
+            <a:endParaRPr lang="en-GB" dirty="0"/>
           </a:p>
           <a:p>
             <a:endParaRPr lang="en-GB" dirty="0"/>
@@ -11094,32 +10841,29 @@
           <a:lstStyle/>
           <a:p>
             <a:r>
-              <a:rPr lang="en-GB" sz="1200" dirty="0" smtClean="0">
-                <a:latin typeface="Courier New" panose="02070309020205020404" pitchFamily="49" charset="0"/>
-                <a:cs typeface="Courier New" panose="02070309020205020404" pitchFamily="49" charset="0"/>
-              </a:rPr>
-              <a:t># </a:t>
-            </a:r>
-            <a:r>
               <a:rPr lang="en-GB" sz="1200" dirty="0">
                 <a:latin typeface="Courier New" panose="02070309020205020404" pitchFamily="49" charset="0"/>
                 <a:cs typeface="Courier New" panose="02070309020205020404" pitchFamily="49" charset="0"/>
               </a:rPr>
-              <a:t>Week4, </a:t>
-            </a:r>
-            <a:r>
-              <a:rPr lang="en-GB" sz="1200" dirty="0" smtClean="0">
-                <a:latin typeface="Courier New" panose="02070309020205020404" pitchFamily="49" charset="0"/>
-                <a:cs typeface="Courier New" panose="02070309020205020404" pitchFamily="49" charset="0"/>
-              </a:rPr>
-              <a:t>Program3</a:t>
-            </a:r>
+              <a:t># Week4, Program2</a:t>
+            </a:r>
+          </a:p>
+          <a:p>
             <a:endParaRPr lang="en-GB" sz="1200" dirty="0">
               <a:latin typeface="Courier New" panose="02070309020205020404" pitchFamily="49" charset="0"/>
               <a:cs typeface="Courier New" panose="02070309020205020404" pitchFamily="49" charset="0"/>
             </a:endParaRPr>
           </a:p>
           <a:p>
+            <a:r>
+              <a:rPr lang="en-GB" sz="1200" dirty="0">
+                <a:latin typeface="Courier New" panose="02070309020205020404" pitchFamily="49" charset="0"/>
+                <a:cs typeface="Courier New" panose="02070309020205020404" pitchFamily="49" charset="0"/>
+              </a:rPr>
+              <a:t>alphabet = ['a', 'b', 'c', 'd', 'e', 'f', 'g', 'h']</a:t>
+            </a:r>
+          </a:p>
+          <a:p>
             <a:endParaRPr lang="en-GB" sz="1200" dirty="0">
               <a:latin typeface="Courier New" panose="02070309020205020404" pitchFamily="49" charset="0"/>
               <a:cs typeface="Courier New" panose="02070309020205020404" pitchFamily="49" charset="0"/>
@@ -11131,7 +10875,16 @@
                 <a:latin typeface="Courier New" panose="02070309020205020404" pitchFamily="49" charset="0"/>
                 <a:cs typeface="Courier New" panose="02070309020205020404" pitchFamily="49" charset="0"/>
               </a:rPr>
-              <a:t>alphabet = ['a', 'b', 'c', 'd', 'e', 'f', 'g', 'h']</a:t>
+              <a:t>print(f"{alphabet[:4]} are the first 4 letters of the alphabet")</a:t>
+            </a:r>
+          </a:p>
+          <a:p>
+            <a:r>
+              <a:rPr lang="en-GB" sz="1200" dirty="0">
+                <a:latin typeface="Courier New" panose="02070309020205020404" pitchFamily="49" charset="0"/>
+                <a:cs typeface="Courier New" panose="02070309020205020404" pitchFamily="49" charset="0"/>
+              </a:rPr>
+              <a:t>print(f"{alphabet[4:]} are the rest (until h)")</a:t>
             </a:r>
           </a:p>
           <a:p>
@@ -11146,7 +10899,7 @@
                 <a:latin typeface="Courier New" panose="02070309020205020404" pitchFamily="49" charset="0"/>
                 <a:cs typeface="Courier New" panose="02070309020205020404" pitchFamily="49" charset="0"/>
               </a:rPr>
-              <a:t>print(f"{alphabet[:4]} are the first 4 letters of the alphabet")</a:t>
+              <a:t>print(alphabet[3:5])</a:t>
             </a:r>
           </a:p>
           <a:p>
@@ -11155,7 +10908,7 @@
                 <a:latin typeface="Courier New" panose="02070309020205020404" pitchFamily="49" charset="0"/>
                 <a:cs typeface="Courier New" panose="02070309020205020404" pitchFamily="49" charset="0"/>
               </a:rPr>
-              <a:t>print(f"{alphabet[4:]} are the rest (until h)")</a:t>
+              <a:t>print(alphabet[2:5])</a:t>
             </a:r>
           </a:p>
           <a:p>
@@ -11170,7 +10923,7 @@
                 <a:latin typeface="Courier New" panose="02070309020205020404" pitchFamily="49" charset="0"/>
                 <a:cs typeface="Courier New" panose="02070309020205020404" pitchFamily="49" charset="0"/>
               </a:rPr>
-              <a:t>print(alphabet[3:5])</a:t>
+              <a:t>print(alphabet[6:])</a:t>
             </a:r>
           </a:p>
           <a:p>
@@ -11179,43 +10932,8 @@
                 <a:latin typeface="Courier New" panose="02070309020205020404" pitchFamily="49" charset="0"/>
                 <a:cs typeface="Courier New" panose="02070309020205020404" pitchFamily="49" charset="0"/>
               </a:rPr>
-              <a:t>print(alphabet[2:5])</a:t>
-            </a:r>
-          </a:p>
-          <a:p>
-            <a:endParaRPr lang="en-GB" sz="1200" dirty="0">
-              <a:latin typeface="Courier New" panose="02070309020205020404" pitchFamily="49" charset="0"/>
-              <a:cs typeface="Courier New" panose="02070309020205020404" pitchFamily="49" charset="0"/>
-            </a:endParaRPr>
-          </a:p>
-          <a:p>
-            <a:r>
-              <a:rPr lang="en-GB" sz="1200" dirty="0">
-                <a:latin typeface="Courier New" panose="02070309020205020404" pitchFamily="49" charset="0"/>
-                <a:cs typeface="Courier New" panose="02070309020205020404" pitchFamily="49" charset="0"/>
-              </a:rPr>
-              <a:t>print(alphabet[6:])</a:t>
-            </a:r>
-          </a:p>
-          <a:p>
-            <a:r>
-              <a:rPr lang="en-GB" sz="1200" dirty="0">
-                <a:latin typeface="Courier New" panose="02070309020205020404" pitchFamily="49" charset="0"/>
-                <a:cs typeface="Courier New" panose="02070309020205020404" pitchFamily="49" charset="0"/>
-              </a:rPr>
-              <a:t>print(alphabet[5</a:t>
-            </a:r>
-            <a:r>
-              <a:rPr lang="en-GB" sz="1200" dirty="0" smtClean="0">
-                <a:latin typeface="Courier New" panose="02070309020205020404" pitchFamily="49" charset="0"/>
-                <a:cs typeface="Courier New" panose="02070309020205020404" pitchFamily="49" charset="0"/>
-              </a:rPr>
-              <a:t>:])</a:t>
-            </a:r>
-            <a:endParaRPr lang="en-GB" sz="1200" dirty="0">
-              <a:latin typeface="Courier New" panose="02070309020205020404" pitchFamily="49" charset="0"/>
-              <a:cs typeface="Courier New" panose="02070309020205020404" pitchFamily="49" charset="0"/>
-            </a:endParaRPr>
+              <a:t>print(alphabet[5:])</a:t>
+            </a:r>
           </a:p>
           <a:p>
             <a:endParaRPr lang="en-GB" sz="1200" dirty="0">
@@ -11286,13 +11004,6 @@
   <p:clrMapOvr>
     <a:masterClrMapping/>
   </p:clrMapOvr>
-  <p:timing>
-    <p:tnLst>
-      <p:par>
-        <p:cTn id="1" dur="indefinite" restart="never" nodeType="tmRoot"/>
-      </p:par>
-    </p:tnLst>
-  </p:timing>
 </p:sld>
 </file>
 
@@ -11329,10 +11040,9 @@
           <a:lstStyle/>
           <a:p>
             <a:r>
-              <a:rPr lang="en-GB" dirty="0" smtClean="0"/>
+              <a:rPr lang="en-GB" dirty="0"/>
               <a:t>Slices from the end.</a:t>
             </a:r>
-            <a:endParaRPr lang="en-GB" dirty="0"/>
           </a:p>
         </p:txBody>
       </p:sp>
@@ -11359,25 +11069,25 @@
           <a:lstStyle/>
           <a:p>
             <a:r>
-              <a:rPr lang="en-GB" sz="1800" dirty="0" smtClean="0"/>
+              <a:rPr lang="en-GB" sz="1800" dirty="0"/>
               <a:t>If you use negative numbers, you count from the end of the list instead of the start.</a:t>
             </a:r>
           </a:p>
           <a:p>
             <a:r>
-              <a:rPr lang="en-GB" sz="1800" dirty="0" smtClean="0"/>
+              <a:rPr lang="en-GB" sz="1800" dirty="0"/>
               <a:t>You can use this to access single elements.</a:t>
             </a:r>
           </a:p>
           <a:p>
             <a:r>
-              <a:rPr lang="en-GB" sz="1800" dirty="0" smtClean="0"/>
+              <a:rPr lang="en-GB" sz="1800" dirty="0"/>
               <a:t>You can also use it in slices.</a:t>
             </a:r>
             <a:endParaRPr lang="en-GB" sz="1600" dirty="0"/>
           </a:p>
           <a:p>
-            <a:endParaRPr lang="en-GB" dirty="0" smtClean="0"/>
+            <a:endParaRPr lang="en-GB" dirty="0"/>
           </a:p>
           <a:p>
             <a:endParaRPr lang="en-GB" dirty="0"/>
@@ -11406,18 +11116,11 @@
           <a:lstStyle/>
           <a:p>
             <a:r>
-              <a:rPr lang="en-GB" sz="1200" dirty="0" smtClean="0">
-                <a:latin typeface="Courier New" panose="02070309020205020404" pitchFamily="49" charset="0"/>
-                <a:cs typeface="Courier New" panose="02070309020205020404" pitchFamily="49" charset="0"/>
-              </a:rPr>
-              <a:t># </a:t>
-            </a:r>
-            <a:r>
               <a:rPr lang="en-GB" sz="1200" dirty="0">
                 <a:latin typeface="Courier New" panose="02070309020205020404" pitchFamily="49" charset="0"/>
                 <a:cs typeface="Courier New" panose="02070309020205020404" pitchFamily="49" charset="0"/>
               </a:rPr>
-              <a:t>Week4, Program4</a:t>
+              <a:t># Week4, Program3</a:t>
             </a:r>
           </a:p>
           <a:p>
@@ -11589,13 +11292,6 @@
   <p:clrMapOvr>
     <a:masterClrMapping/>
   </p:clrMapOvr>
-  <p:timing>
-    <p:tnLst>
-      <p:par>
-        <p:cTn id="1" dur="indefinite" restart="never" nodeType="tmRoot"/>
-      </p:par>
-    </p:tnLst>
-  </p:timing>
 </p:sld>
 </file>
 
@@ -11632,10 +11328,9 @@
           <a:lstStyle/>
           <a:p>
             <a:r>
-              <a:rPr lang="en-GB" dirty="0" smtClean="0"/>
+              <a:rPr lang="en-GB" dirty="0"/>
               <a:t>Steps.</a:t>
             </a:r>
-            <a:endParaRPr lang="en-GB" dirty="0"/>
           </a:p>
         </p:txBody>
       </p:sp>
@@ -11662,25 +11357,25 @@
           <a:lstStyle/>
           <a:p>
             <a:r>
-              <a:rPr lang="en-GB" sz="1800" dirty="0" smtClean="0"/>
+              <a:rPr lang="en-GB" sz="1800" dirty="0"/>
               <a:t>If you use negative numbers, you count from the end of the list instead of the start.</a:t>
             </a:r>
           </a:p>
           <a:p>
             <a:r>
-              <a:rPr lang="en-GB" sz="1800" dirty="0" smtClean="0"/>
+              <a:rPr lang="en-GB" sz="1800" dirty="0"/>
               <a:t>You can use this to access single elements.</a:t>
             </a:r>
           </a:p>
           <a:p>
             <a:r>
-              <a:rPr lang="en-GB" sz="1800" dirty="0" smtClean="0"/>
+              <a:rPr lang="en-GB" sz="1800" dirty="0"/>
               <a:t>You can also use it in slices.</a:t>
             </a:r>
             <a:endParaRPr lang="en-GB" sz="1600" dirty="0"/>
           </a:p>
           <a:p>
-            <a:endParaRPr lang="en-GB" dirty="0" smtClean="0"/>
+            <a:endParaRPr lang="en-GB" dirty="0"/>
           </a:p>
           <a:p>
             <a:endParaRPr lang="en-GB" dirty="0"/>
@@ -11709,18 +11404,11 @@
           <a:lstStyle/>
           <a:p>
             <a:r>
-              <a:rPr lang="en-GB" sz="1200" dirty="0" smtClean="0">
-                <a:latin typeface="Courier New" panose="02070309020205020404" pitchFamily="49" charset="0"/>
-                <a:cs typeface="Courier New" panose="02070309020205020404" pitchFamily="49" charset="0"/>
-              </a:rPr>
-              <a:t># </a:t>
-            </a:r>
-            <a:r>
               <a:rPr lang="en-GB" sz="1200" dirty="0">
                 <a:latin typeface="Courier New" panose="02070309020205020404" pitchFamily="49" charset="0"/>
                 <a:cs typeface="Courier New" panose="02070309020205020404" pitchFamily="49" charset="0"/>
               </a:rPr>
-              <a:t>Week4, Program5</a:t>
+              <a:t># Week4, Program4</a:t>
             </a:r>
           </a:p>
           <a:p>
@@ -11994,13 +11682,6 @@
   <p:clrMapOvr>
     <a:masterClrMapping/>
   </p:clrMapOvr>
-  <p:timing>
-    <p:tnLst>
-      <p:par>
-        <p:cTn id="1" dur="indefinite" restart="never" nodeType="tmRoot"/>
-      </p:par>
-    </p:tnLst>
-  </p:timing>
 </p:sld>
 </file>
 
@@ -12037,10 +11718,9 @@
           <a:lstStyle/>
           <a:p>
             <a:r>
-              <a:rPr lang="en-GB" dirty="0" smtClean="0"/>
+              <a:rPr lang="en-GB" dirty="0"/>
               <a:t>Negative Steps.</a:t>
             </a:r>
-            <a:endParaRPr lang="en-GB" dirty="0"/>
           </a:p>
         </p:txBody>
       </p:sp>
@@ -12067,31 +11747,31 @@
           <a:lstStyle/>
           <a:p>
             <a:r>
-              <a:rPr lang="en-GB" sz="1800" dirty="0" smtClean="0"/>
+              <a:rPr lang="en-GB" sz="1800" dirty="0"/>
               <a:t>If you use a negative number as your steps, your list will come from the end.</a:t>
             </a:r>
           </a:p>
           <a:p>
             <a:r>
-              <a:rPr lang="en-GB" sz="1800" dirty="0" smtClean="0"/>
+              <a:rPr lang="en-GB" sz="1800" dirty="0"/>
               <a:t>This can be used as a quick way to reverse a list.</a:t>
             </a:r>
           </a:p>
           <a:p>
             <a:r>
-              <a:rPr lang="en-GB" sz="1800" dirty="0" smtClean="0"/>
+              <a:rPr lang="en-GB" sz="1800" dirty="0"/>
               <a:t>This program does the same thing in two different ways.</a:t>
             </a:r>
           </a:p>
           <a:p>
             <a:r>
-              <a:rPr lang="en-GB" sz="1800" dirty="0" smtClean="0"/>
+              <a:rPr lang="en-GB" sz="1800" dirty="0"/>
               <a:t>As you can see, the second one is neater than the first.</a:t>
             </a:r>
             <a:endParaRPr lang="en-GB" sz="1600" dirty="0"/>
           </a:p>
           <a:p>
-            <a:endParaRPr lang="en-GB" dirty="0" smtClean="0"/>
+            <a:endParaRPr lang="en-GB" dirty="0"/>
           </a:p>
           <a:p>
             <a:endParaRPr lang="en-GB" dirty="0"/>
@@ -12175,7 +11855,7 @@
                 <a:latin typeface="Courier New" panose="02070309020205020404" pitchFamily="49" charset="0"/>
                 <a:cs typeface="Courier New" panose="02070309020205020404" pitchFamily="49" charset="0"/>
               </a:rPr>
-              <a:t># Week4, Program6</a:t>
+              <a:t># Week4, Program5</a:t>
             </a:r>
           </a:p>
           <a:p>
@@ -12470,13 +12150,6 @@
   <p:clrMapOvr>
     <a:masterClrMapping/>
   </p:clrMapOvr>
-  <p:timing>
-    <p:tnLst>
-      <p:par>
-        <p:cTn id="1" dur="indefinite" restart="never" nodeType="tmRoot"/>
-      </p:par>
-    </p:tnLst>
-  </p:timing>
 </p:sld>
 </file>
 

</xml_diff>